<commit_message>
Queues, device selection slides
</commit_message>
<xml_diff>
--- a/Slides/SYCL intro.pptx
+++ b/Slides/SYCL intro.pptx
@@ -7,13 +7,17 @@
     <p:sldMasterId id="2147483676" r:id="rId6"/>
   </p:sldMasterIdLst>
   <p:notesMasterIdLst>
-    <p:notesMasterId r:id="rId11"/>
+    <p:notesMasterId r:id="rId15"/>
   </p:notesMasterIdLst>
   <p:sldIdLst>
     <p:sldId id="321" r:id="rId7"/>
     <p:sldId id="350" r:id="rId8"/>
     <p:sldId id="351" r:id="rId9"/>
     <p:sldId id="352" r:id="rId10"/>
+    <p:sldId id="353" r:id="rId11"/>
+    <p:sldId id="354" r:id="rId12"/>
+    <p:sldId id="355" r:id="rId13"/>
+    <p:sldId id="356" r:id="rId14"/>
   </p:sldIdLst>
   <p:sldSz cx="12192000" cy="6858000"/>
   <p:notesSz cx="6858000" cy="9144000"/>
@@ -100,6 +104,10 @@
             <p14:sldId id="350"/>
             <p14:sldId id="351"/>
             <p14:sldId id="352"/>
+            <p14:sldId id="353"/>
+            <p14:sldId id="354"/>
+            <p14:sldId id="355"/>
+            <p14:sldId id="356"/>
           </p14:sldIdLst>
         </p14:section>
       </p14:sectionLst>
@@ -5931,7 +5939,7 @@
           </a:ln>
           <a:extLst>
             <a:ext uri="{C572A759-6A51-4108-AA02-DFA0A04FC94B}">
-              <ma14:wrappingTextBoxFlag xmlns:ma14="http://schemas.microsoft.com/office/mac/drawingml/2011/main" xmlns="" val="1"/>
+              <ma14:wrappingTextBoxFlag xmlns="" xmlns:ma14="http://schemas.microsoft.com/office/mac/drawingml/2011/main" val="1"/>
             </a:ext>
           </a:extLst>
         </p:spPr>
@@ -6138,7 +6146,7 @@
           </a:ln>
           <a:extLst>
             <a:ext uri="{C572A759-6A51-4108-AA02-DFA0A04FC94B}">
-              <ma14:wrappingTextBoxFlag xmlns:ma14="http://schemas.microsoft.com/office/mac/drawingml/2011/main" xmlns="" val="1"/>
+              <ma14:wrappingTextBoxFlag xmlns="" xmlns:ma14="http://schemas.microsoft.com/office/mac/drawingml/2011/main" val="1"/>
             </a:ext>
           </a:extLst>
         </p:spPr>
@@ -7037,7 +7045,7 @@
           </a:ln>
           <a:extLst>
             <a:ext uri="{C572A759-6A51-4108-AA02-DFA0A04FC94B}">
-              <ma14:wrappingTextBoxFlag xmlns:ma14="http://schemas.microsoft.com/office/mac/drawingml/2011/main" xmlns="" val="1"/>
+              <ma14:wrappingTextBoxFlag xmlns="" xmlns:ma14="http://schemas.microsoft.com/office/mac/drawingml/2011/main" val="1"/>
             </a:ext>
           </a:extLst>
         </p:spPr>
@@ -7872,7 +7880,7 @@
           </a:ln>
           <a:extLst>
             <a:ext uri="{C572A759-6A51-4108-AA02-DFA0A04FC94B}">
-              <ma14:wrappingTextBoxFlag xmlns:ma14="http://schemas.microsoft.com/office/mac/drawingml/2011/main" xmlns="" val="1"/>
+              <ma14:wrappingTextBoxFlag xmlns="" xmlns:ma14="http://schemas.microsoft.com/office/mac/drawingml/2011/main" val="1"/>
             </a:ext>
           </a:extLst>
         </p:spPr>
@@ -12895,6 +12903,1008 @@
 </p:sld>
 </file>
 
+<file path=ppt/slides/slide5.xml><?xml version="1.0" encoding="utf-8"?>
+<p:sld xmlns:a="http://schemas.openxmlformats.org/drawingml/2006/main" xmlns:r="http://schemas.openxmlformats.org/officeDocument/2006/relationships" xmlns:p="http://schemas.openxmlformats.org/presentationml/2006/main">
+  <p:cSld>
+    <p:spTree>
+      <p:nvGrpSpPr>
+        <p:cNvPr id="1" name=""/>
+        <p:cNvGrpSpPr/>
+        <p:nvPr/>
+      </p:nvGrpSpPr>
+      <p:grpSpPr>
+        <a:xfrm>
+          <a:off x="0" y="0"/>
+          <a:ext cx="0" cy="0"/>
+          <a:chOff x="0" y="0"/>
+          <a:chExt cx="0" cy="0"/>
+        </a:xfrm>
+      </p:grpSpPr>
+      <p:sp>
+        <p:nvSpPr>
+          <p:cNvPr id="2" name="Text Placeholder 1">
+            <a:extLst>
+              <a:ext uri="{FF2B5EF4-FFF2-40B4-BE49-F238E27FC236}">
+                <a16:creationId xmlns:a16="http://schemas.microsoft.com/office/drawing/2014/main" id="{3B148F8C-873A-42DF-A5FB-7AE127AE422C}"/>
+              </a:ext>
+            </a:extLst>
+          </p:cNvPr>
+          <p:cNvSpPr>
+            <a:spLocks noGrp="1"/>
+          </p:cNvSpPr>
+          <p:nvPr>
+            <p:ph type="body" sz="quarter" idx="11"/>
+          </p:nvPr>
+        </p:nvSpPr>
+        <p:spPr/>
+        <p:txBody>
+          <a:bodyPr/>
+          <a:lstStyle/>
+          <a:p>
+            <a:r>
+              <a:rPr lang="en-US" sz="2400" dirty="0"/>
+              <a:t>Abstractions used for submitting work to a device</a:t>
+            </a:r>
+          </a:p>
+          <a:p>
+            <a:pPr lvl="1"/>
+            <a:r>
+              <a:rPr lang="en-US" sz="2000" dirty="0"/>
+              <a:t>Bound to a single device upon creation</a:t>
+            </a:r>
+          </a:p>
+          <a:p>
+            <a:pPr lvl="1"/>
+            <a:r>
+              <a:rPr lang="en-US" sz="2000" dirty="0"/>
+              <a:t>Device is selected via </a:t>
+            </a:r>
+            <a:r>
+              <a:rPr lang="en-US" sz="2000" dirty="0" err="1"/>
+              <a:t>device_selector</a:t>
+            </a:r>
+            <a:r>
+              <a:rPr lang="en-US" sz="2000" dirty="0"/>
+              <a:t> class</a:t>
+            </a:r>
+          </a:p>
+          <a:p>
+            <a:pPr lvl="1"/>
+            <a:r>
+              <a:rPr lang="en-US" sz="2000" dirty="0"/>
+              <a:t>Can allow selector to select from a class of devices or write custom selector</a:t>
+            </a:r>
+          </a:p>
+          <a:p>
+            <a:r>
+              <a:rPr lang="en-US" sz="2400" dirty="0"/>
+              <a:t>Tasks submitted to queue are offloaded to device when conditions are met</a:t>
+            </a:r>
+          </a:p>
+          <a:p>
+            <a:pPr lvl="1"/>
+            <a:r>
+              <a:rPr lang="en-GB" sz="2000" dirty="0"/>
+              <a:t>Host continues execution of the program after submission to the queue</a:t>
+            </a:r>
+            <a:endParaRPr lang="en-US" sz="2000" dirty="0"/>
+          </a:p>
+        </p:txBody>
+      </p:sp>
+      <p:sp>
+        <p:nvSpPr>
+          <p:cNvPr id="3" name="Title 2">
+            <a:extLst>
+              <a:ext uri="{FF2B5EF4-FFF2-40B4-BE49-F238E27FC236}">
+                <a16:creationId xmlns:a16="http://schemas.microsoft.com/office/drawing/2014/main" id="{CB1B5C22-C9E9-4DDD-0A17-C7F34F9CB7A7}"/>
+              </a:ext>
+            </a:extLst>
+          </p:cNvPr>
+          <p:cNvSpPr>
+            <a:spLocks noGrp="1"/>
+          </p:cNvSpPr>
+          <p:nvPr>
+            <p:ph type="title"/>
+          </p:nvPr>
+        </p:nvSpPr>
+        <p:spPr/>
+        <p:txBody>
+          <a:bodyPr/>
+          <a:lstStyle/>
+          <a:p>
+            <a:r>
+              <a:rPr lang="en-US" sz="4000" dirty="0"/>
+              <a:t>Queues	</a:t>
+            </a:r>
+          </a:p>
+        </p:txBody>
+      </p:sp>
+    </p:spTree>
+    <p:extLst>
+      <p:ext uri="{BB962C8B-B14F-4D97-AF65-F5344CB8AC3E}">
+        <p14:creationId xmlns:p14="http://schemas.microsoft.com/office/powerpoint/2010/main" val="3178228203"/>
+      </p:ext>
+    </p:extLst>
+  </p:cSld>
+  <p:clrMapOvr>
+    <a:masterClrMapping/>
+  </p:clrMapOvr>
+  <p:transition spd="med"/>
+</p:sld>
+</file>
+
+<file path=ppt/slides/slide6.xml><?xml version="1.0" encoding="utf-8"?>
+<p:sld xmlns:a="http://schemas.openxmlformats.org/drawingml/2006/main" xmlns:r="http://schemas.openxmlformats.org/officeDocument/2006/relationships" xmlns:p="http://schemas.openxmlformats.org/presentationml/2006/main">
+  <p:cSld>
+    <p:spTree>
+      <p:nvGrpSpPr>
+        <p:cNvPr id="1" name=""/>
+        <p:cNvGrpSpPr/>
+        <p:nvPr/>
+      </p:nvGrpSpPr>
+      <p:grpSpPr>
+        <a:xfrm>
+          <a:off x="0" y="0"/>
+          <a:ext cx="0" cy="0"/>
+          <a:chOff x="0" y="0"/>
+          <a:chExt cx="0" cy="0"/>
+        </a:xfrm>
+      </p:grpSpPr>
+      <p:sp>
+        <p:nvSpPr>
+          <p:cNvPr id="2" name="Text Placeholder 1">
+            <a:extLst>
+              <a:ext uri="{FF2B5EF4-FFF2-40B4-BE49-F238E27FC236}">
+                <a16:creationId xmlns:a16="http://schemas.microsoft.com/office/drawing/2014/main" id="{BAA91BAA-AE1C-4B57-74D8-76174A2532B7}"/>
+              </a:ext>
+            </a:extLst>
+          </p:cNvPr>
+          <p:cNvSpPr>
+            <a:spLocks noGrp="1"/>
+          </p:cNvSpPr>
+          <p:nvPr>
+            <p:ph type="body" sz="quarter" idx="11"/>
+          </p:nvPr>
+        </p:nvSpPr>
+        <p:spPr/>
+        <p:txBody>
+          <a:bodyPr/>
+          <a:lstStyle/>
+          <a:p>
+            <a:r>
+              <a:rPr lang="en-US" sz="2400" dirty="0"/>
+              <a:t>Default selector chooses most capable device at runtime</a:t>
+            </a:r>
+          </a:p>
+          <a:p>
+            <a:r>
+              <a:rPr lang="en-US" sz="2400" dirty="0"/>
+              <a:t>Device selector classes exist to choose from specific class of device</a:t>
+            </a:r>
+          </a:p>
+          <a:p>
+            <a:pPr lvl="1"/>
+            <a:r>
+              <a:rPr lang="en-US" sz="2000" dirty="0" err="1"/>
+              <a:t>gpu_selector</a:t>
+            </a:r>
+            <a:endParaRPr lang="en-US" sz="2000" dirty="0"/>
+          </a:p>
+          <a:p>
+            <a:pPr lvl="1"/>
+            <a:r>
+              <a:rPr lang="en-US" sz="2000" dirty="0" err="1"/>
+              <a:t>cpu_selector</a:t>
+            </a:r>
+            <a:endParaRPr lang="en-US" sz="2000" dirty="0"/>
+          </a:p>
+          <a:p>
+            <a:pPr lvl="1"/>
+            <a:r>
+              <a:rPr lang="en-US" sz="2000" dirty="0" err="1"/>
+              <a:t>accelerator_selector</a:t>
+            </a:r>
+            <a:endParaRPr lang="en-US" sz="2000" dirty="0"/>
+          </a:p>
+          <a:p>
+            <a:pPr lvl="1"/>
+            <a:r>
+              <a:rPr lang="en-US" sz="2000" dirty="0" err="1"/>
+              <a:t>fpga_selector</a:t>
+            </a:r>
+            <a:r>
+              <a:rPr lang="en-US" sz="2000" dirty="0"/>
+              <a:t> exists via intel extension</a:t>
+            </a:r>
+          </a:p>
+          <a:p>
+            <a:pPr lvl="1"/>
+            <a:r>
+              <a:rPr lang="en-US" sz="2000" dirty="0"/>
+              <a:t>Useful for quick development, but typically want specific device for a task</a:t>
+            </a:r>
+          </a:p>
+          <a:p>
+            <a:r>
+              <a:rPr lang="en-US" sz="2400" dirty="0"/>
+              <a:t>Custom selectors created by extending </a:t>
+            </a:r>
+            <a:r>
+              <a:rPr lang="en-US" sz="2400" dirty="0" err="1"/>
+              <a:t>device_selector</a:t>
+            </a:r>
+            <a:r>
+              <a:rPr lang="en-US" sz="2400" dirty="0"/>
+              <a:t> base class</a:t>
+            </a:r>
+            <a:endParaRPr lang="en-GB" sz="2000" dirty="0">
+              <a:solidFill>
+                <a:srgbClr val="000000"/>
+              </a:solidFill>
+              <a:highlight>
+                <a:srgbClr val="FFFFFF"/>
+              </a:highlight>
+              <a:latin typeface="Consolas" panose="020B0609020204030204" pitchFamily="49" charset="0"/>
+            </a:endParaRPr>
+          </a:p>
+          <a:p>
+            <a:pPr marL="684047" lvl="2" indent="0">
+              <a:buNone/>
+            </a:pPr>
+            <a:r>
+              <a:rPr lang="en-GB" sz="2000" dirty="0">
+                <a:solidFill>
+                  <a:srgbClr val="000000"/>
+                </a:solidFill>
+                <a:highlight>
+                  <a:srgbClr val="FFFFFF"/>
+                </a:highlight>
+                <a:latin typeface="Consolas" panose="020B0609020204030204" pitchFamily="49" charset="0"/>
+              </a:rPr>
+              <a:t>virtual</a:t>
+            </a:r>
+            <a:r>
+              <a:rPr lang="en-GB" sz="2000" dirty="0">
+                <a:solidFill>
+                  <a:srgbClr val="A31515"/>
+                </a:solidFill>
+                <a:highlight>
+                  <a:srgbClr val="FFFFFF"/>
+                </a:highlight>
+                <a:latin typeface="Consolas" panose="020B0609020204030204" pitchFamily="49" charset="0"/>
+              </a:rPr>
+              <a:t> </a:t>
+            </a:r>
+            <a:r>
+              <a:rPr lang="en-GB" sz="2000" dirty="0">
+                <a:solidFill>
+                  <a:schemeClr val="accent1"/>
+                </a:solidFill>
+                <a:highlight>
+                  <a:srgbClr val="FFFFFF"/>
+                </a:highlight>
+                <a:latin typeface="Consolas" panose="020B0609020204030204" pitchFamily="49" charset="0"/>
+              </a:rPr>
+              <a:t>int</a:t>
+            </a:r>
+            <a:r>
+              <a:rPr lang="en-GB" sz="2000" dirty="0">
+                <a:solidFill>
+                  <a:srgbClr val="A31515"/>
+                </a:solidFill>
+                <a:highlight>
+                  <a:srgbClr val="FFFFFF"/>
+                </a:highlight>
+                <a:latin typeface="Consolas" panose="020B0609020204030204" pitchFamily="49" charset="0"/>
+              </a:rPr>
+              <a:t> </a:t>
+            </a:r>
+            <a:r>
+              <a:rPr lang="en-GB" sz="2000" dirty="0">
+                <a:solidFill>
+                  <a:srgbClr val="000000"/>
+                </a:solidFill>
+                <a:highlight>
+                  <a:srgbClr val="FFFFFF"/>
+                </a:highlight>
+                <a:latin typeface="Consolas" panose="020B0609020204030204" pitchFamily="49" charset="0"/>
+              </a:rPr>
+              <a:t>operator()(</a:t>
+            </a:r>
+            <a:r>
+              <a:rPr lang="en-GB" sz="2000" dirty="0" err="1">
+                <a:solidFill>
+                  <a:schemeClr val="accent1"/>
+                </a:solidFill>
+                <a:highlight>
+                  <a:srgbClr val="FFFFFF"/>
+                </a:highlight>
+                <a:latin typeface="Consolas" panose="020B0609020204030204" pitchFamily="49" charset="0"/>
+              </a:rPr>
+              <a:t>const</a:t>
+            </a:r>
+            <a:r>
+              <a:rPr lang="en-GB" sz="2000" dirty="0">
+                <a:solidFill>
+                  <a:srgbClr val="A31515"/>
+                </a:solidFill>
+                <a:highlight>
+                  <a:srgbClr val="FFFFFF"/>
+                </a:highlight>
+                <a:latin typeface="Consolas" panose="020B0609020204030204" pitchFamily="49" charset="0"/>
+              </a:rPr>
+              <a:t> </a:t>
+            </a:r>
+            <a:r>
+              <a:rPr lang="en-GB" sz="2000" dirty="0">
+                <a:solidFill>
+                  <a:srgbClr val="000080"/>
+                </a:solidFill>
+                <a:highlight>
+                  <a:srgbClr val="FFFFFF"/>
+                </a:highlight>
+                <a:latin typeface="Consolas" panose="020B0609020204030204" pitchFamily="49" charset="0"/>
+              </a:rPr>
+              <a:t>device</a:t>
+            </a:r>
+            <a:r>
+              <a:rPr lang="en-GB" sz="2000" dirty="0">
+                <a:solidFill>
+                  <a:srgbClr val="A31515"/>
+                </a:solidFill>
+                <a:highlight>
+                  <a:srgbClr val="FFFFFF"/>
+                </a:highlight>
+                <a:latin typeface="Consolas" panose="020B0609020204030204" pitchFamily="49" charset="0"/>
+              </a:rPr>
+              <a:t> </a:t>
+            </a:r>
+            <a:r>
+              <a:rPr lang="en-GB" sz="2000" dirty="0">
+                <a:solidFill>
+                  <a:srgbClr val="000000"/>
+                </a:solidFill>
+                <a:highlight>
+                  <a:srgbClr val="FFFFFF"/>
+                </a:highlight>
+                <a:latin typeface="Consolas" panose="020B0609020204030204" pitchFamily="49" charset="0"/>
+              </a:rPr>
+              <a:t>&amp;</a:t>
+            </a:r>
+            <a:r>
+              <a:rPr lang="en-GB" sz="2000" dirty="0">
+                <a:solidFill>
+                  <a:srgbClr val="000080"/>
+                </a:solidFill>
+                <a:highlight>
+                  <a:srgbClr val="FFFFFF"/>
+                </a:highlight>
+                <a:latin typeface="Consolas" panose="020B0609020204030204" pitchFamily="49" charset="0"/>
+              </a:rPr>
+              <a:t>dev</a:t>
+            </a:r>
+            <a:r>
+              <a:rPr lang="en-GB" sz="2000" dirty="0">
+                <a:solidFill>
+                  <a:srgbClr val="000000"/>
+                </a:solidFill>
+                <a:highlight>
+                  <a:srgbClr val="FFFFFF"/>
+                </a:highlight>
+                <a:latin typeface="Consolas" panose="020B0609020204030204" pitchFamily="49" charset="0"/>
+              </a:rPr>
+              <a:t>)</a:t>
+            </a:r>
+            <a:r>
+              <a:rPr lang="en-GB" sz="2000" dirty="0">
+                <a:solidFill>
+                  <a:srgbClr val="A31515"/>
+                </a:solidFill>
+                <a:highlight>
+                  <a:srgbClr val="FFFFFF"/>
+                </a:highlight>
+                <a:latin typeface="Consolas" panose="020B0609020204030204" pitchFamily="49" charset="0"/>
+              </a:rPr>
+              <a:t> </a:t>
+            </a:r>
+            <a:r>
+              <a:rPr lang="en-GB" sz="2000" dirty="0" err="1">
+                <a:solidFill>
+                  <a:schemeClr val="accent1"/>
+                </a:solidFill>
+                <a:highlight>
+                  <a:srgbClr val="FFFFFF"/>
+                </a:highlight>
+                <a:latin typeface="Consolas" panose="020B0609020204030204" pitchFamily="49" charset="0"/>
+              </a:rPr>
+              <a:t>const</a:t>
+            </a:r>
+            <a:r>
+              <a:rPr lang="en-GB" sz="2000" dirty="0">
+                <a:solidFill>
+                  <a:srgbClr val="A31515"/>
+                </a:solidFill>
+                <a:highlight>
+                  <a:srgbClr val="FFFFFF"/>
+                </a:highlight>
+                <a:latin typeface="Consolas" panose="020B0609020204030204" pitchFamily="49" charset="0"/>
+              </a:rPr>
+              <a:t> </a:t>
+            </a:r>
+            <a:r>
+              <a:rPr lang="en-GB" sz="2000" dirty="0">
+                <a:solidFill>
+                  <a:srgbClr val="000000"/>
+                </a:solidFill>
+                <a:highlight>
+                  <a:srgbClr val="FFFFFF"/>
+                </a:highlight>
+                <a:latin typeface="Consolas" panose="020B0609020204030204" pitchFamily="49" charset="0"/>
+              </a:rPr>
+              <a:t>{</a:t>
+            </a:r>
+          </a:p>
+          <a:p>
+            <a:pPr marL="684047" lvl="2" indent="0">
+              <a:buNone/>
+            </a:pPr>
+            <a:r>
+              <a:rPr lang="en-US" sz="2000" dirty="0">
+                <a:solidFill>
+                  <a:srgbClr val="A31515"/>
+                </a:solidFill>
+                <a:highlight>
+                  <a:srgbClr val="FFFFFF"/>
+                </a:highlight>
+                <a:latin typeface="Consolas" panose="020B0609020204030204" pitchFamily="49" charset="0"/>
+              </a:rPr>
+              <a:t>		</a:t>
+            </a:r>
+            <a:r>
+              <a:rPr lang="en-US" sz="2000" dirty="0">
+                <a:solidFill>
+                  <a:schemeClr val="accent2"/>
+                </a:solidFill>
+                <a:highlight>
+                  <a:srgbClr val="FFFFFF"/>
+                </a:highlight>
+                <a:latin typeface="Consolas" panose="020B0609020204030204" pitchFamily="49" charset="0"/>
+              </a:rPr>
+              <a:t>/* Device selection logic */</a:t>
+            </a:r>
+          </a:p>
+          <a:p>
+            <a:pPr marL="684047" lvl="2" indent="0">
+              <a:buNone/>
+            </a:pPr>
+            <a:r>
+              <a:rPr lang="en-US" sz="2000" dirty="0">
+                <a:solidFill>
+                  <a:srgbClr val="000000"/>
+                </a:solidFill>
+                <a:highlight>
+                  <a:srgbClr val="FFFFFF"/>
+                </a:highlight>
+                <a:latin typeface="Consolas" panose="020B0609020204030204" pitchFamily="49" charset="0"/>
+              </a:rPr>
+              <a:t>}</a:t>
+            </a:r>
+            <a:endParaRPr lang="en-US" sz="2000" dirty="0"/>
+          </a:p>
+        </p:txBody>
+      </p:sp>
+      <p:sp>
+        <p:nvSpPr>
+          <p:cNvPr id="3" name="Title 2">
+            <a:extLst>
+              <a:ext uri="{FF2B5EF4-FFF2-40B4-BE49-F238E27FC236}">
+                <a16:creationId xmlns:a16="http://schemas.microsoft.com/office/drawing/2014/main" id="{C6199DC5-494D-B309-311C-2E71E93FC696}"/>
+              </a:ext>
+            </a:extLst>
+          </p:cNvPr>
+          <p:cNvSpPr>
+            <a:spLocks noGrp="1"/>
+          </p:cNvSpPr>
+          <p:nvPr>
+            <p:ph type="title"/>
+          </p:nvPr>
+        </p:nvSpPr>
+        <p:spPr/>
+        <p:txBody>
+          <a:bodyPr/>
+          <a:lstStyle/>
+          <a:p>
+            <a:r>
+              <a:rPr lang="en-US" sz="4000" dirty="0"/>
+              <a:t>Device Selection</a:t>
+            </a:r>
+          </a:p>
+        </p:txBody>
+      </p:sp>
+    </p:spTree>
+    <p:extLst>
+      <p:ext uri="{BB962C8B-B14F-4D97-AF65-F5344CB8AC3E}">
+        <p14:creationId xmlns:p14="http://schemas.microsoft.com/office/powerpoint/2010/main" val="2682491685"/>
+      </p:ext>
+    </p:extLst>
+  </p:cSld>
+  <p:clrMapOvr>
+    <a:masterClrMapping/>
+  </p:clrMapOvr>
+  <p:transition spd="med"/>
+</p:sld>
+</file>
+
+<file path=ppt/slides/slide7.xml><?xml version="1.0" encoding="utf-8"?>
+<p:sld xmlns:a="http://schemas.openxmlformats.org/drawingml/2006/main" xmlns:r="http://schemas.openxmlformats.org/officeDocument/2006/relationships" xmlns:p="http://schemas.openxmlformats.org/presentationml/2006/main">
+  <p:cSld>
+    <p:spTree>
+      <p:nvGrpSpPr>
+        <p:cNvPr id="1" name=""/>
+        <p:cNvGrpSpPr/>
+        <p:nvPr/>
+      </p:nvGrpSpPr>
+      <p:grpSpPr>
+        <a:xfrm>
+          <a:off x="0" y="0"/>
+          <a:ext cx="0" cy="0"/>
+          <a:chOff x="0" y="0"/>
+          <a:chExt cx="0" cy="0"/>
+        </a:xfrm>
+      </p:grpSpPr>
+      <p:sp>
+        <p:nvSpPr>
+          <p:cNvPr id="2" name="Text Placeholder 1">
+            <a:extLst>
+              <a:ext uri="{FF2B5EF4-FFF2-40B4-BE49-F238E27FC236}">
+                <a16:creationId xmlns:a16="http://schemas.microsoft.com/office/drawing/2014/main" id="{DDF92F08-23B2-CF92-23C8-BA44DE075FF0}"/>
+              </a:ext>
+            </a:extLst>
+          </p:cNvPr>
+          <p:cNvSpPr>
+            <a:spLocks noGrp="1"/>
+          </p:cNvSpPr>
+          <p:nvPr>
+            <p:ph type="body" sz="quarter" idx="11"/>
+          </p:nvPr>
+        </p:nvSpPr>
+        <p:spPr/>
+        <p:txBody>
+          <a:bodyPr/>
+          <a:lstStyle/>
+          <a:p>
+            <a:r>
+              <a:rPr lang="en-US" dirty="0"/>
+              <a:t>operator() is key to device selection</a:t>
+            </a:r>
+          </a:p>
+          <a:p>
+            <a:pPr lvl="1"/>
+            <a:r>
+              <a:rPr lang="en-US" dirty="0"/>
+              <a:t>Runs on each available device</a:t>
+            </a:r>
+          </a:p>
+          <a:p>
+            <a:pPr lvl="1"/>
+            <a:r>
+              <a:rPr lang="en-US" dirty="0"/>
+              <a:t>Returns an integer score for each device</a:t>
+            </a:r>
+          </a:p>
+          <a:p>
+            <a:pPr lvl="2"/>
+            <a:r>
+              <a:rPr lang="en-US" dirty="0"/>
+              <a:t>Device which returns highest score is selected</a:t>
+            </a:r>
+          </a:p>
+          <a:p>
+            <a:pPr lvl="2"/>
+            <a:r>
+              <a:rPr lang="en-US" dirty="0"/>
+              <a:t>Devices which return negative scores will never be selected</a:t>
+            </a:r>
+          </a:p>
+          <a:p>
+            <a:r>
+              <a:rPr lang="en-US" dirty="0"/>
+              <a:t>User is free to define any logic for scoring</a:t>
+            </a:r>
+          </a:p>
+          <a:p>
+            <a:pPr lvl="1"/>
+            <a:r>
+              <a:rPr lang="en-US" dirty="0"/>
+              <a:t>Allows for arbitrarily complex device selection logic</a:t>
+            </a:r>
+          </a:p>
+          <a:p>
+            <a:pPr lvl="1"/>
+            <a:r>
+              <a:rPr lang="en-US" dirty="0"/>
+              <a:t>In simple cases, selecting based on device name or vendor is sufficient</a:t>
+            </a:r>
+          </a:p>
+          <a:p>
+            <a:pPr lvl="1"/>
+            <a:endParaRPr lang="en-US" dirty="0"/>
+          </a:p>
+        </p:txBody>
+      </p:sp>
+      <p:sp>
+        <p:nvSpPr>
+          <p:cNvPr id="3" name="Title 2">
+            <a:extLst>
+              <a:ext uri="{FF2B5EF4-FFF2-40B4-BE49-F238E27FC236}">
+                <a16:creationId xmlns:a16="http://schemas.microsoft.com/office/drawing/2014/main" id="{5F41B62B-C379-7ADA-E458-B4786D2E87F4}"/>
+              </a:ext>
+            </a:extLst>
+          </p:cNvPr>
+          <p:cNvSpPr>
+            <a:spLocks noGrp="1"/>
+          </p:cNvSpPr>
+          <p:nvPr>
+            <p:ph type="title"/>
+          </p:nvPr>
+        </p:nvSpPr>
+        <p:spPr/>
+        <p:txBody>
+          <a:bodyPr/>
+          <a:lstStyle/>
+          <a:p>
+            <a:r>
+              <a:rPr lang="en-US" sz="4000" dirty="0"/>
+              <a:t>Custom Device Selection</a:t>
+            </a:r>
+          </a:p>
+        </p:txBody>
+      </p:sp>
+    </p:spTree>
+    <p:extLst>
+      <p:ext uri="{BB962C8B-B14F-4D97-AF65-F5344CB8AC3E}">
+        <p14:creationId xmlns:p14="http://schemas.microsoft.com/office/powerpoint/2010/main" val="16247701"/>
+      </p:ext>
+    </p:extLst>
+  </p:cSld>
+  <p:clrMapOvr>
+    <a:masterClrMapping/>
+  </p:clrMapOvr>
+  <p:transition spd="med"/>
+</p:sld>
+</file>
+
+<file path=ppt/slides/slide8.xml><?xml version="1.0" encoding="utf-8"?>
+<p:sld xmlns:a="http://schemas.openxmlformats.org/drawingml/2006/main" xmlns:r="http://schemas.openxmlformats.org/officeDocument/2006/relationships" xmlns:p="http://schemas.openxmlformats.org/presentationml/2006/main">
+  <p:cSld>
+    <p:spTree>
+      <p:nvGrpSpPr>
+        <p:cNvPr id="1" name=""/>
+        <p:cNvGrpSpPr/>
+        <p:nvPr/>
+      </p:nvGrpSpPr>
+      <p:grpSpPr>
+        <a:xfrm>
+          <a:off x="0" y="0"/>
+          <a:ext cx="0" cy="0"/>
+          <a:chOff x="0" y="0"/>
+          <a:chExt cx="0" cy="0"/>
+        </a:xfrm>
+      </p:grpSpPr>
+      <p:sp>
+        <p:nvSpPr>
+          <p:cNvPr id="2" name="Text Placeholder 1">
+            <a:extLst>
+              <a:ext uri="{FF2B5EF4-FFF2-40B4-BE49-F238E27FC236}">
+                <a16:creationId xmlns:a16="http://schemas.microsoft.com/office/drawing/2014/main" id="{8125CE29-810F-B059-3558-301534123DD1}"/>
+              </a:ext>
+            </a:extLst>
+          </p:cNvPr>
+          <p:cNvSpPr>
+            <a:spLocks noGrp="1"/>
+          </p:cNvSpPr>
+          <p:nvPr>
+            <p:ph type="body" sz="quarter" idx="11"/>
+          </p:nvPr>
+        </p:nvSpPr>
+        <p:spPr/>
+        <p:txBody>
+          <a:bodyPr/>
+          <a:lstStyle/>
+          <a:p>
+            <a:pPr marL="55397" indent="0">
+              <a:buNone/>
+            </a:pPr>
+            <a:r>
+              <a:rPr lang="en-US" sz="2000" dirty="0">
+                <a:solidFill>
+                  <a:schemeClr val="accent1"/>
+                </a:solidFill>
+              </a:rPr>
+              <a:t>class</a:t>
+            </a:r>
+            <a:r>
+              <a:rPr lang="en-US" sz="2000" dirty="0"/>
+              <a:t> </a:t>
+            </a:r>
+            <a:r>
+              <a:rPr lang="en-US" sz="2000" dirty="0" err="1"/>
+              <a:t>my_selector</a:t>
+            </a:r>
+            <a:r>
+              <a:rPr lang="en-US" sz="2000" dirty="0"/>
+              <a:t> : public </a:t>
+            </a:r>
+            <a:r>
+              <a:rPr lang="en-US" sz="2000" dirty="0" err="1"/>
+              <a:t>device_selector</a:t>
+            </a:r>
+            <a:r>
+              <a:rPr lang="en-US" sz="2000" dirty="0"/>
+              <a:t> {</a:t>
+            </a:r>
+          </a:p>
+          <a:p>
+            <a:pPr marL="55397" indent="0">
+              <a:buNone/>
+            </a:pPr>
+            <a:r>
+              <a:rPr lang="en-US" sz="2000" dirty="0"/>
+              <a:t>	public:</a:t>
+            </a:r>
+          </a:p>
+          <a:p>
+            <a:pPr marL="55397" indent="0">
+              <a:buNone/>
+            </a:pPr>
+            <a:r>
+              <a:rPr lang="en-US" sz="2000" dirty="0"/>
+              <a:t>	</a:t>
+            </a:r>
+            <a:r>
+              <a:rPr lang="en-US" sz="2000" dirty="0">
+                <a:solidFill>
+                  <a:schemeClr val="accent1"/>
+                </a:solidFill>
+              </a:rPr>
+              <a:t>int</a:t>
+            </a:r>
+            <a:r>
+              <a:rPr lang="en-US" sz="2000" dirty="0"/>
+              <a:t> operator()(</a:t>
+            </a:r>
+            <a:r>
+              <a:rPr lang="en-US" sz="2000" dirty="0">
+                <a:solidFill>
+                  <a:schemeClr val="accent1"/>
+                </a:solidFill>
+              </a:rPr>
+              <a:t>const</a:t>
+            </a:r>
+            <a:r>
+              <a:rPr lang="en-US" sz="2000" dirty="0"/>
+              <a:t> device &amp;dev) </a:t>
+            </a:r>
+            <a:r>
+              <a:rPr lang="en-US" sz="2000" dirty="0">
+                <a:solidFill>
+                  <a:schemeClr val="accent1"/>
+                </a:solidFill>
+              </a:rPr>
+              <a:t>const</a:t>
+            </a:r>
+            <a:r>
+              <a:rPr lang="en-US" sz="2000" dirty="0"/>
+              <a:t> override {</a:t>
+            </a:r>
+          </a:p>
+          <a:p>
+            <a:pPr marL="55397" indent="0">
+              <a:buNone/>
+            </a:pPr>
+            <a:r>
+              <a:rPr lang="en-US" sz="2000" dirty="0"/>
+              <a:t>		</a:t>
+            </a:r>
+            <a:r>
+              <a:rPr lang="en-US" sz="2000" dirty="0">
+                <a:solidFill>
+                  <a:schemeClr val="accent1"/>
+                </a:solidFill>
+              </a:rPr>
+              <a:t>if</a:t>
+            </a:r>
+            <a:r>
+              <a:rPr lang="en-US" sz="2000" dirty="0"/>
+              <a:t> (</a:t>
+            </a:r>
+          </a:p>
+          <a:p>
+            <a:pPr marL="55397" indent="0">
+              <a:buNone/>
+            </a:pPr>
+            <a:r>
+              <a:rPr lang="en-US" sz="2000" dirty="0"/>
+              <a:t>		</a:t>
+            </a:r>
+            <a:r>
+              <a:rPr lang="en-US" sz="2000" dirty="0" err="1"/>
+              <a:t>dev.get_info</a:t>
+            </a:r>
+            <a:r>
+              <a:rPr lang="en-US" sz="2000" dirty="0"/>
+              <a:t>&lt;info::device::name&gt;().find("</a:t>
+            </a:r>
+            <a:r>
+              <a:rPr lang="en-US" sz="2000" dirty="0" err="1"/>
+              <a:t>Arria</a:t>
+            </a:r>
+            <a:r>
+              <a:rPr lang="en-US" sz="2000" dirty="0"/>
+              <a:t>") != std::string::</a:t>
+            </a:r>
+            <a:r>
+              <a:rPr lang="en-US" sz="2000" dirty="0" err="1"/>
+              <a:t>npos</a:t>
+            </a:r>
+            <a:r>
+              <a:rPr lang="en-US" sz="2000" dirty="0"/>
+              <a:t> &amp;&amp;</a:t>
+            </a:r>
+          </a:p>
+          <a:p>
+            <a:pPr marL="55397" indent="0">
+              <a:buNone/>
+            </a:pPr>
+            <a:r>
+              <a:rPr lang="en-US" sz="2000" dirty="0"/>
+              <a:t>		</a:t>
+            </a:r>
+            <a:r>
+              <a:rPr lang="en-US" sz="2000" dirty="0" err="1"/>
+              <a:t>dev.get_info</a:t>
+            </a:r>
+            <a:r>
+              <a:rPr lang="en-US" sz="2000" dirty="0"/>
+              <a:t>&lt;info::device::vendor&gt;().find("Intel") != std::string::</a:t>
+            </a:r>
+            <a:r>
+              <a:rPr lang="en-US" sz="2000" dirty="0" err="1"/>
+              <a:t>npos</a:t>
+            </a:r>
+            <a:r>
+              <a:rPr lang="en-US" sz="2000" dirty="0"/>
+              <a:t>) {</a:t>
+            </a:r>
+          </a:p>
+          <a:p>
+            <a:pPr marL="55397" indent="0">
+              <a:buNone/>
+            </a:pPr>
+            <a:r>
+              <a:rPr lang="en-US" sz="2000" dirty="0"/>
+              <a:t>			</a:t>
+            </a:r>
+            <a:r>
+              <a:rPr lang="en-US" sz="2000" dirty="0">
+                <a:solidFill>
+                  <a:schemeClr val="accent1"/>
+                </a:solidFill>
+              </a:rPr>
+              <a:t>return</a:t>
+            </a:r>
+            <a:r>
+              <a:rPr lang="en-US" sz="2000" dirty="0"/>
+              <a:t> 1;</a:t>
+            </a:r>
+          </a:p>
+          <a:p>
+            <a:pPr marL="55397" indent="0">
+              <a:buNone/>
+            </a:pPr>
+            <a:r>
+              <a:rPr lang="en-US" sz="2000" dirty="0"/>
+              <a:t>		}</a:t>
+            </a:r>
+          </a:p>
+          <a:p>
+            <a:pPr marL="55397" indent="0">
+              <a:buNone/>
+            </a:pPr>
+            <a:r>
+              <a:rPr lang="en-US" sz="2000" dirty="0"/>
+              <a:t>		</a:t>
+            </a:r>
+            <a:r>
+              <a:rPr lang="en-US" sz="2000" dirty="0">
+                <a:solidFill>
+                  <a:schemeClr val="accent1"/>
+                </a:solidFill>
+              </a:rPr>
+              <a:t>return</a:t>
+            </a:r>
+            <a:r>
+              <a:rPr lang="en-US" sz="2000" dirty="0"/>
+              <a:t> -1;</a:t>
+            </a:r>
+          </a:p>
+          <a:p>
+            <a:pPr marL="55397" indent="0">
+              <a:buNone/>
+            </a:pPr>
+            <a:r>
+              <a:rPr lang="en-US" sz="2000" dirty="0"/>
+              <a:t>	}</a:t>
+            </a:r>
+          </a:p>
+          <a:p>
+            <a:pPr marL="55397" indent="0">
+              <a:buNone/>
+            </a:pPr>
+            <a:r>
+              <a:rPr lang="en-US" sz="2000" dirty="0"/>
+              <a:t>};</a:t>
+            </a:r>
+          </a:p>
+          <a:p>
+            <a:pPr marL="55397" indent="0">
+              <a:buNone/>
+            </a:pPr>
+            <a:endParaRPr lang="en-US" sz="2000" i="1" dirty="0"/>
+          </a:p>
+          <a:p>
+            <a:pPr marL="55397" indent="0">
+              <a:buNone/>
+            </a:pPr>
+            <a:r>
+              <a:rPr lang="en-US" sz="2000" i="1" dirty="0"/>
+              <a:t>Source: Data Parallel C++, James Reinders et al. pp. 72</a:t>
+            </a:r>
+          </a:p>
+        </p:txBody>
+      </p:sp>
+      <p:sp>
+        <p:nvSpPr>
+          <p:cNvPr id="3" name="Title 2">
+            <a:extLst>
+              <a:ext uri="{FF2B5EF4-FFF2-40B4-BE49-F238E27FC236}">
+                <a16:creationId xmlns:a16="http://schemas.microsoft.com/office/drawing/2014/main" id="{6FAB9D38-4349-2077-9ED8-B67A9FB7CEBB}"/>
+              </a:ext>
+            </a:extLst>
+          </p:cNvPr>
+          <p:cNvSpPr>
+            <a:spLocks noGrp="1"/>
+          </p:cNvSpPr>
+          <p:nvPr>
+            <p:ph type="title"/>
+          </p:nvPr>
+        </p:nvSpPr>
+        <p:spPr/>
+        <p:txBody>
+          <a:bodyPr/>
+          <a:lstStyle/>
+          <a:p>
+            <a:r>
+              <a:rPr lang="en-US" sz="4000" dirty="0"/>
+              <a:t>Custom Device Selection Example</a:t>
+            </a:r>
+          </a:p>
+        </p:txBody>
+      </p:sp>
+    </p:spTree>
+    <p:extLst>
+      <p:ext uri="{BB962C8B-B14F-4D97-AF65-F5344CB8AC3E}">
+        <p14:creationId xmlns:p14="http://schemas.microsoft.com/office/powerpoint/2010/main" val="484224936"/>
+      </p:ext>
+    </p:extLst>
+  </p:cSld>
+  <p:clrMapOvr>
+    <a:masterClrMapping/>
+  </p:clrMapOvr>
+  <p:transition spd="med"/>
+</p:sld>
+</file>
+
 <file path=ppt/tags/tag1.xml><?xml version="1.0" encoding="utf-8"?>
 <p:tagLst xmlns:a="http://schemas.openxmlformats.org/drawingml/2006/main" xmlns:r="http://schemas.openxmlformats.org/officeDocument/2006/relationships" xmlns:p="http://schemas.openxmlformats.org/presentationml/2006/main">
   <p:tag name="TIMING" val="|71.9|107.7"/>
@@ -17447,18 +18457,18 @@
 </file>
 
 <file path=customXml/item2.xml><?xml version="1.0" encoding="utf-8"?>
-<p:properties xmlns:p="http://schemas.microsoft.com/office/2006/metadata/properties" xmlns:xsi="http://www.w3.org/2001/XMLSchema-instance" xmlns:pc="http://schemas.microsoft.com/office/infopath/2007/PartnerControls">
-  <documentManagement/>
-</p:properties>
-</file>
-
-<file path=customXml/item3.xml><?xml version="1.0" encoding="utf-8"?>
 <?mso-contentType ?>
 <FormTemplates xmlns="http://schemas.microsoft.com/sharepoint/v3/contenttype/forms">
   <Display>DocumentLibraryForm</Display>
   <Edit>DocumentLibraryForm</Edit>
   <New>DocumentLibraryForm</New>
 </FormTemplates>
+</file>
+
+<file path=customXml/item3.xml><?xml version="1.0" encoding="utf-8"?>
+<p:properties xmlns:p="http://schemas.microsoft.com/office/2006/metadata/properties" xmlns:xsi="http://www.w3.org/2001/XMLSchema-instance" xmlns:pc="http://schemas.microsoft.com/office/infopath/2007/PartnerControls">
+  <documentManagement/>
+</p:properties>
 </file>
 
 <file path=customXml/itemProps1.xml><?xml version="1.0" encoding="utf-8"?>
@@ -17480,6 +18490,14 @@
 </file>
 
 <file path=customXml/itemProps2.xml><?xml version="1.0" encoding="utf-8"?>
+<ds:datastoreItem xmlns:ds="http://schemas.openxmlformats.org/officeDocument/2006/customXml" ds:itemID="{39D54C70-8A1F-433D-B3DF-B7287D9E1633}">
+  <ds:schemaRefs>
+    <ds:schemaRef ds:uri="http://schemas.microsoft.com/sharepoint/v3/contenttype/forms"/>
+  </ds:schemaRefs>
+</ds:datastoreItem>
+</file>
+
+<file path=customXml/itemProps3.xml><?xml version="1.0" encoding="utf-8"?>
 <ds:datastoreItem xmlns:ds="http://schemas.openxmlformats.org/officeDocument/2006/customXml" ds:itemID="{796C1367-8D37-49A1-BF4B-2E9150DA2B52}">
   <ds:schemaRefs>
     <ds:schemaRef ds:uri="http://purl.org/dc/dcmitype/"/>
@@ -17493,12 +18511,4 @@
     <ds:schemaRef ds:uri="63fc63a6-18cf-4814-8dee-b8d6616a2bda"/>
   </ds:schemaRefs>
 </ds:datastoreItem>
-</file>
-
-<file path=customXml/itemProps3.xml><?xml version="1.0" encoding="utf-8"?>
-<ds:datastoreItem xmlns:ds="http://schemas.openxmlformats.org/officeDocument/2006/customXml" ds:itemID="{39D54C70-8A1F-433D-B3DF-B7287D9E1633}">
-  <ds:schemaRefs>
-    <ds:schemaRef ds:uri="http://schemas.microsoft.com/sharepoint/v3/contenttype/forms"/>
-  </ds:schemaRefs>
-</ds:datastoreItem>
 </file>
</xml_diff>

<commit_message>
Data management, USM, Buffers
</commit_message>
<xml_diff>
--- a/Slides/SYCL intro.pptx
+++ b/Slides/SYCL intro.pptx
@@ -7,7 +7,7 @@
     <p:sldMasterId id="2147483676" r:id="rId6"/>
   </p:sldMasterIdLst>
   <p:notesMasterIdLst>
-    <p:notesMasterId r:id="rId15"/>
+    <p:notesMasterId r:id="rId22"/>
   </p:notesMasterIdLst>
   <p:sldIdLst>
     <p:sldId id="321" r:id="rId7"/>
@@ -18,6 +18,13 @@
     <p:sldId id="354" r:id="rId12"/>
     <p:sldId id="355" r:id="rId13"/>
     <p:sldId id="356" r:id="rId14"/>
+    <p:sldId id="357" r:id="rId15"/>
+    <p:sldId id="358" r:id="rId16"/>
+    <p:sldId id="359" r:id="rId17"/>
+    <p:sldId id="360" r:id="rId18"/>
+    <p:sldId id="361" r:id="rId19"/>
+    <p:sldId id="362" r:id="rId20"/>
+    <p:sldId id="363" r:id="rId21"/>
   </p:sldIdLst>
   <p:sldSz cx="12192000" cy="6858000"/>
   <p:notesSz cx="6858000" cy="9144000"/>
@@ -108,6 +115,13 @@
             <p14:sldId id="354"/>
             <p14:sldId id="355"/>
             <p14:sldId id="356"/>
+            <p14:sldId id="357"/>
+            <p14:sldId id="358"/>
+            <p14:sldId id="359"/>
+            <p14:sldId id="360"/>
+            <p14:sldId id="361"/>
+            <p14:sldId id="362"/>
+            <p14:sldId id="363"/>
           </p14:sldIdLst>
         </p14:section>
       </p14:sectionLst>
@@ -5939,7 +5953,7 @@
           </a:ln>
           <a:extLst>
             <a:ext uri="{C572A759-6A51-4108-AA02-DFA0A04FC94B}">
-              <ma14:wrappingTextBoxFlag xmlns="" xmlns:ma14="http://schemas.microsoft.com/office/mac/drawingml/2011/main" val="1"/>
+              <ma14:wrappingTextBoxFlag xmlns:ma14="http://schemas.microsoft.com/office/mac/drawingml/2011/main" xmlns="" val="1"/>
             </a:ext>
           </a:extLst>
         </p:spPr>
@@ -6146,7 +6160,7 @@
           </a:ln>
           <a:extLst>
             <a:ext uri="{C572A759-6A51-4108-AA02-DFA0A04FC94B}">
-              <ma14:wrappingTextBoxFlag xmlns="" xmlns:ma14="http://schemas.microsoft.com/office/mac/drawingml/2011/main" val="1"/>
+              <ma14:wrappingTextBoxFlag xmlns:ma14="http://schemas.microsoft.com/office/mac/drawingml/2011/main" xmlns="" val="1"/>
             </a:ext>
           </a:extLst>
         </p:spPr>
@@ -7045,7 +7059,7 @@
           </a:ln>
           <a:extLst>
             <a:ext uri="{C572A759-6A51-4108-AA02-DFA0A04FC94B}">
-              <ma14:wrappingTextBoxFlag xmlns="" xmlns:ma14="http://schemas.microsoft.com/office/mac/drawingml/2011/main" val="1"/>
+              <ma14:wrappingTextBoxFlag xmlns:ma14="http://schemas.microsoft.com/office/mac/drawingml/2011/main" xmlns="" val="1"/>
             </a:ext>
           </a:extLst>
         </p:spPr>
@@ -7880,7 +7894,7 @@
           </a:ln>
           <a:extLst>
             <a:ext uri="{C572A759-6A51-4108-AA02-DFA0A04FC94B}">
-              <ma14:wrappingTextBoxFlag xmlns="" xmlns:ma14="http://schemas.microsoft.com/office/mac/drawingml/2011/main" val="1"/>
+              <ma14:wrappingTextBoxFlag xmlns:ma14="http://schemas.microsoft.com/office/mac/drawingml/2011/main" xmlns="" val="1"/>
             </a:ext>
           </a:extLst>
         </p:spPr>
@@ -12235,6 +12249,1334 @@
 </p:sld>
 </file>
 
+<file path=ppt/slides/slide10.xml><?xml version="1.0" encoding="utf-8"?>
+<p:sld xmlns:a="http://schemas.openxmlformats.org/drawingml/2006/main" xmlns:r="http://schemas.openxmlformats.org/officeDocument/2006/relationships" xmlns:p="http://schemas.openxmlformats.org/presentationml/2006/main">
+  <p:cSld>
+    <p:spTree>
+      <p:nvGrpSpPr>
+        <p:cNvPr id="1" name=""/>
+        <p:cNvGrpSpPr/>
+        <p:nvPr/>
+      </p:nvGrpSpPr>
+      <p:grpSpPr>
+        <a:xfrm>
+          <a:off x="0" y="0"/>
+          <a:ext cx="0" cy="0"/>
+          <a:chOff x="0" y="0"/>
+          <a:chExt cx="0" cy="0"/>
+        </a:xfrm>
+      </p:grpSpPr>
+      <p:sp>
+        <p:nvSpPr>
+          <p:cNvPr id="2" name="Text Placeholder 1">
+            <a:extLst>
+              <a:ext uri="{FF2B5EF4-FFF2-40B4-BE49-F238E27FC236}">
+                <a16:creationId xmlns:a16="http://schemas.microsoft.com/office/drawing/2014/main" id="{71DE8418-632F-2354-801D-974AEB04AD4A}"/>
+              </a:ext>
+            </a:extLst>
+          </p:cNvPr>
+          <p:cNvSpPr>
+            <a:spLocks noGrp="1"/>
+          </p:cNvSpPr>
+          <p:nvPr>
+            <p:ph type="body" sz="quarter" idx="11"/>
+          </p:nvPr>
+        </p:nvSpPr>
+        <p:spPr/>
+        <p:txBody>
+          <a:bodyPr/>
+          <a:lstStyle/>
+          <a:p>
+            <a:pPr marL="55397" indent="0">
+              <a:buNone/>
+            </a:pPr>
+            <a:r>
+              <a:rPr lang="en-GB" sz="2000" dirty="0" err="1">
+                <a:solidFill>
+                  <a:srgbClr val="000000"/>
+                </a:solidFill>
+              </a:rPr>
+              <a:t>Q.submit</a:t>
+            </a:r>
+            <a:r>
+              <a:rPr lang="en-GB" sz="2000" dirty="0">
+                <a:solidFill>
+                  <a:srgbClr val="000000"/>
+                </a:solidFill>
+              </a:rPr>
+              <a:t>([&amp;](handler&amp; h) {		</a:t>
+            </a:r>
+            <a:r>
+              <a:rPr lang="en-GB" sz="2000" dirty="0">
+                <a:solidFill>
+                  <a:srgbClr val="008000"/>
+                </a:solidFill>
+              </a:rPr>
+              <a:t>// function called on host</a:t>
+            </a:r>
+            <a:endParaRPr lang="en-GB" sz="2000" dirty="0">
+              <a:solidFill>
+                <a:srgbClr val="000000"/>
+              </a:solidFill>
+            </a:endParaRPr>
+          </a:p>
+          <a:p>
+            <a:pPr marL="55397" indent="0">
+              <a:buNone/>
+            </a:pPr>
+            <a:r>
+              <a:rPr lang="en-GB" sz="2000" dirty="0">
+                <a:solidFill>
+                  <a:srgbClr val="000000"/>
+                </a:solidFill>
+              </a:rPr>
+              <a:t>	accessor </a:t>
+            </a:r>
+            <a:r>
+              <a:rPr lang="en-GB" sz="2000" dirty="0" err="1">
+                <a:solidFill>
+                  <a:srgbClr val="000000"/>
+                </a:solidFill>
+              </a:rPr>
+              <a:t>acc</a:t>
+            </a:r>
+            <a:r>
+              <a:rPr lang="en-GB" sz="2000" dirty="0">
+                <a:solidFill>
+                  <a:srgbClr val="000000"/>
+                </a:solidFill>
+              </a:rPr>
+              <a:t>{ B, h };			</a:t>
+            </a:r>
+            <a:r>
+              <a:rPr lang="en-GB" sz="2000" dirty="0">
+                <a:solidFill>
+                  <a:srgbClr val="008000"/>
+                </a:solidFill>
+              </a:rPr>
+              <a:t>// host code defining accessor, setting up dependencies</a:t>
+            </a:r>
+            <a:endParaRPr lang="en-GB" sz="2000" dirty="0">
+              <a:solidFill>
+                <a:srgbClr val="000000"/>
+              </a:solidFill>
+            </a:endParaRPr>
+          </a:p>
+          <a:p>
+            <a:pPr marL="55397" indent="0">
+              <a:buNone/>
+            </a:pPr>
+            <a:r>
+              <a:rPr lang="en-US" sz="2000" dirty="0">
+                <a:solidFill>
+                  <a:srgbClr val="000000"/>
+                </a:solidFill>
+              </a:rPr>
+              <a:t>	</a:t>
+            </a:r>
+            <a:r>
+              <a:rPr lang="en-GB" sz="2000" dirty="0" err="1">
+                <a:solidFill>
+                  <a:srgbClr val="000000"/>
+                </a:solidFill>
+              </a:rPr>
+              <a:t>h.parallel_for</a:t>
+            </a:r>
+            <a:r>
+              <a:rPr lang="en-GB" sz="2000" dirty="0">
+                <a:solidFill>
+                  <a:srgbClr val="000000"/>
+                </a:solidFill>
+              </a:rPr>
+              <a:t>(size, [=](</a:t>
+            </a:r>
+            <a:r>
+              <a:rPr lang="en-GB" sz="2000" dirty="0">
+                <a:solidFill>
+                  <a:srgbClr val="0000FF"/>
+                </a:solidFill>
+              </a:rPr>
+              <a:t>auto</a:t>
+            </a:r>
+            <a:r>
+              <a:rPr lang="en-GB" sz="2000" dirty="0">
+                <a:solidFill>
+                  <a:srgbClr val="000000"/>
+                </a:solidFill>
+              </a:rPr>
+              <a:t>&amp; </a:t>
+            </a:r>
+            <a:r>
+              <a:rPr lang="en-GB" sz="2000" dirty="0" err="1">
+                <a:solidFill>
+                  <a:srgbClr val="000000"/>
+                </a:solidFill>
+              </a:rPr>
+              <a:t>idx</a:t>
+            </a:r>
+            <a:r>
+              <a:rPr lang="en-GB" sz="2000" dirty="0">
+                <a:solidFill>
+                  <a:srgbClr val="000000"/>
+                </a:solidFill>
+              </a:rPr>
+              <a:t>) {</a:t>
+            </a:r>
+          </a:p>
+          <a:p>
+            <a:pPr marL="55397" indent="0">
+              <a:buNone/>
+            </a:pPr>
+            <a:r>
+              <a:rPr lang="en-GB" sz="2000" dirty="0">
+                <a:solidFill>
+                  <a:srgbClr val="000000"/>
+                </a:solidFill>
+              </a:rPr>
+              <a:t>		</a:t>
+            </a:r>
+            <a:r>
+              <a:rPr lang="en-GB" sz="2000" dirty="0" err="1">
+                <a:solidFill>
+                  <a:srgbClr val="000000"/>
+                </a:solidFill>
+              </a:rPr>
+              <a:t>acc</a:t>
+            </a:r>
+            <a:r>
+              <a:rPr lang="en-GB" sz="2000" dirty="0">
+                <a:solidFill>
+                  <a:srgbClr val="000000"/>
+                </a:solidFill>
+              </a:rPr>
+              <a:t>[</a:t>
+            </a:r>
+            <a:r>
+              <a:rPr lang="en-GB" sz="2000" dirty="0" err="1">
+                <a:solidFill>
+                  <a:srgbClr val="000000"/>
+                </a:solidFill>
+              </a:rPr>
+              <a:t>idx</a:t>
+            </a:r>
+            <a:r>
+              <a:rPr lang="en-GB" sz="2000" dirty="0">
+                <a:solidFill>
+                  <a:srgbClr val="000000"/>
+                </a:solidFill>
+              </a:rPr>
+              <a:t>] = </a:t>
+            </a:r>
+            <a:r>
+              <a:rPr lang="en-GB" sz="2000" dirty="0" err="1">
+                <a:solidFill>
+                  <a:srgbClr val="000000"/>
+                </a:solidFill>
+              </a:rPr>
+              <a:t>idx</a:t>
+            </a:r>
+            <a:r>
+              <a:rPr lang="en-GB" sz="2000" dirty="0">
+                <a:solidFill>
+                  <a:srgbClr val="000000"/>
+                </a:solidFill>
+              </a:rPr>
+              <a:t>;				</a:t>
+            </a:r>
+            <a:r>
+              <a:rPr lang="en-GB" sz="2000" dirty="0">
+                <a:solidFill>
+                  <a:srgbClr val="008000"/>
+                </a:solidFill>
+              </a:rPr>
+              <a:t>// Device code to be run when runtime dependencies are met</a:t>
+            </a:r>
+            <a:endParaRPr lang="en-GB" sz="2000" dirty="0">
+              <a:solidFill>
+                <a:srgbClr val="000000"/>
+              </a:solidFill>
+            </a:endParaRPr>
+          </a:p>
+          <a:p>
+            <a:pPr marL="55397" indent="0">
+              <a:buNone/>
+            </a:pPr>
+            <a:r>
+              <a:rPr lang="en-US" sz="2000" dirty="0">
+                <a:solidFill>
+                  <a:srgbClr val="000000"/>
+                </a:solidFill>
+              </a:rPr>
+              <a:t>	});</a:t>
+            </a:r>
+          </a:p>
+          <a:p>
+            <a:pPr marL="55397" indent="0">
+              <a:buNone/>
+            </a:pPr>
+            <a:r>
+              <a:rPr lang="en-US" sz="2000" dirty="0">
+                <a:solidFill>
+                  <a:srgbClr val="000000"/>
+                </a:solidFill>
+              </a:rPr>
+              <a:t>});</a:t>
+            </a:r>
+          </a:p>
+          <a:p>
+            <a:pPr marL="55397" indent="0">
+              <a:buNone/>
+            </a:pPr>
+            <a:endParaRPr lang="en-US" sz="2000" dirty="0">
+              <a:solidFill>
+                <a:srgbClr val="000000"/>
+              </a:solidFill>
+            </a:endParaRPr>
+          </a:p>
+          <a:p>
+            <a:pPr marL="55397" indent="0">
+              <a:buNone/>
+            </a:pPr>
+            <a:endParaRPr lang="en-US" sz="2000" dirty="0">
+              <a:solidFill>
+                <a:srgbClr val="000000"/>
+              </a:solidFill>
+            </a:endParaRPr>
+          </a:p>
+          <a:p>
+            <a:pPr marL="55397" indent="0">
+              <a:buNone/>
+            </a:pPr>
+            <a:endParaRPr lang="en-US" sz="2000" dirty="0">
+              <a:solidFill>
+                <a:srgbClr val="000000"/>
+              </a:solidFill>
+            </a:endParaRPr>
+          </a:p>
+          <a:p>
+            <a:pPr marL="55397" indent="0">
+              <a:buNone/>
+            </a:pPr>
+            <a:endParaRPr lang="en-US" sz="2000" dirty="0">
+              <a:solidFill>
+                <a:srgbClr val="000000"/>
+              </a:solidFill>
+            </a:endParaRPr>
+          </a:p>
+          <a:p>
+            <a:pPr marL="55397" indent="0">
+              <a:buNone/>
+            </a:pPr>
+            <a:endParaRPr lang="en-US" sz="2000" dirty="0">
+              <a:solidFill>
+                <a:srgbClr val="000000"/>
+              </a:solidFill>
+            </a:endParaRPr>
+          </a:p>
+          <a:p>
+            <a:pPr marL="55397" indent="0">
+              <a:buNone/>
+            </a:pPr>
+            <a:endParaRPr lang="en-US" sz="2000" dirty="0">
+              <a:solidFill>
+                <a:srgbClr val="000000"/>
+              </a:solidFill>
+            </a:endParaRPr>
+          </a:p>
+          <a:p>
+            <a:pPr marL="55397" indent="0">
+              <a:buNone/>
+            </a:pPr>
+            <a:r>
+              <a:rPr lang="en-US" sz="2000" i="1" dirty="0"/>
+              <a:t>Source: Data Parallel C++, James Reinders et al. pg. 27</a:t>
+            </a:r>
+          </a:p>
+          <a:p>
+            <a:pPr marL="55397" indent="0">
+              <a:buNone/>
+            </a:pPr>
+            <a:endParaRPr lang="en-US" sz="2000" dirty="0"/>
+          </a:p>
+        </p:txBody>
+      </p:sp>
+      <p:sp>
+        <p:nvSpPr>
+          <p:cNvPr id="3" name="Title 2">
+            <a:extLst>
+              <a:ext uri="{FF2B5EF4-FFF2-40B4-BE49-F238E27FC236}">
+                <a16:creationId xmlns:a16="http://schemas.microsoft.com/office/drawing/2014/main" id="{CFDE7D4A-1B7C-A57B-3028-9B6BE534194C}"/>
+              </a:ext>
+            </a:extLst>
+          </p:cNvPr>
+          <p:cNvSpPr>
+            <a:spLocks noGrp="1"/>
+          </p:cNvSpPr>
+          <p:nvPr>
+            <p:ph type="title"/>
+          </p:nvPr>
+        </p:nvSpPr>
+        <p:spPr/>
+        <p:txBody>
+          <a:bodyPr/>
+          <a:lstStyle/>
+          <a:p>
+            <a:r>
+              <a:rPr lang="en-US" sz="4000" dirty="0"/>
+              <a:t>Device Work Submission Example</a:t>
+            </a:r>
+          </a:p>
+        </p:txBody>
+      </p:sp>
+    </p:spTree>
+    <p:extLst>
+      <p:ext uri="{BB962C8B-B14F-4D97-AF65-F5344CB8AC3E}">
+        <p14:creationId xmlns:p14="http://schemas.microsoft.com/office/powerpoint/2010/main" val="825401750"/>
+      </p:ext>
+    </p:extLst>
+  </p:cSld>
+  <p:clrMapOvr>
+    <a:masterClrMapping/>
+  </p:clrMapOvr>
+  <p:transition spd="med"/>
+</p:sld>
+</file>
+
+<file path=ppt/slides/slide11.xml><?xml version="1.0" encoding="utf-8"?>
+<p:sld xmlns:a="http://schemas.openxmlformats.org/drawingml/2006/main" xmlns:r="http://schemas.openxmlformats.org/officeDocument/2006/relationships" xmlns:p="http://schemas.openxmlformats.org/presentationml/2006/main">
+  <p:cSld>
+    <p:spTree>
+      <p:nvGrpSpPr>
+        <p:cNvPr id="1" name=""/>
+        <p:cNvGrpSpPr/>
+        <p:nvPr/>
+      </p:nvGrpSpPr>
+      <p:grpSpPr>
+        <a:xfrm>
+          <a:off x="0" y="0"/>
+          <a:ext cx="0" cy="0"/>
+          <a:chOff x="0" y="0"/>
+          <a:chExt cx="0" cy="0"/>
+        </a:xfrm>
+      </p:grpSpPr>
+      <p:sp>
+        <p:nvSpPr>
+          <p:cNvPr id="2" name="Text Placeholder 1">
+            <a:extLst>
+              <a:ext uri="{FF2B5EF4-FFF2-40B4-BE49-F238E27FC236}">
+                <a16:creationId xmlns:a16="http://schemas.microsoft.com/office/drawing/2014/main" id="{AF0688D6-0E11-0E8A-EBEE-42D04AC1746A}"/>
+              </a:ext>
+            </a:extLst>
+          </p:cNvPr>
+          <p:cNvSpPr>
+            <a:spLocks noGrp="1"/>
+          </p:cNvSpPr>
+          <p:nvPr>
+            <p:ph type="body" sz="quarter" idx="11"/>
+          </p:nvPr>
+        </p:nvSpPr>
+        <p:spPr/>
+        <p:txBody>
+          <a:bodyPr/>
+          <a:lstStyle/>
+          <a:p>
+            <a:r>
+              <a:rPr lang="en-GB" sz="2000" dirty="0"/>
+              <a:t>Running heterogeneous computing systems efficiently requires careful handling of data</a:t>
+            </a:r>
+          </a:p>
+          <a:p>
+            <a:pPr lvl="1"/>
+            <a:r>
+              <a:rPr lang="en-GB" sz="1600" dirty="0"/>
+              <a:t>Data must be available for accelerator execution as promptly as possible as any idle time is wasted</a:t>
+            </a:r>
+          </a:p>
+          <a:p>
+            <a:r>
+              <a:rPr lang="en-GB" sz="2000" dirty="0"/>
+              <a:t>There are two methods for managing data in DPC++</a:t>
+            </a:r>
+          </a:p>
+          <a:p>
+            <a:pPr lvl="1"/>
+            <a:r>
+              <a:rPr lang="en-GB" sz="1600" dirty="0"/>
+              <a:t>Unified Shared Memory (USM)</a:t>
+            </a:r>
+          </a:p>
+          <a:p>
+            <a:pPr lvl="1"/>
+            <a:r>
+              <a:rPr lang="en-GB" sz="1600" dirty="0"/>
+              <a:t>Buffers</a:t>
+            </a:r>
+          </a:p>
+          <a:p>
+            <a:r>
+              <a:rPr lang="en-GB" sz="2000" dirty="0"/>
+              <a:t>Device code requires data as input and may output its own data</a:t>
+            </a:r>
+          </a:p>
+          <a:p>
+            <a:r>
+              <a:rPr lang="en-GB" sz="2000" dirty="0"/>
+              <a:t>Devices may have their own distinct memory which cannot be accessed by the host</a:t>
+            </a:r>
+          </a:p>
+          <a:p>
+            <a:pPr lvl="1"/>
+            <a:r>
+              <a:rPr lang="en-GB" sz="1600" dirty="0"/>
+              <a:t>Proper data management deals with the safe and efficient storage and movement of data between memory pools</a:t>
+            </a:r>
+          </a:p>
+          <a:p>
+            <a:r>
+              <a:rPr lang="en-GB" sz="2000" i="1" dirty="0"/>
+              <a:t>Remote Accesses</a:t>
+            </a:r>
+            <a:r>
+              <a:rPr lang="en-GB" sz="2000" dirty="0"/>
+              <a:t> are accesses to data in another device’s memory</a:t>
+            </a:r>
+          </a:p>
+          <a:p>
+            <a:pPr lvl="1"/>
+            <a:r>
+              <a:rPr lang="en-GB" sz="1600" dirty="0"/>
+              <a:t>Very slow</a:t>
+            </a:r>
+          </a:p>
+          <a:p>
+            <a:r>
+              <a:rPr lang="en-GB" sz="2000" i="1" dirty="0"/>
+              <a:t>Local Accesses</a:t>
+            </a:r>
+            <a:r>
+              <a:rPr lang="en-GB" sz="2000" dirty="0"/>
+              <a:t> are accesses to data in directly-attached memory</a:t>
+            </a:r>
+          </a:p>
+          <a:p>
+            <a:pPr lvl="1"/>
+            <a:r>
+              <a:rPr lang="en-GB" sz="1600" dirty="0"/>
+              <a:t>Much faster than remote accesses</a:t>
+            </a:r>
+          </a:p>
+          <a:p>
+            <a:pPr lvl="1"/>
+            <a:r>
+              <a:rPr lang="en-GB" sz="1600" dirty="0"/>
+              <a:t>It is desirable for a device to utilize local memory for computation</a:t>
+            </a:r>
+          </a:p>
+          <a:p>
+            <a:pPr lvl="2"/>
+            <a:r>
+              <a:rPr lang="en-GB" sz="1200" dirty="0"/>
+              <a:t>May require manual movement of data between memory pools to ensure data is in local scope</a:t>
+            </a:r>
+          </a:p>
+          <a:p>
+            <a:pPr lvl="1"/>
+            <a:endParaRPr lang="en-GB" sz="1600" i="1" dirty="0"/>
+          </a:p>
+        </p:txBody>
+      </p:sp>
+      <p:sp>
+        <p:nvSpPr>
+          <p:cNvPr id="3" name="Title 2">
+            <a:extLst>
+              <a:ext uri="{FF2B5EF4-FFF2-40B4-BE49-F238E27FC236}">
+                <a16:creationId xmlns:a16="http://schemas.microsoft.com/office/drawing/2014/main" id="{E5F46027-0F99-3A3B-D842-CDD910638A8D}"/>
+              </a:ext>
+            </a:extLst>
+          </p:cNvPr>
+          <p:cNvSpPr>
+            <a:spLocks noGrp="1"/>
+          </p:cNvSpPr>
+          <p:nvPr>
+            <p:ph type="title"/>
+          </p:nvPr>
+        </p:nvSpPr>
+        <p:spPr/>
+        <p:txBody>
+          <a:bodyPr/>
+          <a:lstStyle/>
+          <a:p>
+            <a:r>
+              <a:rPr lang="en-US" sz="4000" dirty="0"/>
+              <a:t>Data Management</a:t>
+            </a:r>
+          </a:p>
+        </p:txBody>
+      </p:sp>
+    </p:spTree>
+    <p:extLst>
+      <p:ext uri="{BB962C8B-B14F-4D97-AF65-F5344CB8AC3E}">
+        <p14:creationId xmlns:p14="http://schemas.microsoft.com/office/powerpoint/2010/main" val="4245748294"/>
+      </p:ext>
+    </p:extLst>
+  </p:cSld>
+  <p:clrMapOvr>
+    <a:masterClrMapping/>
+  </p:clrMapOvr>
+  <p:transition spd="med"/>
+</p:sld>
+</file>
+
+<file path=ppt/slides/slide12.xml><?xml version="1.0" encoding="utf-8"?>
+<p:sld xmlns:a="http://schemas.openxmlformats.org/drawingml/2006/main" xmlns:r="http://schemas.openxmlformats.org/officeDocument/2006/relationships" xmlns:p="http://schemas.openxmlformats.org/presentationml/2006/main">
+  <p:cSld>
+    <p:spTree>
+      <p:nvGrpSpPr>
+        <p:cNvPr id="1" name=""/>
+        <p:cNvGrpSpPr/>
+        <p:nvPr/>
+      </p:nvGrpSpPr>
+      <p:grpSpPr>
+        <a:xfrm>
+          <a:off x="0" y="0"/>
+          <a:ext cx="0" cy="0"/>
+          <a:chOff x="0" y="0"/>
+          <a:chExt cx="0" cy="0"/>
+        </a:xfrm>
+      </p:grpSpPr>
+      <p:sp>
+        <p:nvSpPr>
+          <p:cNvPr id="2" name="Text Placeholder 1">
+            <a:extLst>
+              <a:ext uri="{FF2B5EF4-FFF2-40B4-BE49-F238E27FC236}">
+                <a16:creationId xmlns:a16="http://schemas.microsoft.com/office/drawing/2014/main" id="{C3BD474B-A088-785E-CDD9-387C8DAC2FED}"/>
+              </a:ext>
+            </a:extLst>
+          </p:cNvPr>
+          <p:cNvSpPr>
+            <a:spLocks noGrp="1"/>
+          </p:cNvSpPr>
+          <p:nvPr>
+            <p:ph type="body" sz="quarter" idx="11"/>
+          </p:nvPr>
+        </p:nvSpPr>
+        <p:spPr/>
+        <p:txBody>
+          <a:bodyPr/>
+          <a:lstStyle/>
+          <a:p>
+            <a:r>
+              <a:rPr lang="en-US" sz="2400" dirty="0"/>
+              <a:t>Memory Management can be either implicit or explicit</a:t>
+            </a:r>
+          </a:p>
+          <a:p>
+            <a:pPr lvl="1"/>
+            <a:r>
+              <a:rPr lang="en-US" sz="2000" dirty="0"/>
+              <a:t>Explicitly copied within the program itself</a:t>
+            </a:r>
+          </a:p>
+          <a:p>
+            <a:pPr lvl="1"/>
+            <a:r>
+              <a:rPr lang="en-US" sz="2000" dirty="0"/>
+              <a:t>Implicitly copied by the runtime</a:t>
+            </a:r>
+          </a:p>
+          <a:p>
+            <a:r>
+              <a:rPr lang="en-US" sz="2400" dirty="0"/>
+              <a:t>Implicit Memory Management</a:t>
+            </a:r>
+          </a:p>
+          <a:p>
+            <a:pPr lvl="1"/>
+            <a:r>
+              <a:rPr lang="en-GB" sz="2000" dirty="0"/>
+              <a:t>Handled automatically by the runtime</a:t>
+            </a:r>
+          </a:p>
+          <a:p>
+            <a:pPr lvl="1"/>
+            <a:r>
+              <a:rPr lang="en-GB" sz="2000" dirty="0"/>
+              <a:t>Simple and safe</a:t>
+            </a:r>
+          </a:p>
+          <a:p>
+            <a:pPr lvl="1"/>
+            <a:r>
+              <a:rPr lang="en-GB" sz="2000" dirty="0"/>
+              <a:t>Often at the cost of potential performance</a:t>
+            </a:r>
+          </a:p>
+          <a:p>
+            <a:r>
+              <a:rPr lang="en-GB" sz="2400" dirty="0"/>
+              <a:t>Explicit Memory Management</a:t>
+            </a:r>
+          </a:p>
+          <a:p>
+            <a:pPr lvl="1"/>
+            <a:r>
+              <a:rPr lang="en-GB" sz="2000" dirty="0"/>
+              <a:t>Defined manually by the programmer</a:t>
+            </a:r>
+          </a:p>
+          <a:p>
+            <a:pPr lvl="1"/>
+            <a:r>
+              <a:rPr lang="en-GB" sz="2000" dirty="0"/>
+              <a:t>May be optimized for better performance</a:t>
+            </a:r>
+          </a:p>
+          <a:p>
+            <a:pPr lvl="2"/>
+            <a:r>
+              <a:rPr lang="en-GB" sz="1600" dirty="0"/>
+              <a:t>For example: transfer data while device is busy with execution</a:t>
+            </a:r>
+          </a:p>
+          <a:p>
+            <a:pPr lvl="1"/>
+            <a:r>
+              <a:rPr lang="en-GB" sz="2000" dirty="0"/>
+              <a:t>Time consuming and error prone</a:t>
+            </a:r>
+          </a:p>
+          <a:p>
+            <a:pPr lvl="1"/>
+            <a:r>
+              <a:rPr lang="en-GB" sz="2000" dirty="0"/>
+              <a:t>Should be reserved for the most performance-critical areas</a:t>
+            </a:r>
+          </a:p>
+          <a:p>
+            <a:endParaRPr lang="en-US" sz="2400" dirty="0"/>
+          </a:p>
+        </p:txBody>
+      </p:sp>
+      <p:sp>
+        <p:nvSpPr>
+          <p:cNvPr id="3" name="Title 2">
+            <a:extLst>
+              <a:ext uri="{FF2B5EF4-FFF2-40B4-BE49-F238E27FC236}">
+                <a16:creationId xmlns:a16="http://schemas.microsoft.com/office/drawing/2014/main" id="{DB04E827-A974-9EA8-94AB-C3812F0276B8}"/>
+              </a:ext>
+            </a:extLst>
+          </p:cNvPr>
+          <p:cNvSpPr>
+            <a:spLocks noGrp="1"/>
+          </p:cNvSpPr>
+          <p:nvPr>
+            <p:ph type="title"/>
+          </p:nvPr>
+        </p:nvSpPr>
+        <p:spPr/>
+        <p:txBody>
+          <a:bodyPr/>
+          <a:lstStyle/>
+          <a:p>
+            <a:r>
+              <a:rPr lang="en-US" sz="3600" dirty="0"/>
+              <a:t>Implicit vs Explicit Memory Management</a:t>
+            </a:r>
+          </a:p>
+        </p:txBody>
+      </p:sp>
+    </p:spTree>
+    <p:extLst>
+      <p:ext uri="{BB962C8B-B14F-4D97-AF65-F5344CB8AC3E}">
+        <p14:creationId xmlns:p14="http://schemas.microsoft.com/office/powerpoint/2010/main" val="868272073"/>
+      </p:ext>
+    </p:extLst>
+  </p:cSld>
+  <p:clrMapOvr>
+    <a:masterClrMapping/>
+  </p:clrMapOvr>
+  <p:transition spd="med"/>
+</p:sld>
+</file>
+
+<file path=ppt/slides/slide13.xml><?xml version="1.0" encoding="utf-8"?>
+<p:sld xmlns:a="http://schemas.openxmlformats.org/drawingml/2006/main" xmlns:r="http://schemas.openxmlformats.org/officeDocument/2006/relationships" xmlns:p="http://schemas.openxmlformats.org/presentationml/2006/main">
+  <p:cSld>
+    <p:spTree>
+      <p:nvGrpSpPr>
+        <p:cNvPr id="1" name=""/>
+        <p:cNvGrpSpPr/>
+        <p:nvPr/>
+      </p:nvGrpSpPr>
+      <p:grpSpPr>
+        <a:xfrm>
+          <a:off x="0" y="0"/>
+          <a:ext cx="0" cy="0"/>
+          <a:chOff x="0" y="0"/>
+          <a:chExt cx="0" cy="0"/>
+        </a:xfrm>
+      </p:grpSpPr>
+      <p:sp>
+        <p:nvSpPr>
+          <p:cNvPr id="2" name="Text Placeholder 1">
+            <a:extLst>
+              <a:ext uri="{FF2B5EF4-FFF2-40B4-BE49-F238E27FC236}">
+                <a16:creationId xmlns:a16="http://schemas.microsoft.com/office/drawing/2014/main" id="{41A680AE-732F-B6A3-194A-222AEDCDB074}"/>
+              </a:ext>
+            </a:extLst>
+          </p:cNvPr>
+          <p:cNvSpPr>
+            <a:spLocks noGrp="1"/>
+          </p:cNvSpPr>
+          <p:nvPr>
+            <p:ph type="body" sz="quarter" idx="11"/>
+          </p:nvPr>
+        </p:nvSpPr>
+        <p:spPr>
+          <a:xfrm>
+            <a:off x="271463" y="1116013"/>
+            <a:ext cx="11657824" cy="5173469"/>
+          </a:xfrm>
+        </p:spPr>
+        <p:txBody>
+          <a:bodyPr/>
+          <a:lstStyle/>
+          <a:p>
+            <a:r>
+              <a:rPr lang="en-US" sz="2000" dirty="0"/>
+              <a:t>Pointer-based memory management system, </a:t>
+            </a:r>
+            <a:r>
+              <a:rPr lang="en-US" sz="1800" dirty="0"/>
+              <a:t>similar to C/C++ </a:t>
+            </a:r>
+            <a:r>
+              <a:rPr lang="en-US" sz="1800" i="1" dirty="0"/>
+              <a:t>malloc()</a:t>
+            </a:r>
+            <a:r>
+              <a:rPr lang="en-US" sz="1800" dirty="0"/>
+              <a:t> or </a:t>
+            </a:r>
+            <a:r>
+              <a:rPr lang="en-US" sz="1800" i="1" dirty="0"/>
+              <a:t>new</a:t>
+            </a:r>
+          </a:p>
+          <a:p>
+            <a:r>
+              <a:rPr lang="en-US" sz="2000" dirty="0"/>
+              <a:t>Defines a unified virtual memory space shared between host and devices</a:t>
+            </a:r>
+          </a:p>
+          <a:p>
+            <a:pPr lvl="1"/>
+            <a:r>
+              <a:rPr lang="en-US" sz="1800" dirty="0"/>
+              <a:t>A pointer is valid both on the host and any devices, so no translation is necessary</a:t>
+            </a:r>
+          </a:p>
+          <a:p>
+            <a:r>
+              <a:rPr lang="en-US" sz="2000" dirty="0"/>
+              <a:t>Defines three types of allocation</a:t>
+            </a:r>
+          </a:p>
+          <a:p>
+            <a:pPr lvl="1"/>
+            <a:r>
+              <a:rPr lang="en-US" sz="1800" dirty="0"/>
+              <a:t>Device</a:t>
+            </a:r>
+          </a:p>
+          <a:p>
+            <a:pPr lvl="2"/>
+            <a:r>
+              <a:rPr lang="en-US" sz="1200" dirty="0"/>
+              <a:t>Explicit, accomplished via </a:t>
+            </a:r>
+            <a:r>
+              <a:rPr lang="en-US" sz="1200" dirty="0" err="1"/>
+              <a:t>memcpy</a:t>
+            </a:r>
+            <a:r>
+              <a:rPr lang="en-US" sz="1200" dirty="0"/>
+              <a:t>() function as part of the </a:t>
+            </a:r>
+            <a:r>
+              <a:rPr lang="en-US" sz="1200" i="1" dirty="0"/>
+              <a:t>queue</a:t>
+            </a:r>
+            <a:r>
+              <a:rPr lang="en-US" sz="1200" dirty="0"/>
+              <a:t> and </a:t>
+            </a:r>
+            <a:r>
+              <a:rPr lang="en-US" sz="1200" i="1" dirty="0"/>
+              <a:t>handler</a:t>
+            </a:r>
+            <a:r>
+              <a:rPr lang="en-US" sz="1200" dirty="0"/>
+              <a:t> classes</a:t>
+            </a:r>
+          </a:p>
+          <a:p>
+            <a:pPr lvl="2"/>
+            <a:r>
+              <a:rPr lang="en-US" sz="1200" dirty="0"/>
+              <a:t>Located on device-attached memory</a:t>
+            </a:r>
+          </a:p>
+          <a:p>
+            <a:pPr lvl="2"/>
+            <a:r>
+              <a:rPr lang="en-US" sz="1200" dirty="0"/>
+              <a:t>Only accessible via device. Data must be copied explicitly to move between host and device</a:t>
+            </a:r>
+          </a:p>
+          <a:p>
+            <a:pPr lvl="1"/>
+            <a:r>
+              <a:rPr lang="en-US" sz="1800" dirty="0"/>
+              <a:t>Host</a:t>
+            </a:r>
+          </a:p>
+          <a:p>
+            <a:pPr lvl="2"/>
+            <a:r>
+              <a:rPr lang="en-US" sz="1200" dirty="0"/>
+              <a:t>Implicit</a:t>
+            </a:r>
+          </a:p>
+          <a:p>
+            <a:pPr lvl="2"/>
+            <a:r>
+              <a:rPr lang="en-US" sz="1200" dirty="0"/>
+              <a:t>Accessible via both host and device</a:t>
+            </a:r>
+          </a:p>
+          <a:p>
+            <a:pPr lvl="2"/>
+            <a:r>
+              <a:rPr lang="en-US" sz="1200" dirty="0"/>
+              <a:t>Data accessed on host memory by devices does not transfer into local device memory</a:t>
+            </a:r>
+          </a:p>
+          <a:p>
+            <a:pPr lvl="3"/>
+            <a:r>
+              <a:rPr lang="en-US" sz="1100" dirty="0"/>
+              <a:t>Sent via bus such as PCI-E</a:t>
+            </a:r>
+          </a:p>
+          <a:p>
+            <a:pPr lvl="1"/>
+            <a:r>
+              <a:rPr lang="en-US" sz="1800" dirty="0"/>
+              <a:t>Shared</a:t>
+            </a:r>
+          </a:p>
+          <a:p>
+            <a:pPr lvl="2"/>
+            <a:r>
+              <a:rPr lang="en-US" sz="1200" dirty="0"/>
+              <a:t>Implicit</a:t>
+            </a:r>
+          </a:p>
+          <a:p>
+            <a:pPr lvl="2"/>
+            <a:r>
+              <a:rPr lang="en-US" sz="1200" dirty="0"/>
+              <a:t>Accessible via both host and device</a:t>
+            </a:r>
+          </a:p>
+          <a:p>
+            <a:pPr lvl="2"/>
+            <a:r>
+              <a:rPr lang="en-US" sz="1200" dirty="0"/>
+              <a:t>Can migrate between host and device, allowing for faster execution on device. Occurs automatically via runtime</a:t>
+            </a:r>
+          </a:p>
+          <a:p>
+            <a:pPr lvl="1"/>
+            <a:r>
+              <a:rPr lang="en-US" sz="1800" dirty="0"/>
+              <a:t>All allocations are performed by the host</a:t>
+            </a:r>
+          </a:p>
+          <a:p>
+            <a:endParaRPr lang="en-US" sz="2000" dirty="0"/>
+          </a:p>
+        </p:txBody>
+      </p:sp>
+      <p:sp>
+        <p:nvSpPr>
+          <p:cNvPr id="3" name="Title 2">
+            <a:extLst>
+              <a:ext uri="{FF2B5EF4-FFF2-40B4-BE49-F238E27FC236}">
+                <a16:creationId xmlns:a16="http://schemas.microsoft.com/office/drawing/2014/main" id="{810964E1-8454-EEFF-F692-1DD044D58A34}"/>
+              </a:ext>
+            </a:extLst>
+          </p:cNvPr>
+          <p:cNvSpPr>
+            <a:spLocks noGrp="1"/>
+          </p:cNvSpPr>
+          <p:nvPr>
+            <p:ph type="title"/>
+          </p:nvPr>
+        </p:nvSpPr>
+        <p:spPr/>
+        <p:txBody>
+          <a:bodyPr/>
+          <a:lstStyle/>
+          <a:p>
+            <a:r>
+              <a:rPr lang="en-US" sz="4000" dirty="0"/>
+              <a:t>Universal Shared Memory (USM)</a:t>
+            </a:r>
+          </a:p>
+        </p:txBody>
+      </p:sp>
+    </p:spTree>
+    <p:extLst>
+      <p:ext uri="{BB962C8B-B14F-4D97-AF65-F5344CB8AC3E}">
+        <p14:creationId xmlns:p14="http://schemas.microsoft.com/office/powerpoint/2010/main" val="2858336872"/>
+      </p:ext>
+    </p:extLst>
+  </p:cSld>
+  <p:clrMapOvr>
+    <a:masterClrMapping/>
+  </p:clrMapOvr>
+  <p:transition spd="med"/>
+</p:sld>
+</file>
+
+<file path=ppt/slides/slide14.xml><?xml version="1.0" encoding="utf-8"?>
+<p:sld xmlns:a="http://schemas.openxmlformats.org/drawingml/2006/main" xmlns:r="http://schemas.openxmlformats.org/officeDocument/2006/relationships" xmlns:p="http://schemas.openxmlformats.org/presentationml/2006/main">
+  <p:cSld>
+    <p:spTree>
+      <p:nvGrpSpPr>
+        <p:cNvPr id="1" name=""/>
+        <p:cNvGrpSpPr/>
+        <p:nvPr/>
+      </p:nvGrpSpPr>
+      <p:grpSpPr>
+        <a:xfrm>
+          <a:off x="0" y="0"/>
+          <a:ext cx="0" cy="0"/>
+          <a:chOff x="0" y="0"/>
+          <a:chExt cx="0" cy="0"/>
+        </a:xfrm>
+      </p:grpSpPr>
+      <p:sp>
+        <p:nvSpPr>
+          <p:cNvPr id="2" name="Text Placeholder 1">
+            <a:extLst>
+              <a:ext uri="{FF2B5EF4-FFF2-40B4-BE49-F238E27FC236}">
+                <a16:creationId xmlns:a16="http://schemas.microsoft.com/office/drawing/2014/main" id="{4D907494-8A92-93DB-9B91-24DE589D25AE}"/>
+              </a:ext>
+            </a:extLst>
+          </p:cNvPr>
+          <p:cNvSpPr>
+            <a:spLocks noGrp="1"/>
+          </p:cNvSpPr>
+          <p:nvPr>
+            <p:ph type="body" sz="quarter" idx="11"/>
+          </p:nvPr>
+        </p:nvSpPr>
+        <p:spPr/>
+        <p:txBody>
+          <a:bodyPr/>
+          <a:lstStyle/>
+          <a:p>
+            <a:r>
+              <a:rPr lang="en-US" sz="2400" dirty="0"/>
+              <a:t>Data abstractions of a certain C++ type</a:t>
+            </a:r>
+          </a:p>
+          <a:p>
+            <a:pPr lvl="1"/>
+            <a:r>
+              <a:rPr lang="en-US" sz="2000" dirty="0"/>
+              <a:t>Can be scalar data types, vectors, or other user-defined class/structure</a:t>
+            </a:r>
+          </a:p>
+          <a:p>
+            <a:pPr lvl="2"/>
+            <a:r>
+              <a:rPr lang="en-US" sz="1600" dirty="0"/>
+              <a:t>Must not require the use of copy constructors for copying</a:t>
+            </a:r>
+          </a:p>
+          <a:p>
+            <a:r>
+              <a:rPr lang="en-US" sz="2400" dirty="0"/>
+              <a:t>Represent data objects, not memory addresses</a:t>
+            </a:r>
+          </a:p>
+          <a:p>
+            <a:pPr lvl="1"/>
+            <a:r>
+              <a:rPr lang="en-US" sz="2000" dirty="0"/>
+              <a:t>Cannot be accessed like C++ arrays</a:t>
+            </a:r>
+          </a:p>
+          <a:p>
+            <a:pPr lvl="1"/>
+            <a:r>
+              <a:rPr lang="en-US" sz="2000" i="1" dirty="0"/>
+              <a:t>Accessors</a:t>
+            </a:r>
+            <a:r>
+              <a:rPr lang="en-US" sz="2000" dirty="0"/>
+              <a:t> must be used to read from and write to buffers</a:t>
+            </a:r>
+          </a:p>
+          <a:p>
+            <a:r>
+              <a:rPr lang="en-US" sz="2400" dirty="0"/>
+              <a:t>A single buffer may be distributed across multiple locations</a:t>
+            </a:r>
+          </a:p>
+          <a:p>
+            <a:pPr lvl="1"/>
+            <a:r>
+              <a:rPr lang="en-US" sz="2000" dirty="0"/>
+              <a:t>Between discrete memory locations and devices</a:t>
+            </a:r>
+          </a:p>
+          <a:p>
+            <a:r>
+              <a:rPr lang="en-US" sz="2400" dirty="0"/>
+              <a:t>An empty buffer may be created by specifying a range for size</a:t>
+            </a:r>
+          </a:p>
+          <a:p>
+            <a:pPr lvl="1"/>
+            <a:r>
+              <a:rPr lang="en-US" sz="2000" dirty="0"/>
+              <a:t>Data must later be initialized before the buffer can be read from</a:t>
+            </a:r>
+          </a:p>
+          <a:p>
+            <a:r>
+              <a:rPr lang="en-US" sz="2400" dirty="0"/>
+              <a:t>Existing host data may be used to initialize a new buffer</a:t>
+            </a:r>
+          </a:p>
+          <a:p>
+            <a:pPr lvl="1"/>
+            <a:r>
+              <a:rPr lang="en-US" sz="2000" dirty="0"/>
+              <a:t>Accomplished by invoking a constructor that takes a pointer to an existing host allocation</a:t>
+            </a:r>
+          </a:p>
+          <a:p>
+            <a:r>
+              <a:rPr lang="en-US" sz="2400" dirty="0"/>
+              <a:t>May also be created from existing </a:t>
+            </a:r>
+            <a:r>
+              <a:rPr lang="en-US" sz="2400" dirty="0" err="1"/>
+              <a:t>cl_mem</a:t>
+            </a:r>
+            <a:r>
+              <a:rPr lang="en-US" sz="2400" dirty="0"/>
+              <a:t> objects if using OpenCL compatibility</a:t>
+            </a:r>
+          </a:p>
+        </p:txBody>
+      </p:sp>
+      <p:sp>
+        <p:nvSpPr>
+          <p:cNvPr id="3" name="Title 2">
+            <a:extLst>
+              <a:ext uri="{FF2B5EF4-FFF2-40B4-BE49-F238E27FC236}">
+                <a16:creationId xmlns:a16="http://schemas.microsoft.com/office/drawing/2014/main" id="{FD123E51-4B05-EDA0-53E0-A70993ACDAC0}"/>
+              </a:ext>
+            </a:extLst>
+          </p:cNvPr>
+          <p:cNvSpPr>
+            <a:spLocks noGrp="1"/>
+          </p:cNvSpPr>
+          <p:nvPr>
+            <p:ph type="title"/>
+          </p:nvPr>
+        </p:nvSpPr>
+        <p:spPr/>
+        <p:txBody>
+          <a:bodyPr/>
+          <a:lstStyle/>
+          <a:p>
+            <a:r>
+              <a:rPr lang="en-US" sz="4000" dirty="0"/>
+              <a:t>Buffers</a:t>
+            </a:r>
+          </a:p>
+        </p:txBody>
+      </p:sp>
+    </p:spTree>
+    <p:extLst>
+      <p:ext uri="{BB962C8B-B14F-4D97-AF65-F5344CB8AC3E}">
+        <p14:creationId xmlns:p14="http://schemas.microsoft.com/office/powerpoint/2010/main" val="476712468"/>
+      </p:ext>
+    </p:extLst>
+  </p:cSld>
+  <p:clrMapOvr>
+    <a:masterClrMapping/>
+  </p:clrMapOvr>
+  <p:transition spd="med"/>
+</p:sld>
+</file>
+
+<file path=ppt/slides/slide15.xml><?xml version="1.0" encoding="utf-8"?>
+<p:sld xmlns:a="http://schemas.openxmlformats.org/drawingml/2006/main" xmlns:r="http://schemas.openxmlformats.org/officeDocument/2006/relationships" xmlns:p="http://schemas.openxmlformats.org/presentationml/2006/main">
+  <p:cSld>
+    <p:spTree>
+      <p:nvGrpSpPr>
+        <p:cNvPr id="1" name=""/>
+        <p:cNvGrpSpPr/>
+        <p:nvPr/>
+      </p:nvGrpSpPr>
+      <p:grpSpPr>
+        <a:xfrm>
+          <a:off x="0" y="0"/>
+          <a:ext cx="0" cy="0"/>
+          <a:chOff x="0" y="0"/>
+          <a:chExt cx="0" cy="0"/>
+        </a:xfrm>
+      </p:grpSpPr>
+      <p:sp>
+        <p:nvSpPr>
+          <p:cNvPr id="2" name="Text Placeholder 1">
+            <a:extLst>
+              <a:ext uri="{FF2B5EF4-FFF2-40B4-BE49-F238E27FC236}">
+                <a16:creationId xmlns:a16="http://schemas.microsoft.com/office/drawing/2014/main" id="{F7E2A174-6243-6AEA-61E3-DE0E4AA2E1A3}"/>
+              </a:ext>
+            </a:extLst>
+          </p:cNvPr>
+          <p:cNvSpPr>
+            <a:spLocks noGrp="1"/>
+          </p:cNvSpPr>
+          <p:nvPr>
+            <p:ph type="body" sz="quarter" idx="11"/>
+          </p:nvPr>
+        </p:nvSpPr>
+        <p:spPr/>
+        <p:txBody>
+          <a:bodyPr/>
+          <a:lstStyle/>
+          <a:p>
+            <a:r>
+              <a:rPr lang="en-US" dirty="0"/>
+              <a:t>The only way in which to read from or write to buffers</a:t>
+            </a:r>
+          </a:p>
+          <a:p>
+            <a:r>
+              <a:rPr lang="en-US" dirty="0"/>
+              <a:t>Can be instantiated with read, write, or </a:t>
+            </a:r>
+            <a:r>
+              <a:rPr lang="en-US" dirty="0" err="1"/>
+              <a:t>read_write</a:t>
+            </a:r>
+            <a:r>
+              <a:rPr lang="en-US" dirty="0"/>
+              <a:t> access modes</a:t>
+            </a:r>
+          </a:p>
+          <a:p>
+            <a:pPr lvl="1"/>
+            <a:r>
+              <a:rPr lang="en-US" dirty="0"/>
+              <a:t>Accessors are </a:t>
+            </a:r>
+            <a:r>
+              <a:rPr lang="en-US" dirty="0" err="1"/>
+              <a:t>read_write</a:t>
+            </a:r>
+            <a:r>
+              <a:rPr lang="en-US" dirty="0"/>
+              <a:t> by default</a:t>
+            </a:r>
+          </a:p>
+          <a:p>
+            <a:r>
+              <a:rPr lang="en-US" dirty="0"/>
+              <a:t>Using appropriate access modes is important</a:t>
+            </a:r>
+          </a:p>
+          <a:p>
+            <a:pPr lvl="1"/>
+            <a:r>
+              <a:rPr lang="en-US" dirty="0"/>
+              <a:t>Provides implicit information used to help the runtime manage memory</a:t>
+            </a:r>
+          </a:p>
+          <a:p>
+            <a:pPr lvl="2"/>
+            <a:r>
+              <a:rPr lang="en-US" dirty="0"/>
+              <a:t>For example: </a:t>
+            </a:r>
+            <a:r>
+              <a:rPr lang="en-GB" dirty="0"/>
+              <a:t>read mode tells the runtime that it does not need to copy memory back to the host, as the device has not changed it.</a:t>
+            </a:r>
+          </a:p>
+          <a:p>
+            <a:pPr lvl="1"/>
+            <a:r>
+              <a:rPr lang="en-GB" dirty="0"/>
+              <a:t>Appropriate use of access modes will help the runtime optimize kernel scheduling and data migration</a:t>
+            </a:r>
+            <a:endParaRPr lang="en-US" dirty="0"/>
+          </a:p>
+        </p:txBody>
+      </p:sp>
+      <p:sp>
+        <p:nvSpPr>
+          <p:cNvPr id="3" name="Title 2">
+            <a:extLst>
+              <a:ext uri="{FF2B5EF4-FFF2-40B4-BE49-F238E27FC236}">
+                <a16:creationId xmlns:a16="http://schemas.microsoft.com/office/drawing/2014/main" id="{125E0148-C8ED-74C8-D65E-4538E79CBD63}"/>
+              </a:ext>
+            </a:extLst>
+          </p:cNvPr>
+          <p:cNvSpPr>
+            <a:spLocks noGrp="1"/>
+          </p:cNvSpPr>
+          <p:nvPr>
+            <p:ph type="title"/>
+          </p:nvPr>
+        </p:nvSpPr>
+        <p:spPr/>
+        <p:txBody>
+          <a:bodyPr/>
+          <a:lstStyle/>
+          <a:p>
+            <a:r>
+              <a:rPr lang="en-US" sz="4000" dirty="0"/>
+              <a:t>Accessors</a:t>
+            </a:r>
+          </a:p>
+        </p:txBody>
+      </p:sp>
+    </p:spTree>
+    <p:extLst>
+      <p:ext uri="{BB962C8B-B14F-4D97-AF65-F5344CB8AC3E}">
+        <p14:creationId xmlns:p14="http://schemas.microsoft.com/office/powerpoint/2010/main" val="4214608404"/>
+      </p:ext>
+    </p:extLst>
+  </p:cSld>
+  <p:clrMapOvr>
+    <a:masterClrMapping/>
+  </p:clrMapOvr>
+  <p:transition spd="med"/>
+</p:sld>
+</file>
+
 <file path=ppt/slides/slide2.xml><?xml version="1.0" encoding="utf-8"?>
 <p:sld xmlns:a="http://schemas.openxmlformats.org/drawingml/2006/main" xmlns:r="http://schemas.openxmlformats.org/officeDocument/2006/relationships" xmlns:p="http://schemas.openxmlformats.org/presentationml/2006/main">
   <p:cSld>
@@ -13858,7 +15200,7 @@
             </a:pPr>
             <a:r>
               <a:rPr lang="en-US" sz="2000" i="1" dirty="0"/>
-              <a:t>Source: Data Parallel C++, James Reinders et al. pp. 72</a:t>
+              <a:t>Source: Data Parallel C++, James Reinders et al. pg. 46</a:t>
             </a:r>
           </a:p>
         </p:txBody>
@@ -13895,6 +15237,173 @@
     <p:extLst>
       <p:ext uri="{BB962C8B-B14F-4D97-AF65-F5344CB8AC3E}">
         <p14:creationId xmlns:p14="http://schemas.microsoft.com/office/powerpoint/2010/main" val="484224936"/>
+      </p:ext>
+    </p:extLst>
+  </p:cSld>
+  <p:clrMapOvr>
+    <a:masterClrMapping/>
+  </p:clrMapOvr>
+  <p:transition spd="med"/>
+</p:sld>
+</file>
+
+<file path=ppt/slides/slide9.xml><?xml version="1.0" encoding="utf-8"?>
+<p:sld xmlns:a="http://schemas.openxmlformats.org/drawingml/2006/main" xmlns:r="http://schemas.openxmlformats.org/officeDocument/2006/relationships" xmlns:p="http://schemas.openxmlformats.org/presentationml/2006/main">
+  <p:cSld>
+    <p:spTree>
+      <p:nvGrpSpPr>
+        <p:cNvPr id="1" name=""/>
+        <p:cNvGrpSpPr/>
+        <p:nvPr/>
+      </p:nvGrpSpPr>
+      <p:grpSpPr>
+        <a:xfrm>
+          <a:off x="0" y="0"/>
+          <a:ext cx="0" cy="0"/>
+          <a:chOff x="0" y="0"/>
+          <a:chExt cx="0" cy="0"/>
+        </a:xfrm>
+      </p:grpSpPr>
+      <p:sp>
+        <p:nvSpPr>
+          <p:cNvPr id="2" name="Text Placeholder 1">
+            <a:extLst>
+              <a:ext uri="{FF2B5EF4-FFF2-40B4-BE49-F238E27FC236}">
+                <a16:creationId xmlns:a16="http://schemas.microsoft.com/office/drawing/2014/main" id="{CD50BA46-67B7-F2EB-42AE-B257D93ECC5C}"/>
+              </a:ext>
+            </a:extLst>
+          </p:cNvPr>
+          <p:cNvSpPr>
+            <a:spLocks noGrp="1"/>
+          </p:cNvSpPr>
+          <p:nvPr>
+            <p:ph type="body" sz="quarter" idx="11"/>
+          </p:nvPr>
+        </p:nvSpPr>
+        <p:spPr/>
+        <p:txBody>
+          <a:bodyPr/>
+          <a:lstStyle/>
+          <a:p>
+            <a:r>
+              <a:rPr lang="en-US" sz="2400" dirty="0"/>
+              <a:t>Objects that specify a task and its </a:t>
+            </a:r>
+            <a:r>
+              <a:rPr lang="en-US" sz="2400" dirty="0" err="1"/>
+              <a:t>depdendencies</a:t>
+            </a:r>
+            <a:endParaRPr lang="en-US" sz="2400" dirty="0"/>
+          </a:p>
+          <a:p>
+            <a:r>
+              <a:rPr lang="en-US" sz="2400" dirty="0"/>
+              <a:t>Typically in the form of C++ Lambda functions</a:t>
+            </a:r>
+          </a:p>
+          <a:p>
+            <a:pPr lvl="1"/>
+            <a:r>
+              <a:rPr lang="en-US" sz="2000" dirty="0"/>
+              <a:t>The only parameter is a reference to a </a:t>
+            </a:r>
+            <a:r>
+              <a:rPr lang="en-US" sz="2000" i="1" dirty="0"/>
+              <a:t>handler </a:t>
+            </a:r>
+            <a:r>
+              <a:rPr lang="en-US" sz="2000" dirty="0"/>
+              <a:t>object</a:t>
+            </a:r>
+          </a:p>
+          <a:p>
+            <a:r>
+              <a:rPr lang="en-US" sz="2400" dirty="0"/>
+              <a:t>Passed as an argument to a queue object’s submit() function</a:t>
+            </a:r>
+          </a:p>
+          <a:p>
+            <a:r>
+              <a:rPr lang="en-US" sz="2400" dirty="0"/>
+              <a:t>Command Group structure:</a:t>
+            </a:r>
+          </a:p>
+          <a:p>
+            <a:pPr lvl="1"/>
+            <a:r>
+              <a:rPr lang="en-US" sz="2000" dirty="0"/>
+              <a:t>Exactly one action (and no more)</a:t>
+            </a:r>
+          </a:p>
+          <a:p>
+            <a:pPr lvl="2"/>
+            <a:r>
+              <a:rPr lang="en-US" sz="1400" dirty="0"/>
+              <a:t>Either device code submitted for execution or manual memory operations such as </a:t>
+            </a:r>
+            <a:r>
+              <a:rPr lang="en-US" sz="1400" i="1" dirty="0"/>
+              <a:t>copy</a:t>
+            </a:r>
+            <a:endParaRPr lang="en-US" sz="1400" dirty="0"/>
+          </a:p>
+          <a:p>
+            <a:pPr lvl="1"/>
+            <a:r>
+              <a:rPr lang="en-US" sz="2000" dirty="0"/>
+              <a:t>Host code that defines dependencies</a:t>
+            </a:r>
+          </a:p>
+          <a:p>
+            <a:pPr lvl="2"/>
+            <a:r>
+              <a:rPr lang="en-US" sz="1400" dirty="0"/>
+              <a:t>R</a:t>
+            </a:r>
+            <a:r>
+              <a:rPr lang="en-GB" sz="1400" dirty="0" err="1"/>
+              <a:t>estricts</a:t>
+            </a:r>
+            <a:r>
+              <a:rPr lang="en-GB" sz="1400" dirty="0"/>
+              <a:t> when asynchronous execution of the submitted work can begin. For example: creation of accessors or buffers</a:t>
+            </a:r>
+            <a:endParaRPr lang="en-US" sz="1400" dirty="0"/>
+          </a:p>
+        </p:txBody>
+      </p:sp>
+      <p:sp>
+        <p:nvSpPr>
+          <p:cNvPr id="3" name="Title 2">
+            <a:extLst>
+              <a:ext uri="{FF2B5EF4-FFF2-40B4-BE49-F238E27FC236}">
+                <a16:creationId xmlns:a16="http://schemas.microsoft.com/office/drawing/2014/main" id="{5BA0B09F-8115-1B58-0405-721C6E8B2265}"/>
+              </a:ext>
+            </a:extLst>
+          </p:cNvPr>
+          <p:cNvSpPr>
+            <a:spLocks noGrp="1"/>
+          </p:cNvSpPr>
+          <p:nvPr>
+            <p:ph type="title"/>
+          </p:nvPr>
+        </p:nvSpPr>
+        <p:spPr/>
+        <p:txBody>
+          <a:bodyPr/>
+          <a:lstStyle/>
+          <a:p>
+            <a:r>
+              <a:rPr lang="en-US" sz="4000" dirty="0"/>
+              <a:t>Command Groups</a:t>
+            </a:r>
+          </a:p>
+        </p:txBody>
+      </p:sp>
+    </p:spTree>
+    <p:extLst>
+      <p:ext uri="{BB962C8B-B14F-4D97-AF65-F5344CB8AC3E}">
+        <p14:creationId xmlns:p14="http://schemas.microsoft.com/office/powerpoint/2010/main" val="2458255169"/>
       </p:ext>
     </p:extLst>
   </p:cSld>
@@ -18299,6 +19808,21 @@
 </file>
 
 <file path=customXml/item1.xml><?xml version="1.0" encoding="utf-8"?>
+<p:properties xmlns:p="http://schemas.microsoft.com/office/2006/metadata/properties" xmlns:xsi="http://www.w3.org/2001/XMLSchema-instance" xmlns:pc="http://schemas.microsoft.com/office/infopath/2007/PartnerControls">
+  <documentManagement/>
+</p:properties>
+</file>
+
+<file path=customXml/item2.xml><?xml version="1.0" encoding="utf-8"?>
+<?mso-contentType ?>
+<FormTemplates xmlns="http://schemas.microsoft.com/sharepoint/v3/contenttype/forms">
+  <Display>DocumentLibraryForm</Display>
+  <Edit>DocumentLibraryForm</Edit>
+  <New>DocumentLibraryForm</New>
+</FormTemplates>
+</file>
+
+<file path=customXml/item3.xml><?xml version="1.0" encoding="utf-8"?>
 <ct:contentTypeSchema xmlns:ct="http://schemas.microsoft.com/office/2006/metadata/contentType" xmlns:ma="http://schemas.microsoft.com/office/2006/metadata/properties/metaAttributes" ct:_="" ma:_="" ma:contentTypeName="Document" ma:contentTypeID="0x010100DD15A10438976445A4F2A564A9063629" ma:contentTypeVersion="6" ma:contentTypeDescription="Create a new document." ma:contentTypeScope="" ma:versionID="45806b5510493321e140864de03fb7ad">
   <xsd:schema xmlns:xsd="http://www.w3.org/2001/XMLSchema" xmlns:xs="http://www.w3.org/2001/XMLSchema" xmlns:p="http://schemas.microsoft.com/office/2006/metadata/properties" xmlns:ns2="63fc63a6-18cf-4814-8dee-b8d6616a2bda" targetNamespace="http://schemas.microsoft.com/office/2006/metadata/properties" ma:root="true" ma:fieldsID="3db532ccb85098a64b7e52bb711c9525" ns2:_="">
     <xsd:import namespace="63fc63a6-18cf-4814-8dee-b8d6616a2bda"/>
@@ -18456,22 +19980,31 @@
 </ct:contentTypeSchema>
 </file>
 
-<file path=customXml/item2.xml><?xml version="1.0" encoding="utf-8"?>
-<?mso-contentType ?>
-<FormTemplates xmlns="http://schemas.microsoft.com/sharepoint/v3/contenttype/forms">
-  <Display>DocumentLibraryForm</Display>
-  <Edit>DocumentLibraryForm</Edit>
-  <New>DocumentLibraryForm</New>
-</FormTemplates>
+<file path=customXml/itemProps1.xml><?xml version="1.0" encoding="utf-8"?>
+<ds:datastoreItem xmlns:ds="http://schemas.openxmlformats.org/officeDocument/2006/customXml" ds:itemID="{796C1367-8D37-49A1-BF4B-2E9150DA2B52}">
+  <ds:schemaRefs>
+    <ds:schemaRef ds:uri="http://purl.org/dc/dcmitype/"/>
+    <ds:schemaRef ds:uri="http://www.w3.org/XML/1998/namespace"/>
+    <ds:schemaRef ds:uri="http://purl.org/dc/elements/1.1/"/>
+    <ds:schemaRef ds:uri="http://purl.org/dc/terms/"/>
+    <ds:schemaRef ds:uri="http://schemas.microsoft.com/office/infopath/2007/PartnerControls"/>
+    <ds:schemaRef ds:uri="http://schemas.microsoft.com/office/2006/documentManagement/types"/>
+    <ds:schemaRef ds:uri="http://schemas.microsoft.com/office/2006/metadata/properties"/>
+    <ds:schemaRef ds:uri="http://schemas.openxmlformats.org/package/2006/metadata/core-properties"/>
+    <ds:schemaRef ds:uri="63fc63a6-18cf-4814-8dee-b8d6616a2bda"/>
+  </ds:schemaRefs>
+</ds:datastoreItem>
 </file>
 
-<file path=customXml/item3.xml><?xml version="1.0" encoding="utf-8"?>
-<p:properties xmlns:p="http://schemas.microsoft.com/office/2006/metadata/properties" xmlns:xsi="http://www.w3.org/2001/XMLSchema-instance" xmlns:pc="http://schemas.microsoft.com/office/infopath/2007/PartnerControls">
-  <documentManagement/>
-</p:properties>
+<file path=customXml/itemProps2.xml><?xml version="1.0" encoding="utf-8"?>
+<ds:datastoreItem xmlns:ds="http://schemas.openxmlformats.org/officeDocument/2006/customXml" ds:itemID="{39D54C70-8A1F-433D-B3DF-B7287D9E1633}">
+  <ds:schemaRefs>
+    <ds:schemaRef ds:uri="http://schemas.microsoft.com/sharepoint/v3/contenttype/forms"/>
+  </ds:schemaRefs>
+</ds:datastoreItem>
 </file>
 
-<file path=customXml/itemProps1.xml><?xml version="1.0" encoding="utf-8"?>
+<file path=customXml/itemProps3.xml><?xml version="1.0" encoding="utf-8"?>
 <ds:datastoreItem xmlns:ds="http://schemas.openxmlformats.org/officeDocument/2006/customXml" ds:itemID="{25EF2080-A3D2-46D5-AF20-1C20554745AE}">
   <ds:schemaRefs>
     <ds:schemaRef ds:uri="http://schemas.microsoft.com/office/2006/metadata/contentType"/>
@@ -18487,28 +20020,4 @@
     <ds:schemaRef ds:uri="http://schemas.microsoft.com/internal/obd"/>
   </ds:schemaRefs>
 </ds:datastoreItem>
-</file>
-
-<file path=customXml/itemProps2.xml><?xml version="1.0" encoding="utf-8"?>
-<ds:datastoreItem xmlns:ds="http://schemas.openxmlformats.org/officeDocument/2006/customXml" ds:itemID="{39D54C70-8A1F-433D-B3DF-B7287D9E1633}">
-  <ds:schemaRefs>
-    <ds:schemaRef ds:uri="http://schemas.microsoft.com/sharepoint/v3/contenttype/forms"/>
-  </ds:schemaRefs>
-</ds:datastoreItem>
-</file>
-
-<file path=customXml/itemProps3.xml><?xml version="1.0" encoding="utf-8"?>
-<ds:datastoreItem xmlns:ds="http://schemas.openxmlformats.org/officeDocument/2006/customXml" ds:itemID="{796C1367-8D37-49A1-BF4B-2E9150DA2B52}">
-  <ds:schemaRefs>
-    <ds:schemaRef ds:uri="http://purl.org/dc/dcmitype/"/>
-    <ds:schemaRef ds:uri="http://www.w3.org/XML/1998/namespace"/>
-    <ds:schemaRef ds:uri="http://purl.org/dc/elements/1.1/"/>
-    <ds:schemaRef ds:uri="http://purl.org/dc/terms/"/>
-    <ds:schemaRef ds:uri="http://schemas.microsoft.com/office/infopath/2007/PartnerControls"/>
-    <ds:schemaRef ds:uri="http://schemas.microsoft.com/office/2006/documentManagement/types"/>
-    <ds:schemaRef ds:uri="http://schemas.microsoft.com/office/2006/metadata/properties"/>
-    <ds:schemaRef ds:uri="http://schemas.openxmlformats.org/package/2006/metadata/core-properties"/>
-    <ds:schemaRef ds:uri="63fc63a6-18cf-4814-8dee-b8d6616a2bda"/>
-  </ds:schemaRefs>
-</ds:datastoreItem>
 </file>
</xml_diff>

<commit_message>
re-ordered some slides and added links to accompanying examples
</commit_message>
<xml_diff>
--- a/Slides/SYCL intro.pptx
+++ b/Slides/SYCL intro.pptx
@@ -7,7 +7,7 @@
     <p:sldMasterId id="2147483676" r:id="rId6"/>
   </p:sldMasterIdLst>
   <p:notesMasterIdLst>
-    <p:notesMasterId r:id="rId25"/>
+    <p:notesMasterId r:id="rId29"/>
   </p:notesMasterIdLst>
   <p:sldIdLst>
     <p:sldId id="321" r:id="rId7"/>
@@ -15,19 +15,23 @@
     <p:sldId id="351" r:id="rId9"/>
     <p:sldId id="352" r:id="rId10"/>
     <p:sldId id="353" r:id="rId11"/>
-    <p:sldId id="354" r:id="rId12"/>
-    <p:sldId id="355" r:id="rId13"/>
-    <p:sldId id="356" r:id="rId14"/>
-    <p:sldId id="357" r:id="rId15"/>
-    <p:sldId id="358" r:id="rId16"/>
+    <p:sldId id="362" r:id="rId12"/>
+    <p:sldId id="363" r:id="rId13"/>
+    <p:sldId id="357" r:id="rId14"/>
+    <p:sldId id="358" r:id="rId15"/>
+    <p:sldId id="367" r:id="rId16"/>
     <p:sldId id="359" r:id="rId17"/>
-    <p:sldId id="360" r:id="rId18"/>
-    <p:sldId id="361" r:id="rId19"/>
-    <p:sldId id="362" r:id="rId20"/>
-    <p:sldId id="363" r:id="rId21"/>
-    <p:sldId id="365" r:id="rId22"/>
-    <p:sldId id="364" r:id="rId23"/>
-    <p:sldId id="366" r:id="rId24"/>
+    <p:sldId id="365" r:id="rId18"/>
+    <p:sldId id="360" r:id="rId19"/>
+    <p:sldId id="364" r:id="rId20"/>
+    <p:sldId id="368" r:id="rId21"/>
+    <p:sldId id="366" r:id="rId22"/>
+    <p:sldId id="361" r:id="rId23"/>
+    <p:sldId id="369" r:id="rId24"/>
+    <p:sldId id="354" r:id="rId25"/>
+    <p:sldId id="355" r:id="rId26"/>
+    <p:sldId id="356" r:id="rId27"/>
+    <p:sldId id="370" r:id="rId28"/>
   </p:sldIdLst>
   <p:sldSz cx="12192000" cy="6858000"/>
   <p:notesSz cx="6858000" cy="9144000"/>
@@ -115,19 +119,23 @@
             <p14:sldId id="351"/>
             <p14:sldId id="352"/>
             <p14:sldId id="353"/>
+            <p14:sldId id="362"/>
+            <p14:sldId id="363"/>
+            <p14:sldId id="357"/>
+            <p14:sldId id="358"/>
+            <p14:sldId id="367"/>
+            <p14:sldId id="359"/>
+            <p14:sldId id="365"/>
+            <p14:sldId id="360"/>
+            <p14:sldId id="364"/>
+            <p14:sldId id="368"/>
+            <p14:sldId id="366"/>
+            <p14:sldId id="361"/>
+            <p14:sldId id="369"/>
             <p14:sldId id="354"/>
             <p14:sldId id="355"/>
             <p14:sldId id="356"/>
-            <p14:sldId id="357"/>
-            <p14:sldId id="358"/>
-            <p14:sldId id="359"/>
-            <p14:sldId id="360"/>
-            <p14:sldId id="361"/>
-            <p14:sldId id="362"/>
-            <p14:sldId id="363"/>
-            <p14:sldId id="365"/>
-            <p14:sldId id="364"/>
-            <p14:sldId id="366"/>
+            <p14:sldId id="370"/>
           </p14:sldIdLst>
         </p14:section>
       </p14:sectionLst>
@@ -5959,7 +5967,7 @@
           </a:ln>
           <a:extLst>
             <a:ext uri="{C572A759-6A51-4108-AA02-DFA0A04FC94B}">
-              <ma14:wrappingTextBoxFlag xmlns="" xmlns:ma14="http://schemas.microsoft.com/office/mac/drawingml/2011/main" val="1"/>
+              <ma14:wrappingTextBoxFlag xmlns:ma14="http://schemas.microsoft.com/office/mac/drawingml/2011/main" xmlns="" val="1"/>
             </a:ext>
           </a:extLst>
         </p:spPr>
@@ -6166,7 +6174,7 @@
           </a:ln>
           <a:extLst>
             <a:ext uri="{C572A759-6A51-4108-AA02-DFA0A04FC94B}">
-              <ma14:wrappingTextBoxFlag xmlns="" xmlns:ma14="http://schemas.microsoft.com/office/mac/drawingml/2011/main" val="1"/>
+              <ma14:wrappingTextBoxFlag xmlns:ma14="http://schemas.microsoft.com/office/mac/drawingml/2011/main" xmlns="" val="1"/>
             </a:ext>
           </a:extLst>
         </p:spPr>
@@ -7065,7 +7073,7 @@
           </a:ln>
           <a:extLst>
             <a:ext uri="{C572A759-6A51-4108-AA02-DFA0A04FC94B}">
-              <ma14:wrappingTextBoxFlag xmlns="" xmlns:ma14="http://schemas.microsoft.com/office/mac/drawingml/2011/main" val="1"/>
+              <ma14:wrappingTextBoxFlag xmlns:ma14="http://schemas.microsoft.com/office/mac/drawingml/2011/main" xmlns="" val="1"/>
             </a:ext>
           </a:extLst>
         </p:spPr>
@@ -7900,7 +7908,7 @@
           </a:ln>
           <a:extLst>
             <a:ext uri="{C572A759-6A51-4108-AA02-DFA0A04FC94B}">
-              <ma14:wrappingTextBoxFlag xmlns="" xmlns:ma14="http://schemas.microsoft.com/office/mac/drawingml/2011/main" val="1"/>
+              <ma14:wrappingTextBoxFlag xmlns:ma14="http://schemas.microsoft.com/office/mac/drawingml/2011/main" xmlns="" val="1"/>
             </a:ext>
           </a:extLst>
         </p:spPr>
@@ -12277,7 +12285,7 @@
           <p:cNvPr id="2" name="Text Placeholder 1">
             <a:extLst>
               <a:ext uri="{FF2B5EF4-FFF2-40B4-BE49-F238E27FC236}">
-                <a16:creationId xmlns:a16="http://schemas.microsoft.com/office/drawing/2014/main" id="{71DE8418-632F-2354-801D-974AEB04AD4A}"/>
+                <a16:creationId xmlns:a16="http://schemas.microsoft.com/office/drawing/2014/main" id="{B3F893BD-9D33-8B8F-DCD0-3EC00FAAFF3C}"/>
               </a:ext>
             </a:extLst>
           </p:cNvPr>
@@ -12293,316 +12301,17 @@
           <a:bodyPr/>
           <a:lstStyle/>
           <a:p>
-            <a:pPr marL="55397" indent="0">
-              <a:buNone/>
-            </a:pPr>
-            <a:r>
-              <a:rPr lang="en-GB" sz="2000" dirty="0" err="1">
-                <a:solidFill>
-                  <a:srgbClr val="000000"/>
-                </a:solidFill>
-              </a:rPr>
-              <a:t>Q.submit</a:t>
-            </a:r>
-            <a:r>
-              <a:rPr lang="en-GB" sz="2000" dirty="0">
-                <a:solidFill>
-                  <a:srgbClr val="000000"/>
-                </a:solidFill>
-              </a:rPr>
-              <a:t>([&amp;](handler&amp; h) {		</a:t>
-            </a:r>
-            <a:r>
-              <a:rPr lang="en-GB" sz="2000" dirty="0">
-                <a:solidFill>
-                  <a:srgbClr val="008000"/>
-                </a:solidFill>
-              </a:rPr>
-              <a:t>// function called on host</a:t>
-            </a:r>
-            <a:endParaRPr lang="en-GB" sz="2000" dirty="0">
-              <a:solidFill>
-                <a:srgbClr val="000000"/>
-              </a:solidFill>
-            </a:endParaRPr>
-          </a:p>
-          <a:p>
-            <a:pPr marL="55397" indent="0">
-              <a:buNone/>
-            </a:pPr>
-            <a:r>
-              <a:rPr lang="en-GB" sz="2000" dirty="0">
-                <a:solidFill>
-                  <a:srgbClr val="000000"/>
-                </a:solidFill>
-              </a:rPr>
-              <a:t>	accessor </a:t>
-            </a:r>
-            <a:r>
-              <a:rPr lang="en-GB" sz="2000" dirty="0" err="1">
-                <a:solidFill>
-                  <a:srgbClr val="000000"/>
-                </a:solidFill>
-              </a:rPr>
-              <a:t>acc</a:t>
-            </a:r>
-            <a:r>
-              <a:rPr lang="en-GB" sz="2000" dirty="0">
-                <a:solidFill>
-                  <a:srgbClr val="000000"/>
-                </a:solidFill>
-              </a:rPr>
-              <a:t>{ B, h };			</a:t>
-            </a:r>
-            <a:r>
-              <a:rPr lang="en-GB" sz="2000" dirty="0">
-                <a:solidFill>
-                  <a:srgbClr val="008000"/>
-                </a:solidFill>
-              </a:rPr>
-              <a:t>// host code defining accessor, setting up dependencies</a:t>
-            </a:r>
-            <a:endParaRPr lang="en-GB" sz="2000" dirty="0">
-              <a:solidFill>
-                <a:srgbClr val="000000"/>
-              </a:solidFill>
-            </a:endParaRPr>
-          </a:p>
-          <a:p>
-            <a:pPr marL="55397" indent="0">
-              <a:buNone/>
-            </a:pPr>
-            <a:r>
-              <a:rPr lang="en-US" sz="2000" dirty="0">
-                <a:solidFill>
-                  <a:srgbClr val="000000"/>
-                </a:solidFill>
-              </a:rPr>
-              <a:t>	</a:t>
-            </a:r>
-            <a:r>
-              <a:rPr lang="en-GB" sz="2000" dirty="0" err="1">
-                <a:solidFill>
-                  <a:srgbClr val="000000"/>
-                </a:solidFill>
-              </a:rPr>
-              <a:t>h.parallel_for</a:t>
-            </a:r>
-            <a:r>
-              <a:rPr lang="en-GB" sz="2000" dirty="0">
-                <a:solidFill>
-                  <a:srgbClr val="000000"/>
-                </a:solidFill>
-              </a:rPr>
-              <a:t>(size, [=](</a:t>
-            </a:r>
-            <a:r>
-              <a:rPr lang="en-GB" sz="2000" dirty="0">
-                <a:solidFill>
-                  <a:srgbClr val="0000FF"/>
-                </a:solidFill>
-              </a:rPr>
-              <a:t>auto</a:t>
-            </a:r>
-            <a:r>
-              <a:rPr lang="en-GB" sz="2000" dirty="0">
-                <a:solidFill>
-                  <a:srgbClr val="000000"/>
-                </a:solidFill>
-              </a:rPr>
-              <a:t>&amp; </a:t>
-            </a:r>
-            <a:r>
-              <a:rPr lang="en-GB" sz="2000" dirty="0" err="1">
-                <a:solidFill>
-                  <a:srgbClr val="000000"/>
-                </a:solidFill>
-              </a:rPr>
-              <a:t>idx</a:t>
-            </a:r>
-            <a:r>
-              <a:rPr lang="en-GB" sz="2000" dirty="0">
-                <a:solidFill>
-                  <a:srgbClr val="000000"/>
-                </a:solidFill>
-              </a:rPr>
-              <a:t>) {</a:t>
-            </a:r>
-          </a:p>
-          <a:p>
-            <a:pPr marL="55397" indent="0">
-              <a:buNone/>
-            </a:pPr>
-            <a:r>
-              <a:rPr lang="en-GB" sz="2000" dirty="0">
-                <a:solidFill>
-                  <a:srgbClr val="000000"/>
-                </a:solidFill>
-              </a:rPr>
-              <a:t>		</a:t>
-            </a:r>
-            <a:r>
-              <a:rPr lang="en-GB" sz="2000" dirty="0" err="1">
-                <a:solidFill>
-                  <a:srgbClr val="000000"/>
-                </a:solidFill>
-              </a:rPr>
-              <a:t>acc</a:t>
-            </a:r>
-            <a:r>
-              <a:rPr lang="en-GB" sz="2000" dirty="0">
-                <a:solidFill>
-                  <a:srgbClr val="000000"/>
-                </a:solidFill>
-              </a:rPr>
-              <a:t>[</a:t>
-            </a:r>
-            <a:r>
-              <a:rPr lang="en-GB" sz="2000" dirty="0" err="1">
-                <a:solidFill>
-                  <a:srgbClr val="000000"/>
-                </a:solidFill>
-              </a:rPr>
-              <a:t>idx</a:t>
-            </a:r>
-            <a:r>
-              <a:rPr lang="en-GB" sz="2000" dirty="0">
-                <a:solidFill>
-                  <a:srgbClr val="000000"/>
-                </a:solidFill>
-              </a:rPr>
-              <a:t>] = </a:t>
-            </a:r>
-            <a:r>
-              <a:rPr lang="en-GB" sz="2000" dirty="0" err="1">
-                <a:solidFill>
-                  <a:srgbClr val="000000"/>
-                </a:solidFill>
-              </a:rPr>
-              <a:t>idx</a:t>
-            </a:r>
-            <a:r>
-              <a:rPr lang="en-GB" sz="2000" dirty="0">
-                <a:solidFill>
-                  <a:srgbClr val="000000"/>
-                </a:solidFill>
-              </a:rPr>
-              <a:t>;				</a:t>
-            </a:r>
-            <a:r>
-              <a:rPr lang="en-GB" sz="2000" dirty="0">
-                <a:solidFill>
-                  <a:srgbClr val="008000"/>
-                </a:solidFill>
-              </a:rPr>
-              <a:t>// Device code to be run when runtime dependencies are met</a:t>
-            </a:r>
-            <a:endParaRPr lang="en-GB" sz="2000" dirty="0">
-              <a:solidFill>
-                <a:srgbClr val="000000"/>
-              </a:solidFill>
-            </a:endParaRPr>
-          </a:p>
-          <a:p>
-            <a:pPr marL="55397" indent="0">
-              <a:buNone/>
-            </a:pPr>
-            <a:r>
-              <a:rPr lang="en-US" sz="2000" dirty="0">
-                <a:solidFill>
-                  <a:srgbClr val="000000"/>
-                </a:solidFill>
-              </a:rPr>
-              <a:t>	});</a:t>
-            </a:r>
-          </a:p>
-          <a:p>
-            <a:pPr marL="55397" indent="0">
-              <a:buNone/>
-            </a:pPr>
-            <a:r>
-              <a:rPr lang="en-US" sz="2000" dirty="0">
-                <a:solidFill>
-                  <a:srgbClr val="000000"/>
-                </a:solidFill>
-              </a:rPr>
-              <a:t>});</a:t>
-            </a:r>
-          </a:p>
-          <a:p>
-            <a:pPr marL="55397" indent="0">
-              <a:buNone/>
-            </a:pPr>
-            <a:endParaRPr lang="en-US" sz="2000" dirty="0">
-              <a:solidFill>
-                <a:srgbClr val="000000"/>
-              </a:solidFill>
-            </a:endParaRPr>
-          </a:p>
-          <a:p>
-            <a:pPr marL="55397" indent="0">
-              <a:buNone/>
-            </a:pPr>
-            <a:endParaRPr lang="en-US" sz="2000" dirty="0">
-              <a:solidFill>
-                <a:srgbClr val="000000"/>
-              </a:solidFill>
-            </a:endParaRPr>
-          </a:p>
-          <a:p>
-            <a:pPr marL="55397" indent="0">
-              <a:buNone/>
-            </a:pPr>
-            <a:endParaRPr lang="en-US" sz="2000" dirty="0">
-              <a:solidFill>
-                <a:srgbClr val="000000"/>
-              </a:solidFill>
-            </a:endParaRPr>
-          </a:p>
-          <a:p>
-            <a:pPr marL="55397" indent="0">
-              <a:buNone/>
-            </a:pPr>
-            <a:endParaRPr lang="en-US" sz="2000" dirty="0">
-              <a:solidFill>
-                <a:srgbClr val="000000"/>
-              </a:solidFill>
-            </a:endParaRPr>
-          </a:p>
-          <a:p>
-            <a:pPr marL="55397" indent="0">
-              <a:buNone/>
-            </a:pPr>
-            <a:endParaRPr lang="en-US" sz="2000" dirty="0">
-              <a:solidFill>
-                <a:srgbClr val="000000"/>
-              </a:solidFill>
-            </a:endParaRPr>
-          </a:p>
-          <a:p>
-            <a:pPr marL="55397" indent="0">
-              <a:buNone/>
-            </a:pPr>
-            <a:endParaRPr lang="en-US" sz="2000" dirty="0">
-              <a:solidFill>
-                <a:srgbClr val="000000"/>
-              </a:solidFill>
-            </a:endParaRPr>
-          </a:p>
-          <a:p>
-            <a:pPr marL="55397" indent="0">
-              <a:buNone/>
-            </a:pPr>
-            <a:r>
-              <a:rPr lang="en-US" sz="2000" i="1" dirty="0"/>
-              <a:t>Source: Data Parallel C++, James Reinders et al. pg. 27</a:t>
-            </a:r>
-          </a:p>
-          <a:p>
-            <a:pPr marL="55397" indent="0">
-              <a:buNone/>
-            </a:pPr>
-            <a:endParaRPr lang="en-US" sz="2000" dirty="0"/>
+            <a:r>
+              <a:rPr lang="en-US" dirty="0"/>
+              <a:t>vector_addition.cpp</a:t>
+            </a:r>
+          </a:p>
+          <a:p>
+            <a:pPr lvl="1"/>
+            <a:r>
+              <a:rPr lang="en-US" dirty="0"/>
+              <a:t>https://github.com/BenjaminMFindley/Reconfig-2-SYCL-DPCPP/blob/main/Examples/vector_addition/vector_addition.cpp</a:t>
+            </a:r>
           </a:p>
         </p:txBody>
       </p:sp>
@@ -12611,7 +12320,7 @@
           <p:cNvPr id="3" name="Title 2">
             <a:extLst>
               <a:ext uri="{FF2B5EF4-FFF2-40B4-BE49-F238E27FC236}">
-                <a16:creationId xmlns:a16="http://schemas.microsoft.com/office/drawing/2014/main" id="{CFDE7D4A-1B7C-A57B-3028-9B6BE534194C}"/>
+                <a16:creationId xmlns:a16="http://schemas.microsoft.com/office/drawing/2014/main" id="{ECBB6F3A-17E5-5A14-938D-FC701C86AD40}"/>
               </a:ext>
             </a:extLst>
           </p:cNvPr>
@@ -12628,8 +12337,8 @@
           <a:lstStyle/>
           <a:p>
             <a:r>
-              <a:rPr lang="en-US" sz="4000" dirty="0"/>
-              <a:t>Device Work Submission Example</a:t>
+              <a:rPr lang="en-US" dirty="0"/>
+              <a:t>Example</a:t>
             </a:r>
           </a:p>
         </p:txBody>
@@ -12637,7 +12346,7 @@
     </p:spTree>
     <p:extLst>
       <p:ext uri="{BB962C8B-B14F-4D97-AF65-F5344CB8AC3E}">
-        <p14:creationId xmlns:p14="http://schemas.microsoft.com/office/powerpoint/2010/main" val="825401750"/>
+        <p14:creationId xmlns:p14="http://schemas.microsoft.com/office/powerpoint/2010/main" val="1061019929"/>
       </p:ext>
     </p:extLst>
   </p:cSld>
@@ -12855,6 +12564,133 @@
           <p:cNvPr id="2" name="Text Placeholder 1">
             <a:extLst>
               <a:ext uri="{FF2B5EF4-FFF2-40B4-BE49-F238E27FC236}">
+                <a16:creationId xmlns:a16="http://schemas.microsoft.com/office/drawing/2014/main" id="{DA06091D-5EE0-A7C9-F694-709DCE63152D}"/>
+              </a:ext>
+            </a:extLst>
+          </p:cNvPr>
+          <p:cNvSpPr>
+            <a:spLocks noGrp="1"/>
+          </p:cNvSpPr>
+          <p:nvPr>
+            <p:ph type="body" sz="quarter" idx="11"/>
+          </p:nvPr>
+        </p:nvSpPr>
+        <p:spPr/>
+        <p:txBody>
+          <a:bodyPr/>
+          <a:lstStyle/>
+          <a:p>
+            <a:r>
+              <a:rPr lang="en-US" dirty="0"/>
+              <a:t>Dependencies between tasks may be implicit or explicit</a:t>
+            </a:r>
+          </a:p>
+          <a:p>
+            <a:r>
+              <a:rPr lang="en-US" dirty="0"/>
+              <a:t>Explicit dependency refers to dependency between computations</a:t>
+            </a:r>
+          </a:p>
+          <a:p>
+            <a:pPr lvl="1"/>
+            <a:r>
+              <a:rPr lang="en-US" dirty="0"/>
+              <a:t>Most relevant to code utilizing USM for data management</a:t>
+            </a:r>
+          </a:p>
+          <a:p>
+            <a:pPr lvl="1"/>
+            <a:r>
+              <a:rPr lang="en-US" dirty="0"/>
+              <a:t>Dependencies specified using events</a:t>
+            </a:r>
+          </a:p>
+          <a:p>
+            <a:r>
+              <a:rPr lang="en-US" dirty="0"/>
+              <a:t>Implicit dependency refers to dependency between data accesses</a:t>
+            </a:r>
+          </a:p>
+          <a:p>
+            <a:pPr lvl="1"/>
+            <a:r>
+              <a:rPr lang="en-US" dirty="0"/>
+              <a:t>Relevant to code utilizing buffers for data management</a:t>
+            </a:r>
+          </a:p>
+          <a:p>
+            <a:pPr lvl="1"/>
+            <a:r>
+              <a:rPr lang="en-US" dirty="0"/>
+              <a:t>Dependencies specified through accessors</a:t>
+            </a:r>
+          </a:p>
+        </p:txBody>
+      </p:sp>
+      <p:sp>
+        <p:nvSpPr>
+          <p:cNvPr id="3" name="Title 2">
+            <a:extLst>
+              <a:ext uri="{FF2B5EF4-FFF2-40B4-BE49-F238E27FC236}">
+                <a16:creationId xmlns:a16="http://schemas.microsoft.com/office/drawing/2014/main" id="{126BB3AB-6339-E49B-632B-D44244FA6DFB}"/>
+              </a:ext>
+            </a:extLst>
+          </p:cNvPr>
+          <p:cNvSpPr>
+            <a:spLocks noGrp="1"/>
+          </p:cNvSpPr>
+          <p:nvPr>
+            <p:ph type="title"/>
+          </p:nvPr>
+        </p:nvSpPr>
+        <p:spPr/>
+        <p:txBody>
+          <a:bodyPr/>
+          <a:lstStyle/>
+          <a:p>
+            <a:r>
+              <a:rPr lang="en-US" sz="4000" dirty="0"/>
+              <a:t>Dependency</a:t>
+            </a:r>
+          </a:p>
+        </p:txBody>
+      </p:sp>
+    </p:spTree>
+    <p:extLst>
+      <p:ext uri="{BB962C8B-B14F-4D97-AF65-F5344CB8AC3E}">
+        <p14:creationId xmlns:p14="http://schemas.microsoft.com/office/powerpoint/2010/main" val="1234116064"/>
+      </p:ext>
+    </p:extLst>
+  </p:cSld>
+  <p:clrMapOvr>
+    <a:masterClrMapping/>
+  </p:clrMapOvr>
+  <p:transition spd="med"/>
+</p:sld>
+</file>
+
+<file path=ppt/slides/slide13.xml><?xml version="1.0" encoding="utf-8"?>
+<p:sld xmlns:a="http://schemas.openxmlformats.org/drawingml/2006/main" xmlns:r="http://schemas.openxmlformats.org/officeDocument/2006/relationships" xmlns:p="http://schemas.openxmlformats.org/presentationml/2006/main">
+  <p:cSld>
+    <p:spTree>
+      <p:nvGrpSpPr>
+        <p:cNvPr id="1" name=""/>
+        <p:cNvGrpSpPr/>
+        <p:nvPr/>
+      </p:nvGrpSpPr>
+      <p:grpSpPr>
+        <a:xfrm>
+          <a:off x="0" y="0"/>
+          <a:ext cx="0" cy="0"/>
+          <a:chOff x="0" y="0"/>
+          <a:chExt cx="0" cy="0"/>
+        </a:xfrm>
+      </p:grpSpPr>
+      <p:sp>
+        <p:nvSpPr>
+          <p:cNvPr id="2" name="Text Placeholder 1">
+            <a:extLst>
+              <a:ext uri="{FF2B5EF4-FFF2-40B4-BE49-F238E27FC236}">
                 <a16:creationId xmlns:a16="http://schemas.microsoft.com/office/drawing/2014/main" id="{C3BD474B-A088-785E-CDD9-387C8DAC2FED}"/>
               </a:ext>
             </a:extLst>
@@ -13005,7 +12841,397 @@
 </p:sld>
 </file>
 
-<file path=ppt/slides/slide13.xml><?xml version="1.0" encoding="utf-8"?>
+<file path=ppt/slides/slide14.xml><?xml version="1.0" encoding="utf-8"?>
+<p:sld xmlns:a="http://schemas.openxmlformats.org/drawingml/2006/main" xmlns:r="http://schemas.openxmlformats.org/officeDocument/2006/relationships" xmlns:p="http://schemas.openxmlformats.org/presentationml/2006/main">
+  <p:cSld>
+    <p:spTree>
+      <p:nvGrpSpPr>
+        <p:cNvPr id="1" name=""/>
+        <p:cNvGrpSpPr/>
+        <p:nvPr/>
+      </p:nvGrpSpPr>
+      <p:grpSpPr>
+        <a:xfrm>
+          <a:off x="0" y="0"/>
+          <a:ext cx="0" cy="0"/>
+          <a:chOff x="0" y="0"/>
+          <a:chExt cx="0" cy="0"/>
+        </a:xfrm>
+      </p:grpSpPr>
+      <p:sp>
+        <p:nvSpPr>
+          <p:cNvPr id="2" name="Text Placeholder 1">
+            <a:extLst>
+              <a:ext uri="{FF2B5EF4-FFF2-40B4-BE49-F238E27FC236}">
+                <a16:creationId xmlns:a16="http://schemas.microsoft.com/office/drawing/2014/main" id="{B046716B-3344-F8B0-1CD3-64C7E657CD23}"/>
+              </a:ext>
+            </a:extLst>
+          </p:cNvPr>
+          <p:cNvSpPr>
+            <a:spLocks noGrp="1"/>
+          </p:cNvSpPr>
+          <p:nvPr>
+            <p:ph type="body" sz="quarter" idx="11"/>
+          </p:nvPr>
+        </p:nvSpPr>
+        <p:spPr/>
+        <p:txBody>
+          <a:bodyPr/>
+          <a:lstStyle/>
+          <a:p>
+            <a:r>
+              <a:rPr lang="en-US" dirty="0"/>
+              <a:t>Different tasks may depend on one another’s data</a:t>
+            </a:r>
+          </a:p>
+          <a:p>
+            <a:r>
+              <a:rPr lang="en-US" dirty="0"/>
+              <a:t>Data dependency exists in one of three forms</a:t>
+            </a:r>
+          </a:p>
+          <a:p>
+            <a:pPr lvl="1"/>
+            <a:r>
+              <a:rPr lang="en-US" dirty="0"/>
+              <a:t>Read-after-write: Task B must wait for Task A to read before it can write</a:t>
+            </a:r>
+          </a:p>
+          <a:p>
+            <a:pPr lvl="1"/>
+            <a:r>
+              <a:rPr lang="en-US" dirty="0"/>
+              <a:t>Write-after-read: Task B must wait for Task A to write before it can read</a:t>
+            </a:r>
+          </a:p>
+          <a:p>
+            <a:pPr lvl="1"/>
+            <a:r>
+              <a:rPr lang="en-US" dirty="0"/>
+              <a:t>Write-after-write: Task B must wait for Task A to write before it can write</a:t>
+            </a:r>
+          </a:p>
+          <a:p>
+            <a:r>
+              <a:rPr lang="en-US" dirty="0"/>
+              <a:t>These relationships are specified implicitly via</a:t>
+            </a:r>
+          </a:p>
+          <a:p>
+            <a:pPr lvl="1"/>
+            <a:r>
+              <a:rPr lang="en-US" dirty="0"/>
+              <a:t>Accessor access modes</a:t>
+            </a:r>
+          </a:p>
+          <a:p>
+            <a:pPr lvl="1"/>
+            <a:r>
+              <a:rPr lang="en-US" dirty="0"/>
+              <a:t>Task ordering</a:t>
+            </a:r>
+          </a:p>
+          <a:p>
+            <a:pPr lvl="2"/>
+            <a:r>
+              <a:rPr lang="en-GB" dirty="0"/>
+              <a:t>If two accessors exist for the same data, whichever task is submitted first will be executed first</a:t>
+            </a:r>
+          </a:p>
+          <a:p>
+            <a:pPr lvl="2"/>
+            <a:r>
+              <a:rPr lang="en-GB" dirty="0"/>
+              <a:t>An implicit dependency is created based on the types of access</a:t>
+            </a:r>
+            <a:endParaRPr lang="en-US" dirty="0"/>
+          </a:p>
+        </p:txBody>
+      </p:sp>
+      <p:sp>
+        <p:nvSpPr>
+          <p:cNvPr id="3" name="Title 2">
+            <a:extLst>
+              <a:ext uri="{FF2B5EF4-FFF2-40B4-BE49-F238E27FC236}">
+                <a16:creationId xmlns:a16="http://schemas.microsoft.com/office/drawing/2014/main" id="{EDAD6F0A-8C94-B427-B769-016D5681949C}"/>
+              </a:ext>
+            </a:extLst>
+          </p:cNvPr>
+          <p:cNvSpPr>
+            <a:spLocks noGrp="1"/>
+          </p:cNvSpPr>
+          <p:nvPr>
+            <p:ph type="title"/>
+          </p:nvPr>
+        </p:nvSpPr>
+        <p:spPr/>
+        <p:txBody>
+          <a:bodyPr/>
+          <a:lstStyle/>
+          <a:p>
+            <a:r>
+              <a:rPr lang="en-US" sz="4000" dirty="0"/>
+              <a:t>Data Dependency (Implicit)</a:t>
+            </a:r>
+          </a:p>
+        </p:txBody>
+      </p:sp>
+    </p:spTree>
+    <p:extLst>
+      <p:ext uri="{BB962C8B-B14F-4D97-AF65-F5344CB8AC3E}">
+        <p14:creationId xmlns:p14="http://schemas.microsoft.com/office/powerpoint/2010/main" val="3721103352"/>
+      </p:ext>
+    </p:extLst>
+  </p:cSld>
+  <p:clrMapOvr>
+    <a:masterClrMapping/>
+  </p:clrMapOvr>
+  <p:transition spd="med"/>
+</p:sld>
+</file>
+
+<file path=ppt/slides/slide15.xml><?xml version="1.0" encoding="utf-8"?>
+<p:sld xmlns:a="http://schemas.openxmlformats.org/drawingml/2006/main" xmlns:r="http://schemas.openxmlformats.org/officeDocument/2006/relationships" xmlns:p="http://schemas.openxmlformats.org/presentationml/2006/main">
+  <p:cSld>
+    <p:spTree>
+      <p:nvGrpSpPr>
+        <p:cNvPr id="1" name=""/>
+        <p:cNvGrpSpPr/>
+        <p:nvPr/>
+      </p:nvGrpSpPr>
+      <p:grpSpPr>
+        <a:xfrm>
+          <a:off x="0" y="0"/>
+          <a:ext cx="0" cy="0"/>
+          <a:chOff x="0" y="0"/>
+          <a:chExt cx="0" cy="0"/>
+        </a:xfrm>
+      </p:grpSpPr>
+      <p:sp>
+        <p:nvSpPr>
+          <p:cNvPr id="2" name="Text Placeholder 1">
+            <a:extLst>
+              <a:ext uri="{FF2B5EF4-FFF2-40B4-BE49-F238E27FC236}">
+                <a16:creationId xmlns:a16="http://schemas.microsoft.com/office/drawing/2014/main" id="{B3F893BD-9D33-8B8F-DCD0-3EC00FAAFF3C}"/>
+              </a:ext>
+            </a:extLst>
+          </p:cNvPr>
+          <p:cNvSpPr>
+            <a:spLocks noGrp="1"/>
+          </p:cNvSpPr>
+          <p:nvPr>
+            <p:ph type="body" sz="quarter" idx="11"/>
+          </p:nvPr>
+        </p:nvSpPr>
+        <p:spPr/>
+        <p:txBody>
+          <a:bodyPr/>
+          <a:lstStyle/>
+          <a:p>
+            <a:r>
+              <a:rPr lang="en-US" dirty="0"/>
+              <a:t>vector_addition_with_dependency.cpp</a:t>
+            </a:r>
+          </a:p>
+          <a:p>
+            <a:pPr lvl="1"/>
+            <a:r>
+              <a:rPr lang="en-US" dirty="0"/>
+              <a:t>https://github.com/BenjaminMFindley/Reconfig-2-SYCL-DPCPP/blob/main/Examples/vector_addition/vector_addition_with_dependency.cpp</a:t>
+            </a:r>
+          </a:p>
+        </p:txBody>
+      </p:sp>
+      <p:sp>
+        <p:nvSpPr>
+          <p:cNvPr id="3" name="Title 2">
+            <a:extLst>
+              <a:ext uri="{FF2B5EF4-FFF2-40B4-BE49-F238E27FC236}">
+                <a16:creationId xmlns:a16="http://schemas.microsoft.com/office/drawing/2014/main" id="{ECBB6F3A-17E5-5A14-938D-FC701C86AD40}"/>
+              </a:ext>
+            </a:extLst>
+          </p:cNvPr>
+          <p:cNvSpPr>
+            <a:spLocks noGrp="1"/>
+          </p:cNvSpPr>
+          <p:nvPr>
+            <p:ph type="title"/>
+          </p:nvPr>
+        </p:nvSpPr>
+        <p:spPr/>
+        <p:txBody>
+          <a:bodyPr/>
+          <a:lstStyle/>
+          <a:p>
+            <a:r>
+              <a:rPr lang="en-US" dirty="0"/>
+              <a:t>Example</a:t>
+            </a:r>
+          </a:p>
+        </p:txBody>
+      </p:sp>
+    </p:spTree>
+    <p:extLst>
+      <p:ext uri="{BB962C8B-B14F-4D97-AF65-F5344CB8AC3E}">
+        <p14:creationId xmlns:p14="http://schemas.microsoft.com/office/powerpoint/2010/main" val="495214213"/>
+      </p:ext>
+    </p:extLst>
+  </p:cSld>
+  <p:clrMapOvr>
+    <a:masterClrMapping/>
+  </p:clrMapOvr>
+  <p:transition spd="med"/>
+</p:sld>
+</file>
+
+<file path=ppt/slides/slide16.xml><?xml version="1.0" encoding="utf-8"?>
+<p:sld xmlns:a="http://schemas.openxmlformats.org/drawingml/2006/main" xmlns:r="http://schemas.openxmlformats.org/officeDocument/2006/relationships" xmlns:p="http://schemas.openxmlformats.org/presentationml/2006/main">
+  <p:cSld>
+    <p:spTree>
+      <p:nvGrpSpPr>
+        <p:cNvPr id="1" name=""/>
+        <p:cNvGrpSpPr/>
+        <p:nvPr/>
+      </p:nvGrpSpPr>
+      <p:grpSpPr>
+        <a:xfrm>
+          <a:off x="0" y="0"/>
+          <a:ext cx="0" cy="0"/>
+          <a:chOff x="0" y="0"/>
+          <a:chExt cx="0" cy="0"/>
+        </a:xfrm>
+      </p:grpSpPr>
+      <p:sp>
+        <p:nvSpPr>
+          <p:cNvPr id="2" name="Text Placeholder 1">
+            <a:extLst>
+              <a:ext uri="{FF2B5EF4-FFF2-40B4-BE49-F238E27FC236}">
+                <a16:creationId xmlns:a16="http://schemas.microsoft.com/office/drawing/2014/main" id="{0747A3D8-0DE5-6F41-FB3C-D6028072CF68}"/>
+              </a:ext>
+            </a:extLst>
+          </p:cNvPr>
+          <p:cNvSpPr>
+            <a:spLocks noGrp="1"/>
+          </p:cNvSpPr>
+          <p:nvPr>
+            <p:ph type="body" sz="quarter" idx="11"/>
+          </p:nvPr>
+        </p:nvSpPr>
+        <p:spPr/>
+        <p:txBody>
+          <a:bodyPr/>
+          <a:lstStyle/>
+          <a:p>
+            <a:r>
+              <a:rPr lang="en-US" dirty="0"/>
+              <a:t>A queue’s submit() function returns an </a:t>
+            </a:r>
+            <a:r>
+              <a:rPr lang="en-US" i="1" dirty="0"/>
+              <a:t>event</a:t>
+            </a:r>
+            <a:endParaRPr lang="en-US" dirty="0"/>
+          </a:p>
+          <a:p>
+            <a:r>
+              <a:rPr lang="en-US" dirty="0"/>
+              <a:t>Event objects can be captured and referenced for other purposes</a:t>
+            </a:r>
+          </a:p>
+          <a:p>
+            <a:pPr lvl="1"/>
+            <a:r>
+              <a:rPr lang="en-US" dirty="0"/>
+              <a:t>wait()</a:t>
+            </a:r>
+          </a:p>
+          <a:p>
+            <a:pPr lvl="1"/>
+            <a:r>
+              <a:rPr lang="en-US" dirty="0" err="1"/>
+              <a:t>depends_on</a:t>
+            </a:r>
+            <a:r>
+              <a:rPr lang="en-US" dirty="0"/>
+              <a:t>()</a:t>
+            </a:r>
+          </a:p>
+          <a:p>
+            <a:r>
+              <a:rPr lang="en-US" dirty="0" err="1"/>
+              <a:t>depends_on</a:t>
+            </a:r>
+            <a:r>
+              <a:rPr lang="en-US" dirty="0"/>
+              <a:t>() is a handler function used to specify dependency</a:t>
+            </a:r>
+          </a:p>
+          <a:p>
+            <a:pPr lvl="1"/>
+            <a:r>
+              <a:rPr lang="en-US" dirty="0"/>
+              <a:t>Specifies events on which the current operation depends</a:t>
+            </a:r>
+          </a:p>
+          <a:p>
+            <a:pPr lvl="1"/>
+            <a:r>
+              <a:rPr lang="en-US" dirty="0"/>
+              <a:t>Takes an event or vector of events as parameters</a:t>
+            </a:r>
+          </a:p>
+          <a:p>
+            <a:pPr lvl="1"/>
+            <a:r>
+              <a:rPr lang="en-US" dirty="0"/>
+              <a:t>Will wait until all specified events have finished before continuing execution</a:t>
+            </a:r>
+          </a:p>
+        </p:txBody>
+      </p:sp>
+      <p:sp>
+        <p:nvSpPr>
+          <p:cNvPr id="3" name="Title 2">
+            <a:extLst>
+              <a:ext uri="{FF2B5EF4-FFF2-40B4-BE49-F238E27FC236}">
+                <a16:creationId xmlns:a16="http://schemas.microsoft.com/office/drawing/2014/main" id="{8864E37C-F6C7-4A94-942B-13EF46C13A57}"/>
+              </a:ext>
+            </a:extLst>
+          </p:cNvPr>
+          <p:cNvSpPr>
+            <a:spLocks noGrp="1"/>
+          </p:cNvSpPr>
+          <p:nvPr>
+            <p:ph type="title"/>
+          </p:nvPr>
+        </p:nvSpPr>
+        <p:spPr/>
+        <p:txBody>
+          <a:bodyPr/>
+          <a:lstStyle/>
+          <a:p>
+            <a:r>
+              <a:rPr lang="en-US" sz="4000" dirty="0"/>
+              <a:t>Computational Dependency (Explicit)</a:t>
+            </a:r>
+          </a:p>
+        </p:txBody>
+      </p:sp>
+    </p:spTree>
+    <p:extLst>
+      <p:ext uri="{BB962C8B-B14F-4D97-AF65-F5344CB8AC3E}">
+        <p14:creationId xmlns:p14="http://schemas.microsoft.com/office/powerpoint/2010/main" val="2057883510"/>
+      </p:ext>
+    </p:extLst>
+  </p:cSld>
+  <p:clrMapOvr>
+    <a:masterClrMapping/>
+  </p:clrMapOvr>
+  <p:transition spd="med"/>
+</p:sld>
+</file>
+
+<file path=ppt/slides/slide17.xml><?xml version="1.0" encoding="utf-8"?>
 <p:sld xmlns:a="http://schemas.openxmlformats.org/drawingml/2006/main" xmlns:r="http://schemas.openxmlformats.org/officeDocument/2006/relationships" xmlns:p="http://schemas.openxmlformats.org/presentationml/2006/main">
   <p:cSld>
     <p:spTree>
@@ -13257,608 +13483,6 @@
 </p:sld>
 </file>
 
-<file path=ppt/slides/slide14.xml><?xml version="1.0" encoding="utf-8"?>
-<p:sld xmlns:a="http://schemas.openxmlformats.org/drawingml/2006/main" xmlns:r="http://schemas.openxmlformats.org/officeDocument/2006/relationships" xmlns:p="http://schemas.openxmlformats.org/presentationml/2006/main">
-  <p:cSld>
-    <p:spTree>
-      <p:nvGrpSpPr>
-        <p:cNvPr id="1" name=""/>
-        <p:cNvGrpSpPr/>
-        <p:nvPr/>
-      </p:nvGrpSpPr>
-      <p:grpSpPr>
-        <a:xfrm>
-          <a:off x="0" y="0"/>
-          <a:ext cx="0" cy="0"/>
-          <a:chOff x="0" y="0"/>
-          <a:chExt cx="0" cy="0"/>
-        </a:xfrm>
-      </p:grpSpPr>
-      <p:sp>
-        <p:nvSpPr>
-          <p:cNvPr id="2" name="Text Placeholder 1">
-            <a:extLst>
-              <a:ext uri="{FF2B5EF4-FFF2-40B4-BE49-F238E27FC236}">
-                <a16:creationId xmlns:a16="http://schemas.microsoft.com/office/drawing/2014/main" id="{4D907494-8A92-93DB-9B91-24DE589D25AE}"/>
-              </a:ext>
-            </a:extLst>
-          </p:cNvPr>
-          <p:cNvSpPr>
-            <a:spLocks noGrp="1"/>
-          </p:cNvSpPr>
-          <p:nvPr>
-            <p:ph type="body" sz="quarter" idx="11"/>
-          </p:nvPr>
-        </p:nvSpPr>
-        <p:spPr/>
-        <p:txBody>
-          <a:bodyPr/>
-          <a:lstStyle/>
-          <a:p>
-            <a:r>
-              <a:rPr lang="en-US" sz="2400" dirty="0"/>
-              <a:t>Data abstractions of a certain C++ type</a:t>
-            </a:r>
-          </a:p>
-          <a:p>
-            <a:pPr lvl="1"/>
-            <a:r>
-              <a:rPr lang="en-US" sz="2000" dirty="0"/>
-              <a:t>Can be scalar data types, vectors, or other user-defined class/structure</a:t>
-            </a:r>
-          </a:p>
-          <a:p>
-            <a:pPr lvl="2"/>
-            <a:r>
-              <a:rPr lang="en-US" sz="1600" dirty="0"/>
-              <a:t>Must not require the use of copy constructors for copying</a:t>
-            </a:r>
-          </a:p>
-          <a:p>
-            <a:r>
-              <a:rPr lang="en-US" sz="2400" dirty="0"/>
-              <a:t>Represent data objects, not memory addresses</a:t>
-            </a:r>
-          </a:p>
-          <a:p>
-            <a:pPr lvl="1"/>
-            <a:r>
-              <a:rPr lang="en-US" sz="2000" dirty="0"/>
-              <a:t>Cannot be accessed like C++ arrays</a:t>
-            </a:r>
-          </a:p>
-          <a:p>
-            <a:pPr lvl="1"/>
-            <a:r>
-              <a:rPr lang="en-US" sz="2000" i="1" dirty="0"/>
-              <a:t>Accessors</a:t>
-            </a:r>
-            <a:r>
-              <a:rPr lang="en-US" sz="2000" dirty="0"/>
-              <a:t> must be used to read from and write to buffers</a:t>
-            </a:r>
-          </a:p>
-          <a:p>
-            <a:r>
-              <a:rPr lang="en-US" sz="2400" dirty="0"/>
-              <a:t>A single buffer may be distributed across multiple locations</a:t>
-            </a:r>
-          </a:p>
-          <a:p>
-            <a:pPr lvl="1"/>
-            <a:r>
-              <a:rPr lang="en-US" sz="2000" dirty="0"/>
-              <a:t>Between discrete memory locations and devices</a:t>
-            </a:r>
-          </a:p>
-          <a:p>
-            <a:r>
-              <a:rPr lang="en-US" sz="2400" dirty="0"/>
-              <a:t>An empty buffer may be created by specifying a range for size</a:t>
-            </a:r>
-          </a:p>
-          <a:p>
-            <a:pPr lvl="1"/>
-            <a:r>
-              <a:rPr lang="en-US" sz="2000" dirty="0"/>
-              <a:t>Data must later be initialized before the buffer can be read from</a:t>
-            </a:r>
-          </a:p>
-          <a:p>
-            <a:r>
-              <a:rPr lang="en-US" sz="2400" dirty="0"/>
-              <a:t>Existing host data may be used to initialize a new buffer</a:t>
-            </a:r>
-          </a:p>
-          <a:p>
-            <a:pPr lvl="1"/>
-            <a:r>
-              <a:rPr lang="en-US" sz="2000" dirty="0"/>
-              <a:t>Accomplished by invoking a constructor that takes a pointer to an existing host allocation</a:t>
-            </a:r>
-          </a:p>
-          <a:p>
-            <a:r>
-              <a:rPr lang="en-US" sz="2400" dirty="0"/>
-              <a:t>May also be created from existing </a:t>
-            </a:r>
-            <a:r>
-              <a:rPr lang="en-US" sz="2400" dirty="0" err="1"/>
-              <a:t>cl_mem</a:t>
-            </a:r>
-            <a:r>
-              <a:rPr lang="en-US" sz="2400" dirty="0"/>
-              <a:t> objects if using OpenCL compatibility</a:t>
-            </a:r>
-          </a:p>
-        </p:txBody>
-      </p:sp>
-      <p:sp>
-        <p:nvSpPr>
-          <p:cNvPr id="3" name="Title 2">
-            <a:extLst>
-              <a:ext uri="{FF2B5EF4-FFF2-40B4-BE49-F238E27FC236}">
-                <a16:creationId xmlns:a16="http://schemas.microsoft.com/office/drawing/2014/main" id="{FD123E51-4B05-EDA0-53E0-A70993ACDAC0}"/>
-              </a:ext>
-            </a:extLst>
-          </p:cNvPr>
-          <p:cNvSpPr>
-            <a:spLocks noGrp="1"/>
-          </p:cNvSpPr>
-          <p:nvPr>
-            <p:ph type="title"/>
-          </p:nvPr>
-        </p:nvSpPr>
-        <p:spPr/>
-        <p:txBody>
-          <a:bodyPr/>
-          <a:lstStyle/>
-          <a:p>
-            <a:r>
-              <a:rPr lang="en-US" sz="4000" dirty="0"/>
-              <a:t>Buffers</a:t>
-            </a:r>
-          </a:p>
-        </p:txBody>
-      </p:sp>
-    </p:spTree>
-    <p:extLst>
-      <p:ext uri="{BB962C8B-B14F-4D97-AF65-F5344CB8AC3E}">
-        <p14:creationId xmlns:p14="http://schemas.microsoft.com/office/powerpoint/2010/main" val="476712468"/>
-      </p:ext>
-    </p:extLst>
-  </p:cSld>
-  <p:clrMapOvr>
-    <a:masterClrMapping/>
-  </p:clrMapOvr>
-  <p:transition spd="med"/>
-</p:sld>
-</file>
-
-<file path=ppt/slides/slide15.xml><?xml version="1.0" encoding="utf-8"?>
-<p:sld xmlns:a="http://schemas.openxmlformats.org/drawingml/2006/main" xmlns:r="http://schemas.openxmlformats.org/officeDocument/2006/relationships" xmlns:p="http://schemas.openxmlformats.org/presentationml/2006/main">
-  <p:cSld>
-    <p:spTree>
-      <p:nvGrpSpPr>
-        <p:cNvPr id="1" name=""/>
-        <p:cNvGrpSpPr/>
-        <p:nvPr/>
-      </p:nvGrpSpPr>
-      <p:grpSpPr>
-        <a:xfrm>
-          <a:off x="0" y="0"/>
-          <a:ext cx="0" cy="0"/>
-          <a:chOff x="0" y="0"/>
-          <a:chExt cx="0" cy="0"/>
-        </a:xfrm>
-      </p:grpSpPr>
-      <p:sp>
-        <p:nvSpPr>
-          <p:cNvPr id="2" name="Text Placeholder 1">
-            <a:extLst>
-              <a:ext uri="{FF2B5EF4-FFF2-40B4-BE49-F238E27FC236}">
-                <a16:creationId xmlns:a16="http://schemas.microsoft.com/office/drawing/2014/main" id="{F7E2A174-6243-6AEA-61E3-DE0E4AA2E1A3}"/>
-              </a:ext>
-            </a:extLst>
-          </p:cNvPr>
-          <p:cNvSpPr>
-            <a:spLocks noGrp="1"/>
-          </p:cNvSpPr>
-          <p:nvPr>
-            <p:ph type="body" sz="quarter" idx="11"/>
-          </p:nvPr>
-        </p:nvSpPr>
-        <p:spPr/>
-        <p:txBody>
-          <a:bodyPr/>
-          <a:lstStyle/>
-          <a:p>
-            <a:r>
-              <a:rPr lang="en-US" dirty="0"/>
-              <a:t>The only way in which to read from or write to buffers</a:t>
-            </a:r>
-          </a:p>
-          <a:p>
-            <a:r>
-              <a:rPr lang="en-US" dirty="0"/>
-              <a:t>Can be instantiated with read, write, or </a:t>
-            </a:r>
-            <a:r>
-              <a:rPr lang="en-US" dirty="0" err="1"/>
-              <a:t>read_write</a:t>
-            </a:r>
-            <a:r>
-              <a:rPr lang="en-US" dirty="0"/>
-              <a:t> access modes</a:t>
-            </a:r>
-          </a:p>
-          <a:p>
-            <a:pPr lvl="1"/>
-            <a:r>
-              <a:rPr lang="en-US" dirty="0"/>
-              <a:t>Accessors are </a:t>
-            </a:r>
-            <a:r>
-              <a:rPr lang="en-US" dirty="0" err="1"/>
-              <a:t>read_write</a:t>
-            </a:r>
-            <a:r>
-              <a:rPr lang="en-US" dirty="0"/>
-              <a:t> by default</a:t>
-            </a:r>
-          </a:p>
-          <a:p>
-            <a:r>
-              <a:rPr lang="en-US" dirty="0"/>
-              <a:t>Using appropriate access modes is important</a:t>
-            </a:r>
-          </a:p>
-          <a:p>
-            <a:pPr lvl="1"/>
-            <a:r>
-              <a:rPr lang="en-US" dirty="0"/>
-              <a:t>Provides implicit information used to help the runtime manage memory</a:t>
-            </a:r>
-          </a:p>
-          <a:p>
-            <a:pPr lvl="2"/>
-            <a:r>
-              <a:rPr lang="en-US" dirty="0"/>
-              <a:t>For example: </a:t>
-            </a:r>
-            <a:r>
-              <a:rPr lang="en-GB" dirty="0"/>
-              <a:t>read mode tells the runtime that it does not need to copy memory back to the host, as the device has not changed it.</a:t>
-            </a:r>
-          </a:p>
-          <a:p>
-            <a:pPr lvl="1"/>
-            <a:r>
-              <a:rPr lang="en-GB" dirty="0"/>
-              <a:t>Appropriate use of access modes will help the runtime optimize kernel scheduling and data migration</a:t>
-            </a:r>
-            <a:endParaRPr lang="en-US" dirty="0"/>
-          </a:p>
-        </p:txBody>
-      </p:sp>
-      <p:sp>
-        <p:nvSpPr>
-          <p:cNvPr id="3" name="Title 2">
-            <a:extLst>
-              <a:ext uri="{FF2B5EF4-FFF2-40B4-BE49-F238E27FC236}">
-                <a16:creationId xmlns:a16="http://schemas.microsoft.com/office/drawing/2014/main" id="{125E0148-C8ED-74C8-D65E-4538E79CBD63}"/>
-              </a:ext>
-            </a:extLst>
-          </p:cNvPr>
-          <p:cNvSpPr>
-            <a:spLocks noGrp="1"/>
-          </p:cNvSpPr>
-          <p:nvPr>
-            <p:ph type="title"/>
-          </p:nvPr>
-        </p:nvSpPr>
-        <p:spPr/>
-        <p:txBody>
-          <a:bodyPr/>
-          <a:lstStyle/>
-          <a:p>
-            <a:r>
-              <a:rPr lang="en-US" sz="4000" dirty="0"/>
-              <a:t>Accessors</a:t>
-            </a:r>
-          </a:p>
-        </p:txBody>
-      </p:sp>
-    </p:spTree>
-    <p:extLst>
-      <p:ext uri="{BB962C8B-B14F-4D97-AF65-F5344CB8AC3E}">
-        <p14:creationId xmlns:p14="http://schemas.microsoft.com/office/powerpoint/2010/main" val="4214608404"/>
-      </p:ext>
-    </p:extLst>
-  </p:cSld>
-  <p:clrMapOvr>
-    <a:masterClrMapping/>
-  </p:clrMapOvr>
-  <p:transition spd="med"/>
-</p:sld>
-</file>
-
-<file path=ppt/slides/slide16.xml><?xml version="1.0" encoding="utf-8"?>
-<p:sld xmlns:a="http://schemas.openxmlformats.org/drawingml/2006/main" xmlns:r="http://schemas.openxmlformats.org/officeDocument/2006/relationships" xmlns:p="http://schemas.openxmlformats.org/presentationml/2006/main">
-  <p:cSld>
-    <p:spTree>
-      <p:nvGrpSpPr>
-        <p:cNvPr id="1" name=""/>
-        <p:cNvGrpSpPr/>
-        <p:nvPr/>
-      </p:nvGrpSpPr>
-      <p:grpSpPr>
-        <a:xfrm>
-          <a:off x="0" y="0"/>
-          <a:ext cx="0" cy="0"/>
-          <a:chOff x="0" y="0"/>
-          <a:chExt cx="0" cy="0"/>
-        </a:xfrm>
-      </p:grpSpPr>
-      <p:sp>
-        <p:nvSpPr>
-          <p:cNvPr id="2" name="Text Placeholder 1">
-            <a:extLst>
-              <a:ext uri="{FF2B5EF4-FFF2-40B4-BE49-F238E27FC236}">
-                <a16:creationId xmlns:a16="http://schemas.microsoft.com/office/drawing/2014/main" id="{DA06091D-5EE0-A7C9-F694-709DCE63152D}"/>
-              </a:ext>
-            </a:extLst>
-          </p:cNvPr>
-          <p:cNvSpPr>
-            <a:spLocks noGrp="1"/>
-          </p:cNvSpPr>
-          <p:nvPr>
-            <p:ph type="body" sz="quarter" idx="11"/>
-          </p:nvPr>
-        </p:nvSpPr>
-        <p:spPr/>
-        <p:txBody>
-          <a:bodyPr/>
-          <a:lstStyle/>
-          <a:p>
-            <a:r>
-              <a:rPr lang="en-US" dirty="0"/>
-              <a:t>Dependencies between tasks may be implicit or explicit</a:t>
-            </a:r>
-          </a:p>
-          <a:p>
-            <a:r>
-              <a:rPr lang="en-US" dirty="0"/>
-              <a:t>Explicit dependency refers to dependency between computations</a:t>
-            </a:r>
-          </a:p>
-          <a:p>
-            <a:pPr lvl="1"/>
-            <a:r>
-              <a:rPr lang="en-US" dirty="0"/>
-              <a:t>Most relevant to code utilizing USM for data management</a:t>
-            </a:r>
-          </a:p>
-          <a:p>
-            <a:pPr lvl="1"/>
-            <a:r>
-              <a:rPr lang="en-US" dirty="0"/>
-              <a:t>Dependencies specified using events</a:t>
-            </a:r>
-          </a:p>
-          <a:p>
-            <a:r>
-              <a:rPr lang="en-US" dirty="0"/>
-              <a:t>Implicit dependency refers to dependency between data accesses</a:t>
-            </a:r>
-          </a:p>
-          <a:p>
-            <a:pPr lvl="1"/>
-            <a:r>
-              <a:rPr lang="en-US" dirty="0"/>
-              <a:t>Relevant to code utilizing buffers for data management</a:t>
-            </a:r>
-          </a:p>
-          <a:p>
-            <a:pPr lvl="1"/>
-            <a:r>
-              <a:rPr lang="en-US" dirty="0"/>
-              <a:t>Dependencies specified through accessors</a:t>
-            </a:r>
-          </a:p>
-        </p:txBody>
-      </p:sp>
-      <p:sp>
-        <p:nvSpPr>
-          <p:cNvPr id="3" name="Title 2">
-            <a:extLst>
-              <a:ext uri="{FF2B5EF4-FFF2-40B4-BE49-F238E27FC236}">
-                <a16:creationId xmlns:a16="http://schemas.microsoft.com/office/drawing/2014/main" id="{126BB3AB-6339-E49B-632B-D44244FA6DFB}"/>
-              </a:ext>
-            </a:extLst>
-          </p:cNvPr>
-          <p:cNvSpPr>
-            <a:spLocks noGrp="1"/>
-          </p:cNvSpPr>
-          <p:nvPr>
-            <p:ph type="title"/>
-          </p:nvPr>
-        </p:nvSpPr>
-        <p:spPr/>
-        <p:txBody>
-          <a:bodyPr/>
-          <a:lstStyle/>
-          <a:p>
-            <a:r>
-              <a:rPr lang="en-US" sz="4000" dirty="0"/>
-              <a:t>Dependency</a:t>
-            </a:r>
-          </a:p>
-        </p:txBody>
-      </p:sp>
-    </p:spTree>
-    <p:extLst>
-      <p:ext uri="{BB962C8B-B14F-4D97-AF65-F5344CB8AC3E}">
-        <p14:creationId xmlns:p14="http://schemas.microsoft.com/office/powerpoint/2010/main" val="1234116064"/>
-      </p:ext>
-    </p:extLst>
-  </p:cSld>
-  <p:clrMapOvr>
-    <a:masterClrMapping/>
-  </p:clrMapOvr>
-  <p:transition spd="med"/>
-</p:sld>
-</file>
-
-<file path=ppt/slides/slide17.xml><?xml version="1.0" encoding="utf-8"?>
-<p:sld xmlns:a="http://schemas.openxmlformats.org/drawingml/2006/main" xmlns:r="http://schemas.openxmlformats.org/officeDocument/2006/relationships" xmlns:p="http://schemas.openxmlformats.org/presentationml/2006/main">
-  <p:cSld>
-    <p:spTree>
-      <p:nvGrpSpPr>
-        <p:cNvPr id="1" name=""/>
-        <p:cNvGrpSpPr/>
-        <p:nvPr/>
-      </p:nvGrpSpPr>
-      <p:grpSpPr>
-        <a:xfrm>
-          <a:off x="0" y="0"/>
-          <a:ext cx="0" cy="0"/>
-          <a:chOff x="0" y="0"/>
-          <a:chExt cx="0" cy="0"/>
-        </a:xfrm>
-      </p:grpSpPr>
-      <p:sp>
-        <p:nvSpPr>
-          <p:cNvPr id="2" name="Text Placeholder 1">
-            <a:extLst>
-              <a:ext uri="{FF2B5EF4-FFF2-40B4-BE49-F238E27FC236}">
-                <a16:creationId xmlns:a16="http://schemas.microsoft.com/office/drawing/2014/main" id="{B046716B-3344-F8B0-1CD3-64C7E657CD23}"/>
-              </a:ext>
-            </a:extLst>
-          </p:cNvPr>
-          <p:cNvSpPr>
-            <a:spLocks noGrp="1"/>
-          </p:cNvSpPr>
-          <p:nvPr>
-            <p:ph type="body" sz="quarter" idx="11"/>
-          </p:nvPr>
-        </p:nvSpPr>
-        <p:spPr/>
-        <p:txBody>
-          <a:bodyPr/>
-          <a:lstStyle/>
-          <a:p>
-            <a:r>
-              <a:rPr lang="en-US" dirty="0"/>
-              <a:t>Different tasks may depend on one another’s data</a:t>
-            </a:r>
-          </a:p>
-          <a:p>
-            <a:r>
-              <a:rPr lang="en-US" dirty="0"/>
-              <a:t>Data dependency exists in one of three forms</a:t>
-            </a:r>
-          </a:p>
-          <a:p>
-            <a:pPr lvl="1"/>
-            <a:r>
-              <a:rPr lang="en-US" dirty="0"/>
-              <a:t>Read-after-write: Task B must wait for Task A to read before it can write</a:t>
-            </a:r>
-          </a:p>
-          <a:p>
-            <a:pPr lvl="1"/>
-            <a:r>
-              <a:rPr lang="en-US" dirty="0"/>
-              <a:t>Write-after-read: Task B must wait for Task A to write before it can read</a:t>
-            </a:r>
-          </a:p>
-          <a:p>
-            <a:pPr lvl="1"/>
-            <a:r>
-              <a:rPr lang="en-US" dirty="0"/>
-              <a:t>Write-after-write: Task B must wait for Task A to write before it can write</a:t>
-            </a:r>
-          </a:p>
-          <a:p>
-            <a:r>
-              <a:rPr lang="en-US" dirty="0"/>
-              <a:t>These relationships are specified implicitly via</a:t>
-            </a:r>
-          </a:p>
-          <a:p>
-            <a:pPr lvl="1"/>
-            <a:r>
-              <a:rPr lang="en-US" dirty="0"/>
-              <a:t>Accessor access modes</a:t>
-            </a:r>
-          </a:p>
-          <a:p>
-            <a:pPr lvl="1"/>
-            <a:r>
-              <a:rPr lang="en-US" dirty="0"/>
-              <a:t>Task ordering</a:t>
-            </a:r>
-          </a:p>
-          <a:p>
-            <a:pPr lvl="2"/>
-            <a:r>
-              <a:rPr lang="en-GB" dirty="0"/>
-              <a:t>If two accessors exist for the same data, whichever task is submitted first will be executed first</a:t>
-            </a:r>
-          </a:p>
-          <a:p>
-            <a:pPr lvl="2"/>
-            <a:r>
-              <a:rPr lang="en-GB" dirty="0"/>
-              <a:t>An implicit dependency is created based on the types of access</a:t>
-            </a:r>
-            <a:endParaRPr lang="en-US" dirty="0"/>
-          </a:p>
-        </p:txBody>
-      </p:sp>
-      <p:sp>
-        <p:nvSpPr>
-          <p:cNvPr id="3" name="Title 2">
-            <a:extLst>
-              <a:ext uri="{FF2B5EF4-FFF2-40B4-BE49-F238E27FC236}">
-                <a16:creationId xmlns:a16="http://schemas.microsoft.com/office/drawing/2014/main" id="{EDAD6F0A-8C94-B427-B769-016D5681949C}"/>
-              </a:ext>
-            </a:extLst>
-          </p:cNvPr>
-          <p:cNvSpPr>
-            <a:spLocks noGrp="1"/>
-          </p:cNvSpPr>
-          <p:nvPr>
-            <p:ph type="title"/>
-          </p:nvPr>
-        </p:nvSpPr>
-        <p:spPr/>
-        <p:txBody>
-          <a:bodyPr/>
-          <a:lstStyle/>
-          <a:p>
-            <a:r>
-              <a:rPr lang="en-US" sz="4000" dirty="0"/>
-              <a:t>Data Dependency (Implicit)</a:t>
-            </a:r>
-          </a:p>
-        </p:txBody>
-      </p:sp>
-    </p:spTree>
-    <p:extLst>
-      <p:ext uri="{BB962C8B-B14F-4D97-AF65-F5344CB8AC3E}">
-        <p14:creationId xmlns:p14="http://schemas.microsoft.com/office/powerpoint/2010/main" val="3721103352"/>
-      </p:ext>
-    </p:extLst>
-  </p:cSld>
-  <p:clrMapOvr>
-    <a:masterClrMapping/>
-  </p:clrMapOvr>
-  <p:transition spd="med"/>
-</p:sld>
-</file>
-
 <file path=ppt/slides/slide18.xml><?xml version="1.0" encoding="utf-8"?>
 <p:sld xmlns:a="http://schemas.openxmlformats.org/drawingml/2006/main" xmlns:r="http://schemas.openxmlformats.org/officeDocument/2006/relationships" xmlns:p="http://schemas.openxmlformats.org/presentationml/2006/main">
   <p:cSld>
@@ -13881,7 +13505,7 @@
           <p:cNvPr id="2" name="Text Placeholder 1">
             <a:extLst>
               <a:ext uri="{FF2B5EF4-FFF2-40B4-BE49-F238E27FC236}">
-                <a16:creationId xmlns:a16="http://schemas.microsoft.com/office/drawing/2014/main" id="{0747A3D8-0DE5-6F41-FB3C-D6028072CF68}"/>
+                <a16:creationId xmlns:a16="http://schemas.microsoft.com/office/drawing/2014/main" id="{B3F893BD-9D33-8B8F-DCD0-3EC00FAAFF3C}"/>
               </a:ext>
             </a:extLst>
           </p:cNvPr>
@@ -13899,67 +13523,14 @@
           <a:p>
             <a:r>
               <a:rPr lang="en-US" dirty="0"/>
-              <a:t>A queue’s submit() function returns an </a:t>
-            </a:r>
-            <a:r>
-              <a:rPr lang="en-US" i="1" dirty="0"/>
-              <a:t>event</a:t>
-            </a:r>
-            <a:endParaRPr lang="en-US" dirty="0"/>
-          </a:p>
-          <a:p>
+              <a:t>vector_addition_usm.cpp</a:t>
+            </a:r>
+          </a:p>
+          <a:p>
+            <a:pPr lvl="1"/>
             <a:r>
               <a:rPr lang="en-US" dirty="0"/>
-              <a:t>Event objects can be captured and referenced for other purposes</a:t>
-            </a:r>
-          </a:p>
-          <a:p>
-            <a:pPr lvl="1"/>
-            <a:r>
-              <a:rPr lang="en-US" dirty="0"/>
-              <a:t>wait()</a:t>
-            </a:r>
-          </a:p>
-          <a:p>
-            <a:pPr lvl="1"/>
-            <a:r>
-              <a:rPr lang="en-US" dirty="0" err="1"/>
-              <a:t>depends_on</a:t>
-            </a:r>
-            <a:r>
-              <a:rPr lang="en-US" dirty="0"/>
-              <a:t>()</a:t>
-            </a:r>
-          </a:p>
-          <a:p>
-            <a:r>
-              <a:rPr lang="en-US" dirty="0" err="1"/>
-              <a:t>depends_on</a:t>
-            </a:r>
-            <a:r>
-              <a:rPr lang="en-US" dirty="0"/>
-              <a:t>() is a handler function used to specify dependency</a:t>
-            </a:r>
-          </a:p>
-          <a:p>
-            <a:pPr lvl="1"/>
-            <a:r>
-              <a:rPr lang="en-US" dirty="0"/>
-              <a:t>Specifies events on which the current operation depends</a:t>
-            </a:r>
-          </a:p>
-          <a:p>
-            <a:pPr lvl="1"/>
-            <a:r>
-              <a:rPr lang="en-US" dirty="0"/>
-              <a:t>Takes an event or vector of events as parameters</a:t>
-            </a:r>
-          </a:p>
-          <a:p>
-            <a:pPr lvl="1"/>
-            <a:r>
-              <a:rPr lang="en-US" dirty="0"/>
-              <a:t>Will wait until all specified events have finished before continuing execution</a:t>
+              <a:t>https://github.com/BenjaminMFindley/Reconfig-2-SYCL-DPCPP/blob/main/Examples/vector_addition/vector_addition_usm.cpp</a:t>
             </a:r>
           </a:p>
         </p:txBody>
@@ -13969,7 +13540,7 @@
           <p:cNvPr id="3" name="Title 2">
             <a:extLst>
               <a:ext uri="{FF2B5EF4-FFF2-40B4-BE49-F238E27FC236}">
-                <a16:creationId xmlns:a16="http://schemas.microsoft.com/office/drawing/2014/main" id="{8864E37C-F6C7-4A94-942B-13EF46C13A57}"/>
+                <a16:creationId xmlns:a16="http://schemas.microsoft.com/office/drawing/2014/main" id="{ECBB6F3A-17E5-5A14-938D-FC701C86AD40}"/>
               </a:ext>
             </a:extLst>
           </p:cNvPr>
@@ -13986,8 +13557,8 @@
           <a:lstStyle/>
           <a:p>
             <a:r>
-              <a:rPr lang="en-US" sz="4000" dirty="0"/>
-              <a:t>Computational Dependency (Explicit)</a:t>
+              <a:rPr lang="en-US" dirty="0"/>
+              <a:t>Example</a:t>
             </a:r>
           </a:p>
         </p:txBody>
@@ -13995,7 +13566,409 @@
     </p:spTree>
     <p:extLst>
       <p:ext uri="{BB962C8B-B14F-4D97-AF65-F5344CB8AC3E}">
-        <p14:creationId xmlns:p14="http://schemas.microsoft.com/office/powerpoint/2010/main" val="2057883510"/>
+        <p14:creationId xmlns:p14="http://schemas.microsoft.com/office/powerpoint/2010/main" val="123745058"/>
+      </p:ext>
+    </p:extLst>
+  </p:cSld>
+  <p:clrMapOvr>
+    <a:masterClrMapping/>
+  </p:clrMapOvr>
+  <p:transition spd="med"/>
+</p:sld>
+</file>
+
+<file path=ppt/slides/slide19.xml><?xml version="1.0" encoding="utf-8"?>
+<p:sld xmlns:a="http://schemas.openxmlformats.org/drawingml/2006/main" xmlns:r="http://schemas.openxmlformats.org/officeDocument/2006/relationships" xmlns:p="http://schemas.openxmlformats.org/presentationml/2006/main">
+  <p:cSld>
+    <p:spTree>
+      <p:nvGrpSpPr>
+        <p:cNvPr id="1" name=""/>
+        <p:cNvGrpSpPr/>
+        <p:nvPr/>
+      </p:nvGrpSpPr>
+      <p:grpSpPr>
+        <a:xfrm>
+          <a:off x="0" y="0"/>
+          <a:ext cx="0" cy="0"/>
+          <a:chOff x="0" y="0"/>
+          <a:chExt cx="0" cy="0"/>
+        </a:xfrm>
+      </p:grpSpPr>
+      <p:sp>
+        <p:nvSpPr>
+          <p:cNvPr id="2" name="Text Placeholder 1">
+            <a:extLst>
+              <a:ext uri="{FF2B5EF4-FFF2-40B4-BE49-F238E27FC236}">
+                <a16:creationId xmlns:a16="http://schemas.microsoft.com/office/drawing/2014/main" id="{BAA91BAA-AE1C-4B57-74D8-76174A2532B7}"/>
+              </a:ext>
+            </a:extLst>
+          </p:cNvPr>
+          <p:cNvSpPr>
+            <a:spLocks noGrp="1"/>
+          </p:cNvSpPr>
+          <p:nvPr>
+            <p:ph type="body" sz="quarter" idx="11"/>
+          </p:nvPr>
+        </p:nvSpPr>
+        <p:spPr/>
+        <p:txBody>
+          <a:bodyPr/>
+          <a:lstStyle/>
+          <a:p>
+            <a:r>
+              <a:rPr lang="en-US" sz="2400" dirty="0"/>
+              <a:t>Default selector chooses most capable device at runtime</a:t>
+            </a:r>
+          </a:p>
+          <a:p>
+            <a:r>
+              <a:rPr lang="en-US" sz="2400" dirty="0"/>
+              <a:t>Device selector classes exist to choose from specific class of device</a:t>
+            </a:r>
+          </a:p>
+          <a:p>
+            <a:pPr lvl="1"/>
+            <a:r>
+              <a:rPr lang="en-US" sz="2000" dirty="0" err="1"/>
+              <a:t>gpu_selector</a:t>
+            </a:r>
+            <a:endParaRPr lang="en-US" sz="2000" dirty="0"/>
+          </a:p>
+          <a:p>
+            <a:pPr lvl="1"/>
+            <a:r>
+              <a:rPr lang="en-US" sz="2000" dirty="0" err="1"/>
+              <a:t>cpu_selector</a:t>
+            </a:r>
+            <a:endParaRPr lang="en-US" sz="2000" dirty="0"/>
+          </a:p>
+          <a:p>
+            <a:pPr lvl="1"/>
+            <a:r>
+              <a:rPr lang="en-US" sz="2000" dirty="0" err="1"/>
+              <a:t>accelerator_selector</a:t>
+            </a:r>
+            <a:endParaRPr lang="en-US" sz="2000" dirty="0"/>
+          </a:p>
+          <a:p>
+            <a:pPr lvl="1"/>
+            <a:r>
+              <a:rPr lang="en-US" sz="2000" dirty="0" err="1"/>
+              <a:t>fpga_selector</a:t>
+            </a:r>
+            <a:r>
+              <a:rPr lang="en-US" sz="2000" dirty="0"/>
+              <a:t> exists via intel extension</a:t>
+            </a:r>
+          </a:p>
+          <a:p>
+            <a:pPr lvl="1"/>
+            <a:r>
+              <a:rPr lang="en-US" sz="2000" dirty="0"/>
+              <a:t>Useful for quick development, but typically want specific device for a task</a:t>
+            </a:r>
+          </a:p>
+          <a:p>
+            <a:r>
+              <a:rPr lang="en-US" sz="2400" dirty="0"/>
+              <a:t>Custom selectors created by extending </a:t>
+            </a:r>
+            <a:r>
+              <a:rPr lang="en-US" sz="2400" dirty="0" err="1"/>
+              <a:t>device_selector</a:t>
+            </a:r>
+            <a:r>
+              <a:rPr lang="en-US" sz="2400" dirty="0"/>
+              <a:t> base class</a:t>
+            </a:r>
+            <a:endParaRPr lang="en-GB" sz="2000" dirty="0">
+              <a:solidFill>
+                <a:srgbClr val="000000"/>
+              </a:solidFill>
+              <a:highlight>
+                <a:srgbClr val="FFFFFF"/>
+              </a:highlight>
+              <a:latin typeface="Consolas" panose="020B0609020204030204" pitchFamily="49" charset="0"/>
+            </a:endParaRPr>
+          </a:p>
+          <a:p>
+            <a:pPr marL="684047" lvl="2" indent="0">
+              <a:buNone/>
+            </a:pPr>
+            <a:r>
+              <a:rPr lang="en-GB" sz="2000" dirty="0">
+                <a:solidFill>
+                  <a:srgbClr val="000000"/>
+                </a:solidFill>
+                <a:highlight>
+                  <a:srgbClr val="FFFFFF"/>
+                </a:highlight>
+                <a:latin typeface="Consolas" panose="020B0609020204030204" pitchFamily="49" charset="0"/>
+              </a:rPr>
+              <a:t>virtual</a:t>
+            </a:r>
+            <a:r>
+              <a:rPr lang="en-GB" sz="2000" dirty="0">
+                <a:solidFill>
+                  <a:srgbClr val="A31515"/>
+                </a:solidFill>
+                <a:highlight>
+                  <a:srgbClr val="FFFFFF"/>
+                </a:highlight>
+                <a:latin typeface="Consolas" panose="020B0609020204030204" pitchFamily="49" charset="0"/>
+              </a:rPr>
+              <a:t> </a:t>
+            </a:r>
+            <a:r>
+              <a:rPr lang="en-GB" sz="2000" dirty="0">
+                <a:solidFill>
+                  <a:schemeClr val="accent1"/>
+                </a:solidFill>
+                <a:highlight>
+                  <a:srgbClr val="FFFFFF"/>
+                </a:highlight>
+                <a:latin typeface="Consolas" panose="020B0609020204030204" pitchFamily="49" charset="0"/>
+              </a:rPr>
+              <a:t>int</a:t>
+            </a:r>
+            <a:r>
+              <a:rPr lang="en-GB" sz="2000" dirty="0">
+                <a:solidFill>
+                  <a:srgbClr val="A31515"/>
+                </a:solidFill>
+                <a:highlight>
+                  <a:srgbClr val="FFFFFF"/>
+                </a:highlight>
+                <a:latin typeface="Consolas" panose="020B0609020204030204" pitchFamily="49" charset="0"/>
+              </a:rPr>
+              <a:t> </a:t>
+            </a:r>
+            <a:r>
+              <a:rPr lang="en-GB" sz="2000" dirty="0">
+                <a:solidFill>
+                  <a:srgbClr val="000000"/>
+                </a:solidFill>
+                <a:highlight>
+                  <a:srgbClr val="FFFFFF"/>
+                </a:highlight>
+                <a:latin typeface="Consolas" panose="020B0609020204030204" pitchFamily="49" charset="0"/>
+              </a:rPr>
+              <a:t>operator()(</a:t>
+            </a:r>
+            <a:r>
+              <a:rPr lang="en-GB" sz="2000" dirty="0" err="1">
+                <a:solidFill>
+                  <a:schemeClr val="accent1"/>
+                </a:solidFill>
+                <a:highlight>
+                  <a:srgbClr val="FFFFFF"/>
+                </a:highlight>
+                <a:latin typeface="Consolas" panose="020B0609020204030204" pitchFamily="49" charset="0"/>
+              </a:rPr>
+              <a:t>const</a:t>
+            </a:r>
+            <a:r>
+              <a:rPr lang="en-GB" sz="2000" dirty="0">
+                <a:solidFill>
+                  <a:srgbClr val="A31515"/>
+                </a:solidFill>
+                <a:highlight>
+                  <a:srgbClr val="FFFFFF"/>
+                </a:highlight>
+                <a:latin typeface="Consolas" panose="020B0609020204030204" pitchFamily="49" charset="0"/>
+              </a:rPr>
+              <a:t> </a:t>
+            </a:r>
+            <a:r>
+              <a:rPr lang="en-GB" sz="2000" dirty="0">
+                <a:solidFill>
+                  <a:srgbClr val="000080"/>
+                </a:solidFill>
+                <a:highlight>
+                  <a:srgbClr val="FFFFFF"/>
+                </a:highlight>
+                <a:latin typeface="Consolas" panose="020B0609020204030204" pitchFamily="49" charset="0"/>
+              </a:rPr>
+              <a:t>device</a:t>
+            </a:r>
+            <a:r>
+              <a:rPr lang="en-GB" sz="2000" dirty="0">
+                <a:solidFill>
+                  <a:srgbClr val="A31515"/>
+                </a:solidFill>
+                <a:highlight>
+                  <a:srgbClr val="FFFFFF"/>
+                </a:highlight>
+                <a:latin typeface="Consolas" panose="020B0609020204030204" pitchFamily="49" charset="0"/>
+              </a:rPr>
+              <a:t> </a:t>
+            </a:r>
+            <a:r>
+              <a:rPr lang="en-GB" sz="2000" dirty="0">
+                <a:solidFill>
+                  <a:srgbClr val="000000"/>
+                </a:solidFill>
+                <a:highlight>
+                  <a:srgbClr val="FFFFFF"/>
+                </a:highlight>
+                <a:latin typeface="Consolas" panose="020B0609020204030204" pitchFamily="49" charset="0"/>
+              </a:rPr>
+              <a:t>&amp;</a:t>
+            </a:r>
+            <a:r>
+              <a:rPr lang="en-GB" sz="2000" dirty="0">
+                <a:solidFill>
+                  <a:srgbClr val="000080"/>
+                </a:solidFill>
+                <a:highlight>
+                  <a:srgbClr val="FFFFFF"/>
+                </a:highlight>
+                <a:latin typeface="Consolas" panose="020B0609020204030204" pitchFamily="49" charset="0"/>
+              </a:rPr>
+              <a:t>dev</a:t>
+            </a:r>
+            <a:r>
+              <a:rPr lang="en-GB" sz="2000" dirty="0">
+                <a:solidFill>
+                  <a:srgbClr val="000000"/>
+                </a:solidFill>
+                <a:highlight>
+                  <a:srgbClr val="FFFFFF"/>
+                </a:highlight>
+                <a:latin typeface="Consolas" panose="020B0609020204030204" pitchFamily="49" charset="0"/>
+              </a:rPr>
+              <a:t>)</a:t>
+            </a:r>
+            <a:r>
+              <a:rPr lang="en-GB" sz="2000" dirty="0">
+                <a:solidFill>
+                  <a:srgbClr val="A31515"/>
+                </a:solidFill>
+                <a:highlight>
+                  <a:srgbClr val="FFFFFF"/>
+                </a:highlight>
+                <a:latin typeface="Consolas" panose="020B0609020204030204" pitchFamily="49" charset="0"/>
+              </a:rPr>
+              <a:t> </a:t>
+            </a:r>
+            <a:r>
+              <a:rPr lang="en-GB" sz="2000" dirty="0" err="1">
+                <a:solidFill>
+                  <a:schemeClr val="accent1"/>
+                </a:solidFill>
+                <a:highlight>
+                  <a:srgbClr val="FFFFFF"/>
+                </a:highlight>
+                <a:latin typeface="Consolas" panose="020B0609020204030204" pitchFamily="49" charset="0"/>
+              </a:rPr>
+              <a:t>const</a:t>
+            </a:r>
+            <a:r>
+              <a:rPr lang="en-GB" sz="2000" dirty="0">
+                <a:solidFill>
+                  <a:srgbClr val="A31515"/>
+                </a:solidFill>
+                <a:highlight>
+                  <a:srgbClr val="FFFFFF"/>
+                </a:highlight>
+                <a:latin typeface="Consolas" panose="020B0609020204030204" pitchFamily="49" charset="0"/>
+              </a:rPr>
+              <a:t> </a:t>
+            </a:r>
+            <a:r>
+              <a:rPr lang="en-GB" sz="2000" dirty="0">
+                <a:solidFill>
+                  <a:srgbClr val="000000"/>
+                </a:solidFill>
+                <a:highlight>
+                  <a:srgbClr val="FFFFFF"/>
+                </a:highlight>
+                <a:latin typeface="Consolas" panose="020B0609020204030204" pitchFamily="49" charset="0"/>
+              </a:rPr>
+              <a:t>{</a:t>
+            </a:r>
+          </a:p>
+          <a:p>
+            <a:pPr marL="684047" lvl="2" indent="0">
+              <a:buNone/>
+            </a:pPr>
+            <a:r>
+              <a:rPr lang="en-US" sz="2000" dirty="0">
+                <a:solidFill>
+                  <a:srgbClr val="A31515"/>
+                </a:solidFill>
+                <a:highlight>
+                  <a:srgbClr val="FFFFFF"/>
+                </a:highlight>
+                <a:latin typeface="Consolas" panose="020B0609020204030204" pitchFamily="49" charset="0"/>
+              </a:rPr>
+              <a:t>		</a:t>
+            </a:r>
+            <a:r>
+              <a:rPr lang="en-US" sz="2000" dirty="0">
+                <a:solidFill>
+                  <a:schemeClr val="accent2"/>
+                </a:solidFill>
+                <a:highlight>
+                  <a:srgbClr val="FFFFFF"/>
+                </a:highlight>
+                <a:latin typeface="Consolas" panose="020B0609020204030204" pitchFamily="49" charset="0"/>
+              </a:rPr>
+              <a:t>/* Device selection logic */</a:t>
+            </a:r>
+          </a:p>
+          <a:p>
+            <a:pPr marL="684047" lvl="2" indent="0">
+              <a:buNone/>
+            </a:pPr>
+            <a:r>
+              <a:rPr lang="en-US" sz="2000" dirty="0">
+                <a:solidFill>
+                  <a:srgbClr val="000000"/>
+                </a:solidFill>
+                <a:highlight>
+                  <a:srgbClr val="FFFFFF"/>
+                </a:highlight>
+                <a:latin typeface="Consolas" panose="020B0609020204030204" pitchFamily="49" charset="0"/>
+              </a:rPr>
+              <a:t>}</a:t>
+            </a:r>
+            <a:endParaRPr lang="en-US" sz="2000" dirty="0"/>
+          </a:p>
+        </p:txBody>
+      </p:sp>
+      <p:sp>
+        <p:nvSpPr>
+          <p:cNvPr id="3" name="Title 2">
+            <a:extLst>
+              <a:ext uri="{FF2B5EF4-FFF2-40B4-BE49-F238E27FC236}">
+                <a16:creationId xmlns:a16="http://schemas.microsoft.com/office/drawing/2014/main" id="{C6199DC5-494D-B309-311C-2E71E93FC696}"/>
+              </a:ext>
+            </a:extLst>
+          </p:cNvPr>
+          <p:cNvSpPr>
+            <a:spLocks noGrp="1"/>
+          </p:cNvSpPr>
+          <p:nvPr>
+            <p:ph type="title"/>
+          </p:nvPr>
+        </p:nvSpPr>
+        <p:spPr/>
+        <p:txBody>
+          <a:bodyPr/>
+          <a:lstStyle/>
+          <a:p>
+            <a:r>
+              <a:rPr lang="en-US" sz="4000" dirty="0"/>
+              <a:t>Device Selection</a:t>
+            </a:r>
+          </a:p>
+        </p:txBody>
+      </p:sp>
+    </p:spTree>
+    <p:extLst>
+      <p:ext uri="{BB962C8B-B14F-4D97-AF65-F5344CB8AC3E}">
+        <p14:creationId xmlns:p14="http://schemas.microsoft.com/office/powerpoint/2010/main" val="2682491685"/>
       </p:ext>
     </p:extLst>
   </p:cSld>
@@ -14210,6 +14183,570 @@
     <a:masterClrMapping/>
   </p:clrMapOvr>
   <p:transition spd="med" advTm="297800"/>
+</p:sld>
+</file>
+
+<file path=ppt/slides/slide20.xml><?xml version="1.0" encoding="utf-8"?>
+<p:sld xmlns:a="http://schemas.openxmlformats.org/drawingml/2006/main" xmlns:r="http://schemas.openxmlformats.org/officeDocument/2006/relationships" xmlns:p="http://schemas.openxmlformats.org/presentationml/2006/main">
+  <p:cSld>
+    <p:spTree>
+      <p:nvGrpSpPr>
+        <p:cNvPr id="1" name=""/>
+        <p:cNvGrpSpPr/>
+        <p:nvPr/>
+      </p:nvGrpSpPr>
+      <p:grpSpPr>
+        <a:xfrm>
+          <a:off x="0" y="0"/>
+          <a:ext cx="0" cy="0"/>
+          <a:chOff x="0" y="0"/>
+          <a:chExt cx="0" cy="0"/>
+        </a:xfrm>
+      </p:grpSpPr>
+      <p:sp>
+        <p:nvSpPr>
+          <p:cNvPr id="2" name="Text Placeholder 1">
+            <a:extLst>
+              <a:ext uri="{FF2B5EF4-FFF2-40B4-BE49-F238E27FC236}">
+                <a16:creationId xmlns:a16="http://schemas.microsoft.com/office/drawing/2014/main" id="{DDF92F08-23B2-CF92-23C8-BA44DE075FF0}"/>
+              </a:ext>
+            </a:extLst>
+          </p:cNvPr>
+          <p:cNvSpPr>
+            <a:spLocks noGrp="1"/>
+          </p:cNvSpPr>
+          <p:nvPr>
+            <p:ph type="body" sz="quarter" idx="11"/>
+          </p:nvPr>
+        </p:nvSpPr>
+        <p:spPr/>
+        <p:txBody>
+          <a:bodyPr/>
+          <a:lstStyle/>
+          <a:p>
+            <a:r>
+              <a:rPr lang="en-US" dirty="0"/>
+              <a:t>operator() is key to device selection</a:t>
+            </a:r>
+          </a:p>
+          <a:p>
+            <a:pPr lvl="1"/>
+            <a:r>
+              <a:rPr lang="en-US" dirty="0"/>
+              <a:t>Runs on each available device</a:t>
+            </a:r>
+          </a:p>
+          <a:p>
+            <a:pPr lvl="1"/>
+            <a:r>
+              <a:rPr lang="en-US" dirty="0"/>
+              <a:t>Returns an integer score for each device</a:t>
+            </a:r>
+          </a:p>
+          <a:p>
+            <a:pPr lvl="2"/>
+            <a:r>
+              <a:rPr lang="en-US" dirty="0"/>
+              <a:t>Device which returns highest score is selected</a:t>
+            </a:r>
+          </a:p>
+          <a:p>
+            <a:pPr lvl="2"/>
+            <a:r>
+              <a:rPr lang="en-US" dirty="0"/>
+              <a:t>Devices which return negative scores will never be selected</a:t>
+            </a:r>
+          </a:p>
+          <a:p>
+            <a:r>
+              <a:rPr lang="en-US" dirty="0"/>
+              <a:t>User is free to define any logic for scoring</a:t>
+            </a:r>
+          </a:p>
+          <a:p>
+            <a:pPr lvl="1"/>
+            <a:r>
+              <a:rPr lang="en-US" dirty="0"/>
+              <a:t>Allows for arbitrarily complex device selection logic</a:t>
+            </a:r>
+          </a:p>
+          <a:p>
+            <a:pPr lvl="1"/>
+            <a:r>
+              <a:rPr lang="en-US" dirty="0"/>
+              <a:t>In simple cases, selecting based on device name or vendor is sufficient</a:t>
+            </a:r>
+          </a:p>
+          <a:p>
+            <a:pPr lvl="1"/>
+            <a:endParaRPr lang="en-US" dirty="0"/>
+          </a:p>
+        </p:txBody>
+      </p:sp>
+      <p:sp>
+        <p:nvSpPr>
+          <p:cNvPr id="3" name="Title 2">
+            <a:extLst>
+              <a:ext uri="{FF2B5EF4-FFF2-40B4-BE49-F238E27FC236}">
+                <a16:creationId xmlns:a16="http://schemas.microsoft.com/office/drawing/2014/main" id="{5F41B62B-C379-7ADA-E458-B4786D2E87F4}"/>
+              </a:ext>
+            </a:extLst>
+          </p:cNvPr>
+          <p:cNvSpPr>
+            <a:spLocks noGrp="1"/>
+          </p:cNvSpPr>
+          <p:nvPr>
+            <p:ph type="title"/>
+          </p:nvPr>
+        </p:nvSpPr>
+        <p:spPr/>
+        <p:txBody>
+          <a:bodyPr/>
+          <a:lstStyle/>
+          <a:p>
+            <a:r>
+              <a:rPr lang="en-US" sz="4000" dirty="0"/>
+              <a:t>Custom Device Selection</a:t>
+            </a:r>
+          </a:p>
+        </p:txBody>
+      </p:sp>
+    </p:spTree>
+    <p:extLst>
+      <p:ext uri="{BB962C8B-B14F-4D97-AF65-F5344CB8AC3E}">
+        <p14:creationId xmlns:p14="http://schemas.microsoft.com/office/powerpoint/2010/main" val="16247701"/>
+      </p:ext>
+    </p:extLst>
+  </p:cSld>
+  <p:clrMapOvr>
+    <a:masterClrMapping/>
+  </p:clrMapOvr>
+  <p:transition spd="med"/>
+</p:sld>
+</file>
+
+<file path=ppt/slides/slide21.xml><?xml version="1.0" encoding="utf-8"?>
+<p:sld xmlns:a="http://schemas.openxmlformats.org/drawingml/2006/main" xmlns:r="http://schemas.openxmlformats.org/officeDocument/2006/relationships" xmlns:p="http://schemas.openxmlformats.org/presentationml/2006/main">
+  <p:cSld>
+    <p:spTree>
+      <p:nvGrpSpPr>
+        <p:cNvPr id="1" name=""/>
+        <p:cNvGrpSpPr/>
+        <p:nvPr/>
+      </p:nvGrpSpPr>
+      <p:grpSpPr>
+        <a:xfrm>
+          <a:off x="0" y="0"/>
+          <a:ext cx="0" cy="0"/>
+          <a:chOff x="0" y="0"/>
+          <a:chExt cx="0" cy="0"/>
+        </a:xfrm>
+      </p:grpSpPr>
+      <p:sp>
+        <p:nvSpPr>
+          <p:cNvPr id="2" name="Text Placeholder 1">
+            <a:extLst>
+              <a:ext uri="{FF2B5EF4-FFF2-40B4-BE49-F238E27FC236}">
+                <a16:creationId xmlns:a16="http://schemas.microsoft.com/office/drawing/2014/main" id="{8125CE29-810F-B059-3558-301534123DD1}"/>
+              </a:ext>
+            </a:extLst>
+          </p:cNvPr>
+          <p:cNvSpPr>
+            <a:spLocks noGrp="1"/>
+          </p:cNvSpPr>
+          <p:nvPr>
+            <p:ph type="body" sz="quarter" idx="11"/>
+          </p:nvPr>
+        </p:nvSpPr>
+        <p:spPr/>
+        <p:txBody>
+          <a:bodyPr/>
+          <a:lstStyle/>
+          <a:p>
+            <a:pPr marL="55397" indent="0">
+              <a:buNone/>
+            </a:pPr>
+            <a:r>
+              <a:rPr lang="en-US" sz="2000" dirty="0">
+                <a:solidFill>
+                  <a:schemeClr val="accent1"/>
+                </a:solidFill>
+              </a:rPr>
+              <a:t>class</a:t>
+            </a:r>
+            <a:r>
+              <a:rPr lang="en-US" sz="2000" dirty="0"/>
+              <a:t> </a:t>
+            </a:r>
+            <a:r>
+              <a:rPr lang="en-US" sz="2000" dirty="0" err="1"/>
+              <a:t>my_selector</a:t>
+            </a:r>
+            <a:r>
+              <a:rPr lang="en-US" sz="2000" dirty="0"/>
+              <a:t> : public </a:t>
+            </a:r>
+            <a:r>
+              <a:rPr lang="en-US" sz="2000" dirty="0" err="1"/>
+              <a:t>device_selector</a:t>
+            </a:r>
+            <a:r>
+              <a:rPr lang="en-US" sz="2000" dirty="0"/>
+              <a:t> {</a:t>
+            </a:r>
+          </a:p>
+          <a:p>
+            <a:pPr marL="55397" indent="0">
+              <a:buNone/>
+            </a:pPr>
+            <a:r>
+              <a:rPr lang="en-US" sz="2000" dirty="0"/>
+              <a:t>	public:</a:t>
+            </a:r>
+          </a:p>
+          <a:p>
+            <a:pPr marL="55397" indent="0">
+              <a:buNone/>
+            </a:pPr>
+            <a:r>
+              <a:rPr lang="en-US" sz="2000" dirty="0"/>
+              <a:t>	</a:t>
+            </a:r>
+            <a:r>
+              <a:rPr lang="en-US" sz="2000" dirty="0">
+                <a:solidFill>
+                  <a:schemeClr val="accent1"/>
+                </a:solidFill>
+              </a:rPr>
+              <a:t>int</a:t>
+            </a:r>
+            <a:r>
+              <a:rPr lang="en-US" sz="2000" dirty="0"/>
+              <a:t> operator()(</a:t>
+            </a:r>
+            <a:r>
+              <a:rPr lang="en-US" sz="2000" dirty="0">
+                <a:solidFill>
+                  <a:schemeClr val="accent1"/>
+                </a:solidFill>
+              </a:rPr>
+              <a:t>const</a:t>
+            </a:r>
+            <a:r>
+              <a:rPr lang="en-US" sz="2000" dirty="0"/>
+              <a:t> device &amp;dev) </a:t>
+            </a:r>
+            <a:r>
+              <a:rPr lang="en-US" sz="2000" dirty="0">
+                <a:solidFill>
+                  <a:schemeClr val="accent1"/>
+                </a:solidFill>
+              </a:rPr>
+              <a:t>const</a:t>
+            </a:r>
+            <a:r>
+              <a:rPr lang="en-US" sz="2000" dirty="0"/>
+              <a:t> override {</a:t>
+            </a:r>
+          </a:p>
+          <a:p>
+            <a:pPr marL="55397" indent="0">
+              <a:buNone/>
+            </a:pPr>
+            <a:r>
+              <a:rPr lang="en-US" sz="2000" dirty="0"/>
+              <a:t>		</a:t>
+            </a:r>
+            <a:r>
+              <a:rPr lang="en-US" sz="2000" dirty="0">
+                <a:solidFill>
+                  <a:schemeClr val="accent1"/>
+                </a:solidFill>
+              </a:rPr>
+              <a:t>if</a:t>
+            </a:r>
+            <a:r>
+              <a:rPr lang="en-US" sz="2000" dirty="0"/>
+              <a:t> (</a:t>
+            </a:r>
+          </a:p>
+          <a:p>
+            <a:pPr marL="55397" indent="0">
+              <a:buNone/>
+            </a:pPr>
+            <a:r>
+              <a:rPr lang="en-US" sz="2000" dirty="0"/>
+              <a:t>		</a:t>
+            </a:r>
+            <a:r>
+              <a:rPr lang="en-US" sz="2000" dirty="0" err="1"/>
+              <a:t>dev.get_info</a:t>
+            </a:r>
+            <a:r>
+              <a:rPr lang="en-US" sz="2000" dirty="0"/>
+              <a:t>&lt;info::device::name&gt;().find("</a:t>
+            </a:r>
+            <a:r>
+              <a:rPr lang="en-US" sz="2000" dirty="0" err="1"/>
+              <a:t>Arria</a:t>
+            </a:r>
+            <a:r>
+              <a:rPr lang="en-US" sz="2000" dirty="0"/>
+              <a:t>") != std::string::</a:t>
+            </a:r>
+            <a:r>
+              <a:rPr lang="en-US" sz="2000" dirty="0" err="1"/>
+              <a:t>npos</a:t>
+            </a:r>
+            <a:r>
+              <a:rPr lang="en-US" sz="2000" dirty="0"/>
+              <a:t> &amp;&amp;</a:t>
+            </a:r>
+          </a:p>
+          <a:p>
+            <a:pPr marL="55397" indent="0">
+              <a:buNone/>
+            </a:pPr>
+            <a:r>
+              <a:rPr lang="en-US" sz="2000" dirty="0"/>
+              <a:t>		</a:t>
+            </a:r>
+            <a:r>
+              <a:rPr lang="en-US" sz="2000" dirty="0" err="1"/>
+              <a:t>dev.get_info</a:t>
+            </a:r>
+            <a:r>
+              <a:rPr lang="en-US" sz="2000" dirty="0"/>
+              <a:t>&lt;info::device::vendor&gt;().find("Intel") != std::string::</a:t>
+            </a:r>
+            <a:r>
+              <a:rPr lang="en-US" sz="2000" dirty="0" err="1"/>
+              <a:t>npos</a:t>
+            </a:r>
+            <a:r>
+              <a:rPr lang="en-US" sz="2000" dirty="0"/>
+              <a:t>) {</a:t>
+            </a:r>
+          </a:p>
+          <a:p>
+            <a:pPr marL="55397" indent="0">
+              <a:buNone/>
+            </a:pPr>
+            <a:r>
+              <a:rPr lang="en-US" sz="2000" dirty="0"/>
+              <a:t>			</a:t>
+            </a:r>
+            <a:r>
+              <a:rPr lang="en-US" sz="2000" dirty="0">
+                <a:solidFill>
+                  <a:schemeClr val="accent1"/>
+                </a:solidFill>
+              </a:rPr>
+              <a:t>return</a:t>
+            </a:r>
+            <a:r>
+              <a:rPr lang="en-US" sz="2000" dirty="0"/>
+              <a:t> 1;</a:t>
+            </a:r>
+          </a:p>
+          <a:p>
+            <a:pPr marL="55397" indent="0">
+              <a:buNone/>
+            </a:pPr>
+            <a:r>
+              <a:rPr lang="en-US" sz="2000" dirty="0"/>
+              <a:t>		}</a:t>
+            </a:r>
+          </a:p>
+          <a:p>
+            <a:pPr marL="55397" indent="0">
+              <a:buNone/>
+            </a:pPr>
+            <a:r>
+              <a:rPr lang="en-US" sz="2000" dirty="0"/>
+              <a:t>		</a:t>
+            </a:r>
+            <a:r>
+              <a:rPr lang="en-US" sz="2000" dirty="0">
+                <a:solidFill>
+                  <a:schemeClr val="accent1"/>
+                </a:solidFill>
+              </a:rPr>
+              <a:t>return</a:t>
+            </a:r>
+            <a:r>
+              <a:rPr lang="en-US" sz="2000" dirty="0"/>
+              <a:t> -1;</a:t>
+            </a:r>
+          </a:p>
+          <a:p>
+            <a:pPr marL="55397" indent="0">
+              <a:buNone/>
+            </a:pPr>
+            <a:r>
+              <a:rPr lang="en-US" sz="2000" dirty="0"/>
+              <a:t>	}</a:t>
+            </a:r>
+          </a:p>
+          <a:p>
+            <a:pPr marL="55397" indent="0">
+              <a:buNone/>
+            </a:pPr>
+            <a:r>
+              <a:rPr lang="en-US" sz="2000" dirty="0"/>
+              <a:t>};</a:t>
+            </a:r>
+          </a:p>
+          <a:p>
+            <a:pPr marL="55397" indent="0">
+              <a:buNone/>
+            </a:pPr>
+            <a:endParaRPr lang="en-US" sz="2000" i="1" dirty="0"/>
+          </a:p>
+          <a:p>
+            <a:pPr marL="55397" indent="0">
+              <a:buNone/>
+            </a:pPr>
+            <a:r>
+              <a:rPr lang="en-US" sz="2000" i="1" dirty="0"/>
+              <a:t>Source: Data Parallel C++, James Reinders et al. pg. 46</a:t>
+            </a:r>
+          </a:p>
+        </p:txBody>
+      </p:sp>
+      <p:sp>
+        <p:nvSpPr>
+          <p:cNvPr id="3" name="Title 2">
+            <a:extLst>
+              <a:ext uri="{FF2B5EF4-FFF2-40B4-BE49-F238E27FC236}">
+                <a16:creationId xmlns:a16="http://schemas.microsoft.com/office/drawing/2014/main" id="{6FAB9D38-4349-2077-9ED8-B67A9FB7CEBB}"/>
+              </a:ext>
+            </a:extLst>
+          </p:cNvPr>
+          <p:cNvSpPr>
+            <a:spLocks noGrp="1"/>
+          </p:cNvSpPr>
+          <p:nvPr>
+            <p:ph type="title"/>
+          </p:nvPr>
+        </p:nvSpPr>
+        <p:spPr/>
+        <p:txBody>
+          <a:bodyPr/>
+          <a:lstStyle/>
+          <a:p>
+            <a:r>
+              <a:rPr lang="en-US" sz="4000" dirty="0"/>
+              <a:t>Custom Device Selection Example</a:t>
+            </a:r>
+          </a:p>
+        </p:txBody>
+      </p:sp>
+    </p:spTree>
+    <p:extLst>
+      <p:ext uri="{BB962C8B-B14F-4D97-AF65-F5344CB8AC3E}">
+        <p14:creationId xmlns:p14="http://schemas.microsoft.com/office/powerpoint/2010/main" val="484224936"/>
+      </p:ext>
+    </p:extLst>
+  </p:cSld>
+  <p:clrMapOvr>
+    <a:masterClrMapping/>
+  </p:clrMapOvr>
+  <p:transition spd="med"/>
+</p:sld>
+</file>
+
+<file path=ppt/slides/slide22.xml><?xml version="1.0" encoding="utf-8"?>
+<p:sld xmlns:a="http://schemas.openxmlformats.org/drawingml/2006/main" xmlns:r="http://schemas.openxmlformats.org/officeDocument/2006/relationships" xmlns:p="http://schemas.openxmlformats.org/presentationml/2006/main">
+  <p:cSld>
+    <p:spTree>
+      <p:nvGrpSpPr>
+        <p:cNvPr id="1" name=""/>
+        <p:cNvGrpSpPr/>
+        <p:nvPr/>
+      </p:nvGrpSpPr>
+      <p:grpSpPr>
+        <a:xfrm>
+          <a:off x="0" y="0"/>
+          <a:ext cx="0" cy="0"/>
+          <a:chOff x="0" y="0"/>
+          <a:chExt cx="0" cy="0"/>
+        </a:xfrm>
+      </p:grpSpPr>
+      <p:sp>
+        <p:nvSpPr>
+          <p:cNvPr id="2" name="Text Placeholder 1">
+            <a:extLst>
+              <a:ext uri="{FF2B5EF4-FFF2-40B4-BE49-F238E27FC236}">
+                <a16:creationId xmlns:a16="http://schemas.microsoft.com/office/drawing/2014/main" id="{B3F893BD-9D33-8B8F-DCD0-3EC00FAAFF3C}"/>
+              </a:ext>
+            </a:extLst>
+          </p:cNvPr>
+          <p:cNvSpPr>
+            <a:spLocks noGrp="1"/>
+          </p:cNvSpPr>
+          <p:nvPr>
+            <p:ph type="body" sz="quarter" idx="11"/>
+          </p:nvPr>
+        </p:nvSpPr>
+        <p:spPr/>
+        <p:txBody>
+          <a:bodyPr/>
+          <a:lstStyle/>
+          <a:p>
+            <a:r>
+              <a:rPr lang="en-US" dirty="0"/>
+              <a:t>vector_addition_with_timing.cpp</a:t>
+            </a:r>
+          </a:p>
+          <a:p>
+            <a:pPr lvl="1"/>
+            <a:r>
+              <a:rPr lang="en-US" dirty="0"/>
+              <a:t>https://github.com/BenjaminMFindley/Reconfig-2-SYCL-DPCPP/blob/main/Examples/vector_addition/vector_addition_with_timing.cpp</a:t>
+            </a:r>
+          </a:p>
+        </p:txBody>
+      </p:sp>
+      <p:sp>
+        <p:nvSpPr>
+          <p:cNvPr id="3" name="Title 2">
+            <a:extLst>
+              <a:ext uri="{FF2B5EF4-FFF2-40B4-BE49-F238E27FC236}">
+                <a16:creationId xmlns:a16="http://schemas.microsoft.com/office/drawing/2014/main" id="{ECBB6F3A-17E5-5A14-938D-FC701C86AD40}"/>
+              </a:ext>
+            </a:extLst>
+          </p:cNvPr>
+          <p:cNvSpPr>
+            <a:spLocks noGrp="1"/>
+          </p:cNvSpPr>
+          <p:nvPr>
+            <p:ph type="title"/>
+          </p:nvPr>
+        </p:nvSpPr>
+        <p:spPr/>
+        <p:txBody>
+          <a:bodyPr/>
+          <a:lstStyle/>
+          <a:p>
+            <a:r>
+              <a:rPr lang="en-US" dirty="0"/>
+              <a:t>Example</a:t>
+            </a:r>
+          </a:p>
+        </p:txBody>
+      </p:sp>
+    </p:spTree>
+    <p:extLst>
+      <p:ext uri="{BB962C8B-B14F-4D97-AF65-F5344CB8AC3E}">
+        <p14:creationId xmlns:p14="http://schemas.microsoft.com/office/powerpoint/2010/main" val="1633702735"/>
+      </p:ext>
+    </p:extLst>
+  </p:cSld>
+  <p:clrMapOvr>
+    <a:masterClrMapping/>
+  </p:clrMapOvr>
+  <p:transition spd="med"/>
 </p:sld>
 </file>
 
@@ -14845,7 +15382,7 @@
           <p:cNvPr id="2" name="Text Placeholder 1">
             <a:extLst>
               <a:ext uri="{FF2B5EF4-FFF2-40B4-BE49-F238E27FC236}">
-                <a16:creationId xmlns:a16="http://schemas.microsoft.com/office/drawing/2014/main" id="{BAA91BAA-AE1C-4B57-74D8-76174A2532B7}"/>
+                <a16:creationId xmlns:a16="http://schemas.microsoft.com/office/drawing/2014/main" id="{4D907494-8A92-93DB-9B91-24DE589D25AE}"/>
               </a:ext>
             </a:extLst>
           </p:cNvPr>
@@ -14863,323 +15400,99 @@
           <a:p>
             <a:r>
               <a:rPr lang="en-US" sz="2400" dirty="0"/>
-              <a:t>Default selector chooses most capable device at runtime</a:t>
+              <a:t>Data abstractions of a certain C++ type</a:t>
+            </a:r>
+          </a:p>
+          <a:p>
+            <a:pPr lvl="1"/>
+            <a:r>
+              <a:rPr lang="en-US" sz="2000" dirty="0"/>
+              <a:t>Can be scalar data types, vectors, or other user-defined class/structure</a:t>
+            </a:r>
+          </a:p>
+          <a:p>
+            <a:pPr lvl="2"/>
+            <a:r>
+              <a:rPr lang="en-US" sz="1600" dirty="0"/>
+              <a:t>Must not require the use of copy constructors for copying</a:t>
             </a:r>
           </a:p>
           <a:p>
             <a:r>
               <a:rPr lang="en-US" sz="2400" dirty="0"/>
-              <a:t>Device selector classes exist to choose from specific class of device</a:t>
+              <a:t>Represent data objects, not memory addresses</a:t>
             </a:r>
           </a:p>
           <a:p>
             <a:pPr lvl="1"/>
             <a:r>
-              <a:rPr lang="en-US" sz="2000" dirty="0" err="1"/>
-              <a:t>gpu_selector</a:t>
-            </a:r>
-            <a:endParaRPr lang="en-US" sz="2000" dirty="0"/>
+              <a:rPr lang="en-US" sz="2000" dirty="0"/>
+              <a:t>Cannot be accessed like C++ arrays</a:t>
+            </a:r>
           </a:p>
           <a:p>
             <a:pPr lvl="1"/>
             <a:r>
-              <a:rPr lang="en-US" sz="2000" dirty="0" err="1"/>
-              <a:t>cpu_selector</a:t>
-            </a:r>
-            <a:endParaRPr lang="en-US" sz="2000" dirty="0"/>
+              <a:rPr lang="en-US" sz="2000" i="1" dirty="0"/>
+              <a:t>Accessors</a:t>
+            </a:r>
+            <a:r>
+              <a:rPr lang="en-US" sz="2000" dirty="0"/>
+              <a:t> must be used to read from and write to buffers</a:t>
+            </a:r>
+          </a:p>
+          <a:p>
+            <a:r>
+              <a:rPr lang="en-US" sz="2400" dirty="0"/>
+              <a:t>A single buffer may be distributed across multiple locations</a:t>
+            </a:r>
           </a:p>
           <a:p>
             <a:pPr lvl="1"/>
             <a:r>
-              <a:rPr lang="en-US" sz="2000" dirty="0" err="1"/>
-              <a:t>accelerator_selector</a:t>
-            </a:r>
-            <a:endParaRPr lang="en-US" sz="2000" dirty="0"/>
+              <a:rPr lang="en-US" sz="2000" dirty="0"/>
+              <a:t>Between discrete memory locations and devices</a:t>
+            </a:r>
+          </a:p>
+          <a:p>
+            <a:r>
+              <a:rPr lang="en-US" sz="2400" dirty="0"/>
+              <a:t>An empty buffer may be created by specifying a range for size</a:t>
+            </a:r>
           </a:p>
           <a:p>
             <a:pPr lvl="1"/>
             <a:r>
-              <a:rPr lang="en-US" sz="2000" dirty="0" err="1"/>
-              <a:t>fpga_selector</a:t>
-            </a:r>
-            <a:r>
               <a:rPr lang="en-US" sz="2000" dirty="0"/>
-              <a:t> exists via intel extension</a:t>
+              <a:t>Data must later be initialized before the buffer can be read from</a:t>
+            </a:r>
+          </a:p>
+          <a:p>
+            <a:r>
+              <a:rPr lang="en-US" sz="2400" dirty="0"/>
+              <a:t>Existing host data may be used to initialize a new buffer</a:t>
             </a:r>
           </a:p>
           <a:p>
             <a:pPr lvl="1"/>
             <a:r>
               <a:rPr lang="en-US" sz="2000" dirty="0"/>
-              <a:t>Useful for quick development, but typically want specific device for a task</a:t>
+              <a:t>Accomplished by invoking a constructor that takes a pointer to an existing host allocation</a:t>
             </a:r>
           </a:p>
           <a:p>
             <a:r>
               <a:rPr lang="en-US" sz="2400" dirty="0"/>
-              <a:t>Custom selectors created by extending </a:t>
+              <a:t>May also be created from existing </a:t>
             </a:r>
             <a:r>
               <a:rPr lang="en-US" sz="2400" dirty="0" err="1"/>
-              <a:t>device_selector</a:t>
+              <a:t>cl_mem</a:t>
             </a:r>
             <a:r>
               <a:rPr lang="en-US" sz="2400" dirty="0"/>
-              <a:t> base class</a:t>
-            </a:r>
-            <a:endParaRPr lang="en-GB" sz="2000" dirty="0">
-              <a:solidFill>
-                <a:srgbClr val="000000"/>
-              </a:solidFill>
-              <a:highlight>
-                <a:srgbClr val="FFFFFF"/>
-              </a:highlight>
-              <a:latin typeface="Consolas" panose="020B0609020204030204" pitchFamily="49" charset="0"/>
-            </a:endParaRPr>
-          </a:p>
-          <a:p>
-            <a:pPr marL="684047" lvl="2" indent="0">
-              <a:buNone/>
-            </a:pPr>
-            <a:r>
-              <a:rPr lang="en-GB" sz="2000" dirty="0">
-                <a:solidFill>
-                  <a:srgbClr val="000000"/>
-                </a:solidFill>
-                <a:highlight>
-                  <a:srgbClr val="FFFFFF"/>
-                </a:highlight>
-                <a:latin typeface="Consolas" panose="020B0609020204030204" pitchFamily="49" charset="0"/>
-              </a:rPr>
-              <a:t>virtual</a:t>
-            </a:r>
-            <a:r>
-              <a:rPr lang="en-GB" sz="2000" dirty="0">
-                <a:solidFill>
-                  <a:srgbClr val="A31515"/>
-                </a:solidFill>
-                <a:highlight>
-                  <a:srgbClr val="FFFFFF"/>
-                </a:highlight>
-                <a:latin typeface="Consolas" panose="020B0609020204030204" pitchFamily="49" charset="0"/>
-              </a:rPr>
-              <a:t> </a:t>
-            </a:r>
-            <a:r>
-              <a:rPr lang="en-GB" sz="2000" dirty="0">
-                <a:solidFill>
-                  <a:schemeClr val="accent1"/>
-                </a:solidFill>
-                <a:highlight>
-                  <a:srgbClr val="FFFFFF"/>
-                </a:highlight>
-                <a:latin typeface="Consolas" panose="020B0609020204030204" pitchFamily="49" charset="0"/>
-              </a:rPr>
-              <a:t>int</a:t>
-            </a:r>
-            <a:r>
-              <a:rPr lang="en-GB" sz="2000" dirty="0">
-                <a:solidFill>
-                  <a:srgbClr val="A31515"/>
-                </a:solidFill>
-                <a:highlight>
-                  <a:srgbClr val="FFFFFF"/>
-                </a:highlight>
-                <a:latin typeface="Consolas" panose="020B0609020204030204" pitchFamily="49" charset="0"/>
-              </a:rPr>
-              <a:t> </a:t>
-            </a:r>
-            <a:r>
-              <a:rPr lang="en-GB" sz="2000" dirty="0">
-                <a:solidFill>
-                  <a:srgbClr val="000000"/>
-                </a:solidFill>
-                <a:highlight>
-                  <a:srgbClr val="FFFFFF"/>
-                </a:highlight>
-                <a:latin typeface="Consolas" panose="020B0609020204030204" pitchFamily="49" charset="0"/>
-              </a:rPr>
-              <a:t>operator()(</a:t>
-            </a:r>
-            <a:r>
-              <a:rPr lang="en-GB" sz="2000" dirty="0" err="1">
-                <a:solidFill>
-                  <a:schemeClr val="accent1"/>
-                </a:solidFill>
-                <a:highlight>
-                  <a:srgbClr val="FFFFFF"/>
-                </a:highlight>
-                <a:latin typeface="Consolas" panose="020B0609020204030204" pitchFamily="49" charset="0"/>
-              </a:rPr>
-              <a:t>const</a:t>
-            </a:r>
-            <a:r>
-              <a:rPr lang="en-GB" sz="2000" dirty="0">
-                <a:solidFill>
-                  <a:srgbClr val="A31515"/>
-                </a:solidFill>
-                <a:highlight>
-                  <a:srgbClr val="FFFFFF"/>
-                </a:highlight>
-                <a:latin typeface="Consolas" panose="020B0609020204030204" pitchFamily="49" charset="0"/>
-              </a:rPr>
-              <a:t> </a:t>
-            </a:r>
-            <a:r>
-              <a:rPr lang="en-GB" sz="2000" dirty="0">
-                <a:solidFill>
-                  <a:srgbClr val="000080"/>
-                </a:solidFill>
-                <a:highlight>
-                  <a:srgbClr val="FFFFFF"/>
-                </a:highlight>
-                <a:latin typeface="Consolas" panose="020B0609020204030204" pitchFamily="49" charset="0"/>
-              </a:rPr>
-              <a:t>device</a:t>
-            </a:r>
-            <a:r>
-              <a:rPr lang="en-GB" sz="2000" dirty="0">
-                <a:solidFill>
-                  <a:srgbClr val="A31515"/>
-                </a:solidFill>
-                <a:highlight>
-                  <a:srgbClr val="FFFFFF"/>
-                </a:highlight>
-                <a:latin typeface="Consolas" panose="020B0609020204030204" pitchFamily="49" charset="0"/>
-              </a:rPr>
-              <a:t> </a:t>
-            </a:r>
-            <a:r>
-              <a:rPr lang="en-GB" sz="2000" dirty="0">
-                <a:solidFill>
-                  <a:srgbClr val="000000"/>
-                </a:solidFill>
-                <a:highlight>
-                  <a:srgbClr val="FFFFFF"/>
-                </a:highlight>
-                <a:latin typeface="Consolas" panose="020B0609020204030204" pitchFamily="49" charset="0"/>
-              </a:rPr>
-              <a:t>&amp;</a:t>
-            </a:r>
-            <a:r>
-              <a:rPr lang="en-GB" sz="2000" dirty="0">
-                <a:solidFill>
-                  <a:srgbClr val="000080"/>
-                </a:solidFill>
-                <a:highlight>
-                  <a:srgbClr val="FFFFFF"/>
-                </a:highlight>
-                <a:latin typeface="Consolas" panose="020B0609020204030204" pitchFamily="49" charset="0"/>
-              </a:rPr>
-              <a:t>dev</a:t>
-            </a:r>
-            <a:r>
-              <a:rPr lang="en-GB" sz="2000" dirty="0">
-                <a:solidFill>
-                  <a:srgbClr val="000000"/>
-                </a:solidFill>
-                <a:highlight>
-                  <a:srgbClr val="FFFFFF"/>
-                </a:highlight>
-                <a:latin typeface="Consolas" panose="020B0609020204030204" pitchFamily="49" charset="0"/>
-              </a:rPr>
-              <a:t>)</a:t>
-            </a:r>
-            <a:r>
-              <a:rPr lang="en-GB" sz="2000" dirty="0">
-                <a:solidFill>
-                  <a:srgbClr val="A31515"/>
-                </a:solidFill>
-                <a:highlight>
-                  <a:srgbClr val="FFFFFF"/>
-                </a:highlight>
-                <a:latin typeface="Consolas" panose="020B0609020204030204" pitchFamily="49" charset="0"/>
-              </a:rPr>
-              <a:t> </a:t>
-            </a:r>
-            <a:r>
-              <a:rPr lang="en-GB" sz="2000" dirty="0" err="1">
-                <a:solidFill>
-                  <a:schemeClr val="accent1"/>
-                </a:solidFill>
-                <a:highlight>
-                  <a:srgbClr val="FFFFFF"/>
-                </a:highlight>
-                <a:latin typeface="Consolas" panose="020B0609020204030204" pitchFamily="49" charset="0"/>
-              </a:rPr>
-              <a:t>const</a:t>
-            </a:r>
-            <a:r>
-              <a:rPr lang="en-GB" sz="2000" dirty="0">
-                <a:solidFill>
-                  <a:srgbClr val="A31515"/>
-                </a:solidFill>
-                <a:highlight>
-                  <a:srgbClr val="FFFFFF"/>
-                </a:highlight>
-                <a:latin typeface="Consolas" panose="020B0609020204030204" pitchFamily="49" charset="0"/>
-              </a:rPr>
-              <a:t> </a:t>
-            </a:r>
-            <a:r>
-              <a:rPr lang="en-GB" sz="2000" dirty="0">
-                <a:solidFill>
-                  <a:srgbClr val="000000"/>
-                </a:solidFill>
-                <a:highlight>
-                  <a:srgbClr val="FFFFFF"/>
-                </a:highlight>
-                <a:latin typeface="Consolas" panose="020B0609020204030204" pitchFamily="49" charset="0"/>
-              </a:rPr>
-              <a:t>{</a:t>
-            </a:r>
-          </a:p>
-          <a:p>
-            <a:pPr marL="684047" lvl="2" indent="0">
-              <a:buNone/>
-            </a:pPr>
-            <a:r>
-              <a:rPr lang="en-US" sz="2000" dirty="0">
-                <a:solidFill>
-                  <a:srgbClr val="A31515"/>
-                </a:solidFill>
-                <a:highlight>
-                  <a:srgbClr val="FFFFFF"/>
-                </a:highlight>
-                <a:latin typeface="Consolas" panose="020B0609020204030204" pitchFamily="49" charset="0"/>
-              </a:rPr>
-              <a:t>		</a:t>
-            </a:r>
-            <a:r>
-              <a:rPr lang="en-US" sz="2000" dirty="0">
-                <a:solidFill>
-                  <a:schemeClr val="accent2"/>
-                </a:solidFill>
-                <a:highlight>
-                  <a:srgbClr val="FFFFFF"/>
-                </a:highlight>
-                <a:latin typeface="Consolas" panose="020B0609020204030204" pitchFamily="49" charset="0"/>
-              </a:rPr>
-              <a:t>/* Device selection logic */</a:t>
-            </a:r>
-          </a:p>
-          <a:p>
-            <a:pPr marL="684047" lvl="2" indent="0">
-              <a:buNone/>
-            </a:pPr>
-            <a:r>
-              <a:rPr lang="en-US" sz="2000" dirty="0">
-                <a:solidFill>
-                  <a:srgbClr val="000000"/>
-                </a:solidFill>
-                <a:highlight>
-                  <a:srgbClr val="FFFFFF"/>
-                </a:highlight>
-                <a:latin typeface="Consolas" panose="020B0609020204030204" pitchFamily="49" charset="0"/>
-              </a:rPr>
-              <a:t>}</a:t>
-            </a:r>
-            <a:endParaRPr lang="en-US" sz="2000" dirty="0"/>
+              <a:t> objects if using OpenCL compatibility</a:t>
+            </a:r>
           </a:p>
         </p:txBody>
       </p:sp>
@@ -15188,7 +15501,7 @@
           <p:cNvPr id="3" name="Title 2">
             <a:extLst>
               <a:ext uri="{FF2B5EF4-FFF2-40B4-BE49-F238E27FC236}">
-                <a16:creationId xmlns:a16="http://schemas.microsoft.com/office/drawing/2014/main" id="{C6199DC5-494D-B309-311C-2E71E93FC696}"/>
+                <a16:creationId xmlns:a16="http://schemas.microsoft.com/office/drawing/2014/main" id="{FD123E51-4B05-EDA0-53E0-A70993ACDAC0}"/>
               </a:ext>
             </a:extLst>
           </p:cNvPr>
@@ -15206,7 +15519,7 @@
           <a:p>
             <a:r>
               <a:rPr lang="en-US" sz="4000" dirty="0"/>
-              <a:t>Device Selection</a:t>
+              <a:t>Buffers</a:t>
             </a:r>
           </a:p>
         </p:txBody>
@@ -15214,7 +15527,7 @@
     </p:spTree>
     <p:extLst>
       <p:ext uri="{BB962C8B-B14F-4D97-AF65-F5344CB8AC3E}">
-        <p14:creationId xmlns:p14="http://schemas.microsoft.com/office/powerpoint/2010/main" val="2682491685"/>
+        <p14:creationId xmlns:p14="http://schemas.microsoft.com/office/powerpoint/2010/main" val="476712468"/>
       </p:ext>
     </p:extLst>
   </p:cSld>
@@ -15247,7 +15560,7 @@
           <p:cNvPr id="2" name="Text Placeholder 1">
             <a:extLst>
               <a:ext uri="{FF2B5EF4-FFF2-40B4-BE49-F238E27FC236}">
-                <a16:creationId xmlns:a16="http://schemas.microsoft.com/office/drawing/2014/main" id="{DDF92F08-23B2-CF92-23C8-BA44DE075FF0}"/>
+                <a16:creationId xmlns:a16="http://schemas.microsoft.com/office/drawing/2014/main" id="{F7E2A174-6243-6AEA-61E3-DE0E4AA2E1A3}"/>
               </a:ext>
             </a:extLst>
           </p:cNvPr>
@@ -15265,59 +15578,68 @@
           <a:p>
             <a:r>
               <a:rPr lang="en-US" dirty="0"/>
-              <a:t>operator() is key to device selection</a:t>
+              <a:t>The only way in which to read from or write to buffers</a:t>
+            </a:r>
+          </a:p>
+          <a:p>
+            <a:r>
+              <a:rPr lang="en-US" dirty="0"/>
+              <a:t>Can be instantiated with read, write, or </a:t>
+            </a:r>
+            <a:r>
+              <a:rPr lang="en-US" dirty="0" err="1"/>
+              <a:t>read_write</a:t>
+            </a:r>
+            <a:r>
+              <a:rPr lang="en-US" dirty="0"/>
+              <a:t> access modes</a:t>
             </a:r>
           </a:p>
           <a:p>
             <a:pPr lvl="1"/>
             <a:r>
               <a:rPr lang="en-US" dirty="0"/>
-              <a:t>Runs on each available device</a:t>
+              <a:t>Accessors are </a:t>
+            </a:r>
+            <a:r>
+              <a:rPr lang="en-US" dirty="0" err="1"/>
+              <a:t>read_write</a:t>
+            </a:r>
+            <a:r>
+              <a:rPr lang="en-US" dirty="0"/>
+              <a:t> by default</a:t>
+            </a:r>
+          </a:p>
+          <a:p>
+            <a:r>
+              <a:rPr lang="en-US" dirty="0"/>
+              <a:t>Using appropriate access modes is important</a:t>
             </a:r>
           </a:p>
           <a:p>
             <a:pPr lvl="1"/>
             <a:r>
               <a:rPr lang="en-US" dirty="0"/>
-              <a:t>Returns an integer score for each device</a:t>
+              <a:t>Provides implicit information used to help the runtime manage memory</a:t>
             </a:r>
           </a:p>
           <a:p>
             <a:pPr lvl="2"/>
             <a:r>
               <a:rPr lang="en-US" dirty="0"/>
-              <a:t>Device which returns highest score is selected</a:t>
-            </a:r>
-          </a:p>
-          <a:p>
-            <a:pPr lvl="2"/>
-            <a:r>
-              <a:rPr lang="en-US" dirty="0"/>
-              <a:t>Devices which return negative scores will never be selected</a:t>
-            </a:r>
-          </a:p>
-          <a:p>
-            <a:r>
-              <a:rPr lang="en-US" dirty="0"/>
-              <a:t>User is free to define any logic for scoring</a:t>
+              <a:t>For example: </a:t>
+            </a:r>
+            <a:r>
+              <a:rPr lang="en-GB" dirty="0"/>
+              <a:t>read mode tells the runtime that it does not need to copy memory back to the host, as the device has not changed it.</a:t>
             </a:r>
           </a:p>
           <a:p>
             <a:pPr lvl="1"/>
             <a:r>
-              <a:rPr lang="en-US" dirty="0"/>
-              <a:t>Allows for arbitrarily complex device selection logic</a:t>
-            </a:r>
-          </a:p>
-          <a:p>
-            <a:pPr lvl="1"/>
-            <a:r>
-              <a:rPr lang="en-US" dirty="0"/>
-              <a:t>In simple cases, selecting based on device name or vendor is sufficient</a:t>
-            </a:r>
-          </a:p>
-          <a:p>
-            <a:pPr lvl="1"/>
+              <a:rPr lang="en-GB" dirty="0"/>
+              <a:t>Appropriate use of access modes will help the runtime optimize kernel scheduling and data migration</a:t>
+            </a:r>
             <a:endParaRPr lang="en-US" dirty="0"/>
           </a:p>
         </p:txBody>
@@ -15327,7 +15649,7 @@
           <p:cNvPr id="3" name="Title 2">
             <a:extLst>
               <a:ext uri="{FF2B5EF4-FFF2-40B4-BE49-F238E27FC236}">
-                <a16:creationId xmlns:a16="http://schemas.microsoft.com/office/drawing/2014/main" id="{5F41B62B-C379-7ADA-E458-B4786D2E87F4}"/>
+                <a16:creationId xmlns:a16="http://schemas.microsoft.com/office/drawing/2014/main" id="{125E0148-C8ED-74C8-D65E-4538E79CBD63}"/>
               </a:ext>
             </a:extLst>
           </p:cNvPr>
@@ -15345,7 +15667,7 @@
           <a:p>
             <a:r>
               <a:rPr lang="en-US" sz="4000" dirty="0"/>
-              <a:t>Custom Device Selection</a:t>
+              <a:t>Accessors</a:t>
             </a:r>
           </a:p>
         </p:txBody>
@@ -15353,7 +15675,7 @@
     </p:spTree>
     <p:extLst>
       <p:ext uri="{BB962C8B-B14F-4D97-AF65-F5344CB8AC3E}">
-        <p14:creationId xmlns:p14="http://schemas.microsoft.com/office/powerpoint/2010/main" val="16247701"/>
+        <p14:creationId xmlns:p14="http://schemas.microsoft.com/office/powerpoint/2010/main" val="4214608404"/>
       </p:ext>
     </p:extLst>
   </p:cSld>
@@ -15365,337 +15687,6 @@
 </file>
 
 <file path=ppt/slides/slide8.xml><?xml version="1.0" encoding="utf-8"?>
-<p:sld xmlns:a="http://schemas.openxmlformats.org/drawingml/2006/main" xmlns:r="http://schemas.openxmlformats.org/officeDocument/2006/relationships" xmlns:p="http://schemas.openxmlformats.org/presentationml/2006/main">
-  <p:cSld>
-    <p:spTree>
-      <p:nvGrpSpPr>
-        <p:cNvPr id="1" name=""/>
-        <p:cNvGrpSpPr/>
-        <p:nvPr/>
-      </p:nvGrpSpPr>
-      <p:grpSpPr>
-        <a:xfrm>
-          <a:off x="0" y="0"/>
-          <a:ext cx="0" cy="0"/>
-          <a:chOff x="0" y="0"/>
-          <a:chExt cx="0" cy="0"/>
-        </a:xfrm>
-      </p:grpSpPr>
-      <p:sp>
-        <p:nvSpPr>
-          <p:cNvPr id="2" name="Text Placeholder 1">
-            <a:extLst>
-              <a:ext uri="{FF2B5EF4-FFF2-40B4-BE49-F238E27FC236}">
-                <a16:creationId xmlns:a16="http://schemas.microsoft.com/office/drawing/2014/main" id="{8125CE29-810F-B059-3558-301534123DD1}"/>
-              </a:ext>
-            </a:extLst>
-          </p:cNvPr>
-          <p:cNvSpPr>
-            <a:spLocks noGrp="1"/>
-          </p:cNvSpPr>
-          <p:nvPr>
-            <p:ph type="body" sz="quarter" idx="11"/>
-          </p:nvPr>
-        </p:nvSpPr>
-        <p:spPr/>
-        <p:txBody>
-          <a:bodyPr/>
-          <a:lstStyle/>
-          <a:p>
-            <a:pPr marL="55397" indent="0">
-              <a:buNone/>
-            </a:pPr>
-            <a:r>
-              <a:rPr lang="en-US" sz="2000" dirty="0">
-                <a:solidFill>
-                  <a:schemeClr val="accent1"/>
-                </a:solidFill>
-              </a:rPr>
-              <a:t>class</a:t>
-            </a:r>
-            <a:r>
-              <a:rPr lang="en-US" sz="2000" dirty="0"/>
-              <a:t> </a:t>
-            </a:r>
-            <a:r>
-              <a:rPr lang="en-US" sz="2000" dirty="0" err="1"/>
-              <a:t>my_selector</a:t>
-            </a:r>
-            <a:r>
-              <a:rPr lang="en-US" sz="2000" dirty="0"/>
-              <a:t> : public </a:t>
-            </a:r>
-            <a:r>
-              <a:rPr lang="en-US" sz="2000" dirty="0" err="1"/>
-              <a:t>device_selector</a:t>
-            </a:r>
-            <a:r>
-              <a:rPr lang="en-US" sz="2000" dirty="0"/>
-              <a:t> {</a:t>
-            </a:r>
-          </a:p>
-          <a:p>
-            <a:pPr marL="55397" indent="0">
-              <a:buNone/>
-            </a:pPr>
-            <a:r>
-              <a:rPr lang="en-US" sz="2000" dirty="0"/>
-              <a:t>	public:</a:t>
-            </a:r>
-          </a:p>
-          <a:p>
-            <a:pPr marL="55397" indent="0">
-              <a:buNone/>
-            </a:pPr>
-            <a:r>
-              <a:rPr lang="en-US" sz="2000" dirty="0"/>
-              <a:t>	</a:t>
-            </a:r>
-            <a:r>
-              <a:rPr lang="en-US" sz="2000" dirty="0">
-                <a:solidFill>
-                  <a:schemeClr val="accent1"/>
-                </a:solidFill>
-              </a:rPr>
-              <a:t>int</a:t>
-            </a:r>
-            <a:r>
-              <a:rPr lang="en-US" sz="2000" dirty="0"/>
-              <a:t> operator()(</a:t>
-            </a:r>
-            <a:r>
-              <a:rPr lang="en-US" sz="2000" dirty="0">
-                <a:solidFill>
-                  <a:schemeClr val="accent1"/>
-                </a:solidFill>
-              </a:rPr>
-              <a:t>const</a:t>
-            </a:r>
-            <a:r>
-              <a:rPr lang="en-US" sz="2000" dirty="0"/>
-              <a:t> device &amp;dev) </a:t>
-            </a:r>
-            <a:r>
-              <a:rPr lang="en-US" sz="2000" dirty="0">
-                <a:solidFill>
-                  <a:schemeClr val="accent1"/>
-                </a:solidFill>
-              </a:rPr>
-              <a:t>const</a:t>
-            </a:r>
-            <a:r>
-              <a:rPr lang="en-US" sz="2000" dirty="0"/>
-              <a:t> override {</a:t>
-            </a:r>
-          </a:p>
-          <a:p>
-            <a:pPr marL="55397" indent="0">
-              <a:buNone/>
-            </a:pPr>
-            <a:r>
-              <a:rPr lang="en-US" sz="2000" dirty="0"/>
-              <a:t>		</a:t>
-            </a:r>
-            <a:r>
-              <a:rPr lang="en-US" sz="2000" dirty="0">
-                <a:solidFill>
-                  <a:schemeClr val="accent1"/>
-                </a:solidFill>
-              </a:rPr>
-              <a:t>if</a:t>
-            </a:r>
-            <a:r>
-              <a:rPr lang="en-US" sz="2000" dirty="0"/>
-              <a:t> (</a:t>
-            </a:r>
-          </a:p>
-          <a:p>
-            <a:pPr marL="55397" indent="0">
-              <a:buNone/>
-            </a:pPr>
-            <a:r>
-              <a:rPr lang="en-US" sz="2000" dirty="0"/>
-              <a:t>		</a:t>
-            </a:r>
-            <a:r>
-              <a:rPr lang="en-US" sz="2000" dirty="0" err="1"/>
-              <a:t>dev.get_info</a:t>
-            </a:r>
-            <a:r>
-              <a:rPr lang="en-US" sz="2000" dirty="0"/>
-              <a:t>&lt;info::device::name&gt;().find("</a:t>
-            </a:r>
-            <a:r>
-              <a:rPr lang="en-US" sz="2000" dirty="0" err="1"/>
-              <a:t>Arria</a:t>
-            </a:r>
-            <a:r>
-              <a:rPr lang="en-US" sz="2000" dirty="0"/>
-              <a:t>") != std::string::</a:t>
-            </a:r>
-            <a:r>
-              <a:rPr lang="en-US" sz="2000" dirty="0" err="1"/>
-              <a:t>npos</a:t>
-            </a:r>
-            <a:r>
-              <a:rPr lang="en-US" sz="2000" dirty="0"/>
-              <a:t> &amp;&amp;</a:t>
-            </a:r>
-          </a:p>
-          <a:p>
-            <a:pPr marL="55397" indent="0">
-              <a:buNone/>
-            </a:pPr>
-            <a:r>
-              <a:rPr lang="en-US" sz="2000" dirty="0"/>
-              <a:t>		</a:t>
-            </a:r>
-            <a:r>
-              <a:rPr lang="en-US" sz="2000" dirty="0" err="1"/>
-              <a:t>dev.get_info</a:t>
-            </a:r>
-            <a:r>
-              <a:rPr lang="en-US" sz="2000" dirty="0"/>
-              <a:t>&lt;info::device::vendor&gt;().find("Intel") != std::string::</a:t>
-            </a:r>
-            <a:r>
-              <a:rPr lang="en-US" sz="2000" dirty="0" err="1"/>
-              <a:t>npos</a:t>
-            </a:r>
-            <a:r>
-              <a:rPr lang="en-US" sz="2000" dirty="0"/>
-              <a:t>) {</a:t>
-            </a:r>
-          </a:p>
-          <a:p>
-            <a:pPr marL="55397" indent="0">
-              <a:buNone/>
-            </a:pPr>
-            <a:r>
-              <a:rPr lang="en-US" sz="2000" dirty="0"/>
-              <a:t>			</a:t>
-            </a:r>
-            <a:r>
-              <a:rPr lang="en-US" sz="2000" dirty="0">
-                <a:solidFill>
-                  <a:schemeClr val="accent1"/>
-                </a:solidFill>
-              </a:rPr>
-              <a:t>return</a:t>
-            </a:r>
-            <a:r>
-              <a:rPr lang="en-US" sz="2000" dirty="0"/>
-              <a:t> 1;</a:t>
-            </a:r>
-          </a:p>
-          <a:p>
-            <a:pPr marL="55397" indent="0">
-              <a:buNone/>
-            </a:pPr>
-            <a:r>
-              <a:rPr lang="en-US" sz="2000" dirty="0"/>
-              <a:t>		}</a:t>
-            </a:r>
-          </a:p>
-          <a:p>
-            <a:pPr marL="55397" indent="0">
-              <a:buNone/>
-            </a:pPr>
-            <a:r>
-              <a:rPr lang="en-US" sz="2000" dirty="0"/>
-              <a:t>		</a:t>
-            </a:r>
-            <a:r>
-              <a:rPr lang="en-US" sz="2000" dirty="0">
-                <a:solidFill>
-                  <a:schemeClr val="accent1"/>
-                </a:solidFill>
-              </a:rPr>
-              <a:t>return</a:t>
-            </a:r>
-            <a:r>
-              <a:rPr lang="en-US" sz="2000" dirty="0"/>
-              <a:t> -1;</a:t>
-            </a:r>
-          </a:p>
-          <a:p>
-            <a:pPr marL="55397" indent="0">
-              <a:buNone/>
-            </a:pPr>
-            <a:r>
-              <a:rPr lang="en-US" sz="2000" dirty="0"/>
-              <a:t>	}</a:t>
-            </a:r>
-          </a:p>
-          <a:p>
-            <a:pPr marL="55397" indent="0">
-              <a:buNone/>
-            </a:pPr>
-            <a:r>
-              <a:rPr lang="en-US" sz="2000" dirty="0"/>
-              <a:t>};</a:t>
-            </a:r>
-          </a:p>
-          <a:p>
-            <a:pPr marL="55397" indent="0">
-              <a:buNone/>
-            </a:pPr>
-            <a:endParaRPr lang="en-US" sz="2000" i="1" dirty="0"/>
-          </a:p>
-          <a:p>
-            <a:pPr marL="55397" indent="0">
-              <a:buNone/>
-            </a:pPr>
-            <a:r>
-              <a:rPr lang="en-US" sz="2000" i="1" dirty="0"/>
-              <a:t>Source: Data Parallel C++, James Reinders et al. pg. 46</a:t>
-            </a:r>
-          </a:p>
-        </p:txBody>
-      </p:sp>
-      <p:sp>
-        <p:nvSpPr>
-          <p:cNvPr id="3" name="Title 2">
-            <a:extLst>
-              <a:ext uri="{FF2B5EF4-FFF2-40B4-BE49-F238E27FC236}">
-                <a16:creationId xmlns:a16="http://schemas.microsoft.com/office/drawing/2014/main" id="{6FAB9D38-4349-2077-9ED8-B67A9FB7CEBB}"/>
-              </a:ext>
-            </a:extLst>
-          </p:cNvPr>
-          <p:cNvSpPr>
-            <a:spLocks noGrp="1"/>
-          </p:cNvSpPr>
-          <p:nvPr>
-            <p:ph type="title"/>
-          </p:nvPr>
-        </p:nvSpPr>
-        <p:spPr/>
-        <p:txBody>
-          <a:bodyPr/>
-          <a:lstStyle/>
-          <a:p>
-            <a:r>
-              <a:rPr lang="en-US" sz="4000" dirty="0"/>
-              <a:t>Custom Device Selection Example</a:t>
-            </a:r>
-          </a:p>
-        </p:txBody>
-      </p:sp>
-    </p:spTree>
-    <p:extLst>
-      <p:ext uri="{BB962C8B-B14F-4D97-AF65-F5344CB8AC3E}">
-        <p14:creationId xmlns:p14="http://schemas.microsoft.com/office/powerpoint/2010/main" val="484224936"/>
-      </p:ext>
-    </p:extLst>
-  </p:cSld>
-  <p:clrMapOvr>
-    <a:masterClrMapping/>
-  </p:clrMapOvr>
-  <p:transition spd="med"/>
-</p:sld>
-</file>
-
-<file path=ppt/slides/slide9.xml><?xml version="1.0" encoding="utf-8"?>
 <p:sld xmlns:a="http://schemas.openxmlformats.org/drawingml/2006/main" xmlns:r="http://schemas.openxmlformats.org/officeDocument/2006/relationships" xmlns:p="http://schemas.openxmlformats.org/presentationml/2006/main">
   <p:cSld>
     <p:spTree>
@@ -15847,6 +15838,399 @@
     <p:extLst>
       <p:ext uri="{BB962C8B-B14F-4D97-AF65-F5344CB8AC3E}">
         <p14:creationId xmlns:p14="http://schemas.microsoft.com/office/powerpoint/2010/main" val="2458255169"/>
+      </p:ext>
+    </p:extLst>
+  </p:cSld>
+  <p:clrMapOvr>
+    <a:masterClrMapping/>
+  </p:clrMapOvr>
+  <p:transition spd="med"/>
+</p:sld>
+</file>
+
+<file path=ppt/slides/slide9.xml><?xml version="1.0" encoding="utf-8"?>
+<p:sld xmlns:a="http://schemas.openxmlformats.org/drawingml/2006/main" xmlns:r="http://schemas.openxmlformats.org/officeDocument/2006/relationships" xmlns:p="http://schemas.openxmlformats.org/presentationml/2006/main">
+  <p:cSld>
+    <p:spTree>
+      <p:nvGrpSpPr>
+        <p:cNvPr id="1" name=""/>
+        <p:cNvGrpSpPr/>
+        <p:nvPr/>
+      </p:nvGrpSpPr>
+      <p:grpSpPr>
+        <a:xfrm>
+          <a:off x="0" y="0"/>
+          <a:ext cx="0" cy="0"/>
+          <a:chOff x="0" y="0"/>
+          <a:chExt cx="0" cy="0"/>
+        </a:xfrm>
+      </p:grpSpPr>
+      <p:sp>
+        <p:nvSpPr>
+          <p:cNvPr id="2" name="Text Placeholder 1">
+            <a:extLst>
+              <a:ext uri="{FF2B5EF4-FFF2-40B4-BE49-F238E27FC236}">
+                <a16:creationId xmlns:a16="http://schemas.microsoft.com/office/drawing/2014/main" id="{71DE8418-632F-2354-801D-974AEB04AD4A}"/>
+              </a:ext>
+            </a:extLst>
+          </p:cNvPr>
+          <p:cNvSpPr>
+            <a:spLocks noGrp="1"/>
+          </p:cNvSpPr>
+          <p:nvPr>
+            <p:ph type="body" sz="quarter" idx="11"/>
+          </p:nvPr>
+        </p:nvSpPr>
+        <p:spPr/>
+        <p:txBody>
+          <a:bodyPr/>
+          <a:lstStyle/>
+          <a:p>
+            <a:pPr marL="55397" indent="0">
+              <a:buNone/>
+            </a:pPr>
+            <a:r>
+              <a:rPr lang="en-GB" sz="2000" dirty="0" err="1">
+                <a:solidFill>
+                  <a:srgbClr val="000000"/>
+                </a:solidFill>
+              </a:rPr>
+              <a:t>Q.submit</a:t>
+            </a:r>
+            <a:r>
+              <a:rPr lang="en-GB" sz="2000" dirty="0">
+                <a:solidFill>
+                  <a:srgbClr val="000000"/>
+                </a:solidFill>
+              </a:rPr>
+              <a:t>([&amp;](handler&amp; h) {		</a:t>
+            </a:r>
+            <a:r>
+              <a:rPr lang="en-GB" sz="2000" dirty="0">
+                <a:solidFill>
+                  <a:srgbClr val="008000"/>
+                </a:solidFill>
+              </a:rPr>
+              <a:t>// function called on host</a:t>
+            </a:r>
+            <a:endParaRPr lang="en-GB" sz="2000" dirty="0">
+              <a:solidFill>
+                <a:srgbClr val="000000"/>
+              </a:solidFill>
+            </a:endParaRPr>
+          </a:p>
+          <a:p>
+            <a:pPr marL="55397" indent="0">
+              <a:buNone/>
+            </a:pPr>
+            <a:r>
+              <a:rPr lang="en-GB" sz="2000" dirty="0">
+                <a:solidFill>
+                  <a:srgbClr val="000000"/>
+                </a:solidFill>
+              </a:rPr>
+              <a:t>	accessor </a:t>
+            </a:r>
+            <a:r>
+              <a:rPr lang="en-GB" sz="2000" dirty="0" err="1">
+                <a:solidFill>
+                  <a:srgbClr val="000000"/>
+                </a:solidFill>
+              </a:rPr>
+              <a:t>acc</a:t>
+            </a:r>
+            <a:r>
+              <a:rPr lang="en-GB" sz="2000" dirty="0">
+                <a:solidFill>
+                  <a:srgbClr val="000000"/>
+                </a:solidFill>
+              </a:rPr>
+              <a:t>{ B, h };			</a:t>
+            </a:r>
+            <a:r>
+              <a:rPr lang="en-GB" sz="2000" dirty="0">
+                <a:solidFill>
+                  <a:srgbClr val="008000"/>
+                </a:solidFill>
+              </a:rPr>
+              <a:t>// host code defining accessor, setting up dependencies</a:t>
+            </a:r>
+            <a:endParaRPr lang="en-GB" sz="2000" dirty="0">
+              <a:solidFill>
+                <a:srgbClr val="000000"/>
+              </a:solidFill>
+            </a:endParaRPr>
+          </a:p>
+          <a:p>
+            <a:pPr marL="55397" indent="0">
+              <a:buNone/>
+            </a:pPr>
+            <a:r>
+              <a:rPr lang="en-US" sz="2000" dirty="0">
+                <a:solidFill>
+                  <a:srgbClr val="000000"/>
+                </a:solidFill>
+              </a:rPr>
+              <a:t>	</a:t>
+            </a:r>
+            <a:r>
+              <a:rPr lang="en-GB" sz="2000" dirty="0" err="1">
+                <a:solidFill>
+                  <a:srgbClr val="000000"/>
+                </a:solidFill>
+              </a:rPr>
+              <a:t>h.parallel_for</a:t>
+            </a:r>
+            <a:r>
+              <a:rPr lang="en-GB" sz="2000" dirty="0">
+                <a:solidFill>
+                  <a:srgbClr val="000000"/>
+                </a:solidFill>
+              </a:rPr>
+              <a:t>(size, [=](</a:t>
+            </a:r>
+            <a:r>
+              <a:rPr lang="en-GB" sz="2000" dirty="0">
+                <a:solidFill>
+                  <a:srgbClr val="0000FF"/>
+                </a:solidFill>
+              </a:rPr>
+              <a:t>auto</a:t>
+            </a:r>
+            <a:r>
+              <a:rPr lang="en-GB" sz="2000" dirty="0">
+                <a:solidFill>
+                  <a:srgbClr val="000000"/>
+                </a:solidFill>
+              </a:rPr>
+              <a:t>&amp; </a:t>
+            </a:r>
+            <a:r>
+              <a:rPr lang="en-GB" sz="2000" dirty="0" err="1">
+                <a:solidFill>
+                  <a:srgbClr val="000000"/>
+                </a:solidFill>
+              </a:rPr>
+              <a:t>idx</a:t>
+            </a:r>
+            <a:r>
+              <a:rPr lang="en-GB" sz="2000" dirty="0">
+                <a:solidFill>
+                  <a:srgbClr val="000000"/>
+                </a:solidFill>
+              </a:rPr>
+              <a:t>) {</a:t>
+            </a:r>
+          </a:p>
+          <a:p>
+            <a:pPr marL="55397" indent="0">
+              <a:buNone/>
+            </a:pPr>
+            <a:r>
+              <a:rPr lang="en-GB" sz="2000" dirty="0">
+                <a:solidFill>
+                  <a:srgbClr val="000000"/>
+                </a:solidFill>
+              </a:rPr>
+              <a:t>		</a:t>
+            </a:r>
+            <a:r>
+              <a:rPr lang="en-GB" sz="2000" dirty="0" err="1">
+                <a:solidFill>
+                  <a:srgbClr val="000000"/>
+                </a:solidFill>
+              </a:rPr>
+              <a:t>acc</a:t>
+            </a:r>
+            <a:r>
+              <a:rPr lang="en-GB" sz="2000" dirty="0">
+                <a:solidFill>
+                  <a:srgbClr val="000000"/>
+                </a:solidFill>
+              </a:rPr>
+              <a:t>[</a:t>
+            </a:r>
+            <a:r>
+              <a:rPr lang="en-GB" sz="2000" dirty="0" err="1">
+                <a:solidFill>
+                  <a:srgbClr val="000000"/>
+                </a:solidFill>
+              </a:rPr>
+              <a:t>idx</a:t>
+            </a:r>
+            <a:r>
+              <a:rPr lang="en-GB" sz="2000" dirty="0">
+                <a:solidFill>
+                  <a:srgbClr val="000000"/>
+                </a:solidFill>
+              </a:rPr>
+              <a:t>] = </a:t>
+            </a:r>
+            <a:r>
+              <a:rPr lang="en-GB" sz="2000" dirty="0" err="1">
+                <a:solidFill>
+                  <a:srgbClr val="000000"/>
+                </a:solidFill>
+              </a:rPr>
+              <a:t>idx</a:t>
+            </a:r>
+            <a:r>
+              <a:rPr lang="en-GB" sz="2000" dirty="0">
+                <a:solidFill>
+                  <a:srgbClr val="000000"/>
+                </a:solidFill>
+              </a:rPr>
+              <a:t>;				</a:t>
+            </a:r>
+            <a:r>
+              <a:rPr lang="en-GB" sz="2000" dirty="0">
+                <a:solidFill>
+                  <a:srgbClr val="008000"/>
+                </a:solidFill>
+              </a:rPr>
+              <a:t>// Device code to be run when runtime dependencies are met</a:t>
+            </a:r>
+            <a:endParaRPr lang="en-GB" sz="2000" dirty="0">
+              <a:solidFill>
+                <a:srgbClr val="000000"/>
+              </a:solidFill>
+            </a:endParaRPr>
+          </a:p>
+          <a:p>
+            <a:pPr marL="55397" indent="0">
+              <a:buNone/>
+            </a:pPr>
+            <a:r>
+              <a:rPr lang="en-US" sz="2000" dirty="0">
+                <a:solidFill>
+                  <a:srgbClr val="000000"/>
+                </a:solidFill>
+              </a:rPr>
+              <a:t>	});</a:t>
+            </a:r>
+          </a:p>
+          <a:p>
+            <a:pPr marL="55397" indent="0">
+              <a:buNone/>
+            </a:pPr>
+            <a:r>
+              <a:rPr lang="en-US" sz="2000" dirty="0">
+                <a:solidFill>
+                  <a:srgbClr val="000000"/>
+                </a:solidFill>
+              </a:rPr>
+              <a:t>});</a:t>
+            </a:r>
+          </a:p>
+          <a:p>
+            <a:pPr marL="55397" indent="0">
+              <a:buNone/>
+            </a:pPr>
+            <a:endParaRPr lang="en-US" sz="2000" dirty="0">
+              <a:solidFill>
+                <a:srgbClr val="000000"/>
+              </a:solidFill>
+            </a:endParaRPr>
+          </a:p>
+          <a:p>
+            <a:pPr marL="55397" indent="0">
+              <a:buNone/>
+            </a:pPr>
+            <a:endParaRPr lang="en-US" sz="2000" dirty="0">
+              <a:solidFill>
+                <a:srgbClr val="000000"/>
+              </a:solidFill>
+            </a:endParaRPr>
+          </a:p>
+          <a:p>
+            <a:pPr marL="55397" indent="0">
+              <a:buNone/>
+            </a:pPr>
+            <a:endParaRPr lang="en-US" sz="2000" dirty="0">
+              <a:solidFill>
+                <a:srgbClr val="000000"/>
+              </a:solidFill>
+            </a:endParaRPr>
+          </a:p>
+          <a:p>
+            <a:pPr marL="55397" indent="0">
+              <a:buNone/>
+            </a:pPr>
+            <a:endParaRPr lang="en-US" sz="2000" dirty="0">
+              <a:solidFill>
+                <a:srgbClr val="000000"/>
+              </a:solidFill>
+            </a:endParaRPr>
+          </a:p>
+          <a:p>
+            <a:pPr marL="55397" indent="0">
+              <a:buNone/>
+            </a:pPr>
+            <a:endParaRPr lang="en-US" sz="2000" dirty="0">
+              <a:solidFill>
+                <a:srgbClr val="000000"/>
+              </a:solidFill>
+            </a:endParaRPr>
+          </a:p>
+          <a:p>
+            <a:pPr marL="55397" indent="0">
+              <a:buNone/>
+            </a:pPr>
+            <a:endParaRPr lang="en-US" sz="2000" dirty="0">
+              <a:solidFill>
+                <a:srgbClr val="000000"/>
+              </a:solidFill>
+            </a:endParaRPr>
+          </a:p>
+          <a:p>
+            <a:pPr marL="55397" indent="0">
+              <a:buNone/>
+            </a:pPr>
+            <a:r>
+              <a:rPr lang="en-US" sz="2000" i="1" dirty="0"/>
+              <a:t>Source: Data Parallel C++, James Reinders et al. pg. 27</a:t>
+            </a:r>
+          </a:p>
+          <a:p>
+            <a:pPr marL="55397" indent="0">
+              <a:buNone/>
+            </a:pPr>
+            <a:endParaRPr lang="en-US" sz="2000" dirty="0"/>
+          </a:p>
+        </p:txBody>
+      </p:sp>
+      <p:sp>
+        <p:nvSpPr>
+          <p:cNvPr id="3" name="Title 2">
+            <a:extLst>
+              <a:ext uri="{FF2B5EF4-FFF2-40B4-BE49-F238E27FC236}">
+                <a16:creationId xmlns:a16="http://schemas.microsoft.com/office/drawing/2014/main" id="{CFDE7D4A-1B7C-A57B-3028-9B6BE534194C}"/>
+              </a:ext>
+            </a:extLst>
+          </p:cNvPr>
+          <p:cNvSpPr>
+            <a:spLocks noGrp="1"/>
+          </p:cNvSpPr>
+          <p:nvPr>
+            <p:ph type="title"/>
+          </p:nvPr>
+        </p:nvSpPr>
+        <p:spPr/>
+        <p:txBody>
+          <a:bodyPr/>
+          <a:lstStyle/>
+          <a:p>
+            <a:r>
+              <a:rPr lang="en-US" sz="4000" dirty="0"/>
+              <a:t>Device Work Submission Example</a:t>
+            </a:r>
+          </a:p>
+        </p:txBody>
+      </p:sp>
+    </p:spTree>
+    <p:extLst>
+      <p:ext uri="{BB962C8B-B14F-4D97-AF65-F5344CB8AC3E}">
+        <p14:creationId xmlns:p14="http://schemas.microsoft.com/office/powerpoint/2010/main" val="825401750"/>
       </p:ext>
     </p:extLst>
   </p:cSld>
@@ -20251,18 +20635,18 @@
 </file>
 
 <file path=customXml/item1.xml><?xml version="1.0" encoding="utf-8"?>
+<p:properties xmlns:p="http://schemas.microsoft.com/office/2006/metadata/properties" xmlns:xsi="http://www.w3.org/2001/XMLSchema-instance" xmlns:pc="http://schemas.microsoft.com/office/infopath/2007/PartnerControls">
+  <documentManagement/>
+</p:properties>
+</file>
+
+<file path=customXml/item2.xml><?xml version="1.0" encoding="utf-8"?>
 <?mso-contentType ?>
 <FormTemplates xmlns="http://schemas.microsoft.com/sharepoint/v3/contenttype/forms">
   <Display>DocumentLibraryForm</Display>
   <Edit>DocumentLibraryForm</Edit>
   <New>DocumentLibraryForm</New>
 </FormTemplates>
-</file>
-
-<file path=customXml/item2.xml><?xml version="1.0" encoding="utf-8"?>
-<p:properties xmlns:p="http://schemas.microsoft.com/office/2006/metadata/properties" xmlns:xsi="http://www.w3.org/2001/XMLSchema-instance" xmlns:pc="http://schemas.microsoft.com/office/infopath/2007/PartnerControls">
-  <documentManagement/>
-</p:properties>
 </file>
 
 <file path=customXml/item3.xml><?xml version="1.0" encoding="utf-8"?>
@@ -20424,14 +20808,6 @@
 </file>
 
 <file path=customXml/itemProps1.xml><?xml version="1.0" encoding="utf-8"?>
-<ds:datastoreItem xmlns:ds="http://schemas.openxmlformats.org/officeDocument/2006/customXml" ds:itemID="{39D54C70-8A1F-433D-B3DF-B7287D9E1633}">
-  <ds:schemaRefs>
-    <ds:schemaRef ds:uri="http://schemas.microsoft.com/sharepoint/v3/contenttype/forms"/>
-  </ds:schemaRefs>
-</ds:datastoreItem>
-</file>
-
-<file path=customXml/itemProps2.xml><?xml version="1.0" encoding="utf-8"?>
 <ds:datastoreItem xmlns:ds="http://schemas.openxmlformats.org/officeDocument/2006/customXml" ds:itemID="{796C1367-8D37-49A1-BF4B-2E9150DA2B52}">
   <ds:schemaRefs>
     <ds:schemaRef ds:uri="http://purl.org/dc/dcmitype/"/>
@@ -20443,6 +20819,14 @@
     <ds:schemaRef ds:uri="http://schemas.microsoft.com/office/2006/metadata/properties"/>
     <ds:schemaRef ds:uri="http://schemas.openxmlformats.org/package/2006/metadata/core-properties"/>
     <ds:schemaRef ds:uri="63fc63a6-18cf-4814-8dee-b8d6616a2bda"/>
+  </ds:schemaRefs>
+</ds:datastoreItem>
+</file>
+
+<file path=customXml/itemProps2.xml><?xml version="1.0" encoding="utf-8"?>
+<ds:datastoreItem xmlns:ds="http://schemas.openxmlformats.org/officeDocument/2006/customXml" ds:itemID="{39D54C70-8A1F-433D-B3DF-B7287D9E1633}">
+  <ds:schemaRefs>
+    <ds:schemaRef ds:uri="http://schemas.microsoft.com/sharepoint/v3/contenttype/forms"/>
   </ds:schemaRefs>
 </ds:datastoreItem>
 </file>

</xml_diff>